<commit_message>
weitere Bilder aus Vorlesung 5
</commit_message>
<xml_diff>
--- a/images/Bilder.pptx
+++ b/images/Bilder.pptx
@@ -5,7 +5,7 @@
     <p:sldMasterId id="2147483648" r:id="rId1"/>
   </p:sldMasterIdLst>
   <p:notesMasterIdLst>
-    <p:notesMasterId r:id="rId23"/>
+    <p:notesMasterId r:id="rId27"/>
   </p:notesMasterIdLst>
   <p:sldIdLst>
     <p:sldId id="277" r:id="rId2"/>
@@ -29,6 +29,10 @@
     <p:sldId id="274" r:id="rId20"/>
     <p:sldId id="275" r:id="rId21"/>
     <p:sldId id="276" r:id="rId22"/>
+    <p:sldId id="278" r:id="rId23"/>
+    <p:sldId id="279" r:id="rId24"/>
+    <p:sldId id="280" r:id="rId25"/>
+    <p:sldId id="281" r:id="rId26"/>
   </p:sldIdLst>
   <p:sldSz cx="9144000" cy="6858000" type="screen4x3"/>
   <p:notesSz cx="6858000" cy="9144000"/>
@@ -212,7 +216,7 @@
           <a:p>
             <a:fld id="{3BBBF523-3F2F-4B36-8FF3-17782FE472EA}" type="datetimeFigureOut">
               <a:rPr lang="de-DE" smtClean="0"/>
-              <a:t>03.11.2011</a:t>
+              <a:t>04.11.2011</a:t>
             </a:fld>
             <a:endParaRPr lang="de-DE"/>
           </a:p>
@@ -745,7 +749,7 @@
           <a:p>
             <a:fld id="{524FE5FC-09EE-48EE-B29E-ACC0AF1ED372}" type="datetimeFigureOut">
               <a:rPr lang="de-DE" smtClean="0"/>
-              <a:t>03.11.2011</a:t>
+              <a:t>04.11.2011</a:t>
             </a:fld>
             <a:endParaRPr lang="de-DE"/>
           </a:p>
@@ -915,7 +919,7 @@
           <a:p>
             <a:fld id="{524FE5FC-09EE-48EE-B29E-ACC0AF1ED372}" type="datetimeFigureOut">
               <a:rPr lang="de-DE" smtClean="0"/>
-              <a:t>03.11.2011</a:t>
+              <a:t>04.11.2011</a:t>
             </a:fld>
             <a:endParaRPr lang="de-DE"/>
           </a:p>
@@ -1095,7 +1099,7 @@
           <a:p>
             <a:fld id="{524FE5FC-09EE-48EE-B29E-ACC0AF1ED372}" type="datetimeFigureOut">
               <a:rPr lang="de-DE" smtClean="0"/>
-              <a:t>03.11.2011</a:t>
+              <a:t>04.11.2011</a:t>
             </a:fld>
             <a:endParaRPr lang="de-DE"/>
           </a:p>
@@ -1265,7 +1269,7 @@
           <a:p>
             <a:fld id="{524FE5FC-09EE-48EE-B29E-ACC0AF1ED372}" type="datetimeFigureOut">
               <a:rPr lang="de-DE" smtClean="0"/>
-              <a:t>03.11.2011</a:t>
+              <a:t>04.11.2011</a:t>
             </a:fld>
             <a:endParaRPr lang="de-DE"/>
           </a:p>
@@ -1511,7 +1515,7 @@
           <a:p>
             <a:fld id="{524FE5FC-09EE-48EE-B29E-ACC0AF1ED372}" type="datetimeFigureOut">
               <a:rPr lang="de-DE" smtClean="0"/>
-              <a:t>03.11.2011</a:t>
+              <a:t>04.11.2011</a:t>
             </a:fld>
             <a:endParaRPr lang="de-DE"/>
           </a:p>
@@ -1799,7 +1803,7 @@
           <a:p>
             <a:fld id="{524FE5FC-09EE-48EE-B29E-ACC0AF1ED372}" type="datetimeFigureOut">
               <a:rPr lang="de-DE" smtClean="0"/>
-              <a:t>03.11.2011</a:t>
+              <a:t>04.11.2011</a:t>
             </a:fld>
             <a:endParaRPr lang="de-DE"/>
           </a:p>
@@ -2221,7 +2225,7 @@
           <a:p>
             <a:fld id="{524FE5FC-09EE-48EE-B29E-ACC0AF1ED372}" type="datetimeFigureOut">
               <a:rPr lang="de-DE" smtClean="0"/>
-              <a:t>03.11.2011</a:t>
+              <a:t>04.11.2011</a:t>
             </a:fld>
             <a:endParaRPr lang="de-DE"/>
           </a:p>
@@ -2339,7 +2343,7 @@
           <a:p>
             <a:fld id="{524FE5FC-09EE-48EE-B29E-ACC0AF1ED372}" type="datetimeFigureOut">
               <a:rPr lang="de-DE" smtClean="0"/>
-              <a:t>03.11.2011</a:t>
+              <a:t>04.11.2011</a:t>
             </a:fld>
             <a:endParaRPr lang="de-DE"/>
           </a:p>
@@ -2434,7 +2438,7 @@
           <a:p>
             <a:fld id="{524FE5FC-09EE-48EE-B29E-ACC0AF1ED372}" type="datetimeFigureOut">
               <a:rPr lang="de-DE" smtClean="0"/>
-              <a:t>03.11.2011</a:t>
+              <a:t>04.11.2011</a:t>
             </a:fld>
             <a:endParaRPr lang="de-DE"/>
           </a:p>
@@ -2711,7 +2715,7 @@
           <a:p>
             <a:fld id="{524FE5FC-09EE-48EE-B29E-ACC0AF1ED372}" type="datetimeFigureOut">
               <a:rPr lang="de-DE" smtClean="0"/>
-              <a:t>03.11.2011</a:t>
+              <a:t>04.11.2011</a:t>
             </a:fld>
             <a:endParaRPr lang="de-DE"/>
           </a:p>
@@ -2964,7 +2968,7 @@
           <a:p>
             <a:fld id="{524FE5FC-09EE-48EE-B29E-ACC0AF1ED372}" type="datetimeFigureOut">
               <a:rPr lang="de-DE" smtClean="0"/>
-              <a:t>03.11.2011</a:t>
+              <a:t>04.11.2011</a:t>
             </a:fld>
             <a:endParaRPr lang="de-DE"/>
           </a:p>
@@ -3177,7 +3181,7 @@
           <a:p>
             <a:fld id="{524FE5FC-09EE-48EE-B29E-ACC0AF1ED372}" type="datetimeFigureOut">
               <a:rPr lang="de-DE" smtClean="0"/>
-              <a:t>03.11.2011</a:t>
+              <a:t>04.11.2011</a:t>
             </a:fld>
             <a:endParaRPr lang="de-DE"/>
           </a:p>
@@ -15496,8 +15500,8 @@
             </a:p>
           </p:txBody>
         </p:sp>
-        <mc:AlternateContent xmlns:mc="http://schemas.openxmlformats.org/markup-compatibility/2006">
-          <mc:Choice xmlns:a14="http://schemas.microsoft.com/office/drawing/2010/main" Requires="a14">
+        <mc:AlternateContent xmlns:mc="http://schemas.openxmlformats.org/markup-compatibility/2006" xmlns:a14="http://schemas.microsoft.com/office/drawing/2010/main">
+          <mc:Choice Requires="a14">
             <p:sp>
               <p:nvSpPr>
                 <p:cNvPr id="12" name="Textfeld 11"/>
@@ -15520,6 +15524,7 @@
                 </a:bodyPr>
                 <a:lstStyle/>
                 <a:p>
+                  <a:pPr/>
                   <a14:m>
                     <m:oMathPara xmlns:m="http://schemas.openxmlformats.org/officeDocument/2006/math">
                       <m:oMathParaPr>
@@ -15583,7 +15588,7 @@
               </p:txBody>
             </p:sp>
           </mc:Choice>
-          <mc:Fallback>
+          <mc:Fallback xmlns="">
             <p:sp>
               <p:nvSpPr>
                 <p:cNvPr id="12" name="Textfeld 11"/>
@@ -15622,8 +15627,8 @@
             </p:sp>
           </mc:Fallback>
         </mc:AlternateContent>
-        <mc:AlternateContent xmlns:mc="http://schemas.openxmlformats.org/markup-compatibility/2006">
-          <mc:Choice xmlns:a14="http://schemas.microsoft.com/office/drawing/2010/main" Requires="a14">
+        <mc:AlternateContent xmlns:mc="http://schemas.openxmlformats.org/markup-compatibility/2006" xmlns:a14="http://schemas.microsoft.com/office/drawing/2010/main">
+          <mc:Choice Requires="a14">
             <p:sp>
               <p:nvSpPr>
                 <p:cNvPr id="14" name="Textfeld 13"/>
@@ -15646,6 +15651,7 @@
                 </a:bodyPr>
                 <a:lstStyle/>
                 <a:p>
+                  <a:pPr/>
                   <a14:m>
                     <m:oMathPara xmlns:m="http://schemas.openxmlformats.org/officeDocument/2006/math">
                       <m:oMathParaPr>
@@ -15709,7 +15715,7 @@
               </p:txBody>
             </p:sp>
           </mc:Choice>
-          <mc:Fallback>
+          <mc:Fallback xmlns="">
             <p:sp>
               <p:nvSpPr>
                 <p:cNvPr id="14" name="Textfeld 13"/>
@@ -15748,8 +15754,8 @@
             </p:sp>
           </mc:Fallback>
         </mc:AlternateContent>
-        <mc:AlternateContent xmlns:mc="http://schemas.openxmlformats.org/markup-compatibility/2006">
-          <mc:Choice xmlns:a14="http://schemas.microsoft.com/office/drawing/2010/main" Requires="a14">
+        <mc:AlternateContent xmlns:mc="http://schemas.openxmlformats.org/markup-compatibility/2006" xmlns:a14="http://schemas.microsoft.com/office/drawing/2010/main">
+          <mc:Choice Requires="a14">
             <p:sp>
               <p:nvSpPr>
                 <p:cNvPr id="15" name="Textfeld 14"/>
@@ -15772,6 +15778,7 @@
                 </a:bodyPr>
                 <a:lstStyle/>
                 <a:p>
+                  <a:pPr/>
                   <a14:m>
                     <m:oMathPara xmlns:m="http://schemas.openxmlformats.org/officeDocument/2006/math">
                       <m:oMathParaPr>
@@ -15835,7 +15842,7 @@
               </p:txBody>
             </p:sp>
           </mc:Choice>
-          <mc:Fallback>
+          <mc:Fallback xmlns="">
             <p:sp>
               <p:nvSpPr>
                 <p:cNvPr id="15" name="Textfeld 14"/>
@@ -15874,8 +15881,8 @@
             </p:sp>
           </mc:Fallback>
         </mc:AlternateContent>
-        <mc:AlternateContent xmlns:mc="http://schemas.openxmlformats.org/markup-compatibility/2006">
-          <mc:Choice xmlns:a14="http://schemas.microsoft.com/office/drawing/2010/main" Requires="a14">
+        <mc:AlternateContent xmlns:mc="http://schemas.openxmlformats.org/markup-compatibility/2006" xmlns:a14="http://schemas.microsoft.com/office/drawing/2010/main">
+          <mc:Choice Requires="a14">
             <p:sp>
               <p:nvSpPr>
                 <p:cNvPr id="16" name="Textfeld 15"/>
@@ -15898,6 +15905,7 @@
                 </a:bodyPr>
                 <a:lstStyle/>
                 <a:p>
+                  <a:pPr/>
                   <a14:m>
                     <m:oMathPara xmlns:m="http://schemas.openxmlformats.org/officeDocument/2006/math">
                       <m:oMathParaPr>
@@ -15961,7 +15969,7 @@
               </p:txBody>
             </p:sp>
           </mc:Choice>
-          <mc:Fallback>
+          <mc:Fallback xmlns="">
             <p:sp>
               <p:nvSpPr>
                 <p:cNvPr id="16" name="Textfeld 15"/>
@@ -16000,8 +16008,8 @@
             </p:sp>
           </mc:Fallback>
         </mc:AlternateContent>
-        <mc:AlternateContent xmlns:mc="http://schemas.openxmlformats.org/markup-compatibility/2006">
-          <mc:Choice xmlns:a14="http://schemas.microsoft.com/office/drawing/2010/main" Requires="a14">
+        <mc:AlternateContent xmlns:mc="http://schemas.openxmlformats.org/markup-compatibility/2006" xmlns:a14="http://schemas.microsoft.com/office/drawing/2010/main">
+          <mc:Choice Requires="a14">
             <p:sp>
               <p:nvSpPr>
                 <p:cNvPr id="17" name="Textfeld 16"/>
@@ -16024,6 +16032,7 @@
                 </a:bodyPr>
                 <a:lstStyle/>
                 <a:p>
+                  <a:pPr/>
                   <a14:m>
                     <m:oMathPara xmlns:m="http://schemas.openxmlformats.org/officeDocument/2006/math">
                       <m:oMathParaPr>
@@ -16087,7 +16096,7 @@
               </p:txBody>
             </p:sp>
           </mc:Choice>
-          <mc:Fallback>
+          <mc:Fallback xmlns="">
             <p:sp>
               <p:nvSpPr>
                 <p:cNvPr id="17" name="Textfeld 16"/>
@@ -16126,8 +16135,8 @@
             </p:sp>
           </mc:Fallback>
         </mc:AlternateContent>
-        <mc:AlternateContent xmlns:mc="http://schemas.openxmlformats.org/markup-compatibility/2006">
-          <mc:Choice xmlns:a14="http://schemas.microsoft.com/office/drawing/2010/main" Requires="a14">
+        <mc:AlternateContent xmlns:mc="http://schemas.openxmlformats.org/markup-compatibility/2006" xmlns:a14="http://schemas.microsoft.com/office/drawing/2010/main">
+          <mc:Choice Requires="a14">
             <p:sp>
               <p:nvSpPr>
                 <p:cNvPr id="18" name="Textfeld 17"/>
@@ -16150,6 +16159,7 @@
                 </a:bodyPr>
                 <a:lstStyle/>
                 <a:p>
+                  <a:pPr/>
                   <a14:m>
                     <m:oMathPara xmlns:m="http://schemas.openxmlformats.org/officeDocument/2006/math">
                       <m:oMathParaPr>
@@ -16213,7 +16223,7 @@
               </p:txBody>
             </p:sp>
           </mc:Choice>
-          <mc:Fallback>
+          <mc:Fallback xmlns="">
             <p:sp>
               <p:nvSpPr>
                 <p:cNvPr id="18" name="Textfeld 17"/>
@@ -17274,7 +17284,7 @@
       </p:grpSpPr>
       <p:grpSp>
         <p:nvGrpSpPr>
-          <p:cNvPr id="34" name="Gruppieren 33"/>
+          <p:cNvPr id="2" name="Gruppieren 1"/>
           <p:cNvGrpSpPr/>
           <p:nvPr/>
         </p:nvGrpSpPr>
@@ -17524,11 +17534,7 @@
             <a:p>
               <a:r>
                 <a:rPr lang="de-DE" sz="2800" dirty="0" smtClean="0"/>
-                <a:t>[0,1</a:t>
-              </a:r>
-              <a:r>
-                <a:rPr lang="de-DE" sz="2800" dirty="0" smtClean="0"/>
-                <a:t>)</a:t>
+                <a:t>[0,1)</a:t>
               </a:r>
               <a:endParaRPr lang="de-DE" sz="2800" dirty="0"/>
             </a:p>
@@ -17558,6 +17564,7 @@
                 </a:bodyPr>
                 <a:lstStyle/>
                 <a:p>
+                  <a:pPr/>
                   <a14:m>
                     <m:oMathPara xmlns:m="http://schemas.openxmlformats.org/officeDocument/2006/math">
                       <m:oMathParaPr>
@@ -21643,6 +21650,493 @@
           <a:chExt cx="0" cy="0"/>
         </a:xfrm>
       </p:grpSpPr>
+      <p:grpSp>
+        <p:nvGrpSpPr>
+          <p:cNvPr id="14" name="Gruppieren 13"/>
+          <p:cNvGrpSpPr/>
+          <p:nvPr/>
+        </p:nvGrpSpPr>
+        <p:grpSpPr>
+          <a:xfrm>
+            <a:off x="3923928" y="692696"/>
+            <a:ext cx="3096344" cy="2592288"/>
+            <a:chOff x="3923928" y="692696"/>
+            <a:chExt cx="3096344" cy="2592288"/>
+          </a:xfrm>
+        </p:grpSpPr>
+        <p:sp>
+          <p:nvSpPr>
+            <p:cNvPr id="2" name="Ellipse 1"/>
+            <p:cNvSpPr/>
+            <p:nvPr/>
+          </p:nvSpPr>
+          <p:spPr>
+            <a:xfrm>
+              <a:off x="4427984" y="692696"/>
+              <a:ext cx="2592288" cy="2592288"/>
+            </a:xfrm>
+            <a:prstGeom prst="ellipse">
+              <a:avLst/>
+            </a:prstGeom>
+            <a:pattFill prst="pct25">
+              <a:fgClr>
+                <a:srgbClr val="FF0000"/>
+              </a:fgClr>
+              <a:bgClr>
+                <a:schemeClr val="bg1"/>
+              </a:bgClr>
+            </a:pattFill>
+            <a:ln w="50800">
+              <a:solidFill>
+                <a:srgbClr val="FF0000"/>
+              </a:solidFill>
+              <a:prstDash val="dash"/>
+            </a:ln>
+          </p:spPr>
+          <p:style>
+            <a:lnRef idx="2">
+              <a:schemeClr val="accent1">
+                <a:shade val="50000"/>
+              </a:schemeClr>
+            </a:lnRef>
+            <a:fillRef idx="1">
+              <a:schemeClr val="accent1"/>
+            </a:fillRef>
+            <a:effectRef idx="0">
+              <a:schemeClr val="accent1"/>
+            </a:effectRef>
+            <a:fontRef idx="minor">
+              <a:schemeClr val="lt1"/>
+            </a:fontRef>
+          </p:style>
+          <p:txBody>
+            <a:bodyPr rtlCol="0" anchor="ctr"/>
+            <a:lstStyle/>
+            <a:p>
+              <a:pPr algn="ctr"/>
+              <a:endParaRPr lang="de-DE"/>
+            </a:p>
+          </p:txBody>
+        </p:sp>
+        <p:sp>
+          <p:nvSpPr>
+            <p:cNvPr id="3" name="Kreuz 2"/>
+            <p:cNvSpPr/>
+            <p:nvPr/>
+          </p:nvSpPr>
+          <p:spPr>
+            <a:xfrm rot="2700000">
+              <a:off x="5201540" y="2186331"/>
+              <a:ext cx="258206" cy="258206"/>
+            </a:xfrm>
+            <a:prstGeom prst="plus">
+              <a:avLst>
+                <a:gd name="adj" fmla="val 41125"/>
+              </a:avLst>
+            </a:prstGeom>
+            <a:solidFill>
+              <a:schemeClr val="bg1"/>
+            </a:solidFill>
+            <a:ln w="6350">
+              <a:solidFill>
+                <a:schemeClr val="tx1"/>
+              </a:solidFill>
+            </a:ln>
+          </p:spPr>
+          <p:style>
+            <a:lnRef idx="2">
+              <a:schemeClr val="accent1">
+                <a:shade val="50000"/>
+              </a:schemeClr>
+            </a:lnRef>
+            <a:fillRef idx="1">
+              <a:schemeClr val="accent1"/>
+            </a:fillRef>
+            <a:effectRef idx="0">
+              <a:schemeClr val="accent1"/>
+            </a:effectRef>
+            <a:fontRef idx="minor">
+              <a:schemeClr val="lt1"/>
+            </a:fontRef>
+          </p:style>
+          <p:txBody>
+            <a:bodyPr rtlCol="0" anchor="ctr"/>
+            <a:lstStyle/>
+            <a:p>
+              <a:pPr algn="ctr"/>
+              <a:endParaRPr lang="de-DE"/>
+            </a:p>
+          </p:txBody>
+        </p:sp>
+        <p:sp>
+          <p:nvSpPr>
+            <p:cNvPr id="4" name="Textfeld 3"/>
+            <p:cNvSpPr txBox="1"/>
+            <p:nvPr/>
+          </p:nvSpPr>
+          <p:spPr>
+            <a:xfrm>
+              <a:off x="5436096" y="1988840"/>
+              <a:ext cx="576064" cy="646331"/>
+            </a:xfrm>
+            <a:prstGeom prst="rect">
+              <a:avLst/>
+            </a:prstGeom>
+            <a:noFill/>
+          </p:spPr>
+          <p:txBody>
+            <a:bodyPr wrap="square" rtlCol="0">
+              <a:spAutoFit/>
+            </a:bodyPr>
+            <a:lstStyle/>
+            <a:p>
+              <a:r>
+                <a:rPr lang="de-DE" sz="3600" b="1" dirty="0" smtClean="0">
+                  <a:ln>
+                    <a:solidFill>
+                      <a:schemeClr val="tx1"/>
+                    </a:solidFill>
+                  </a:ln>
+                  <a:solidFill>
+                    <a:schemeClr val="bg1"/>
+                  </a:solidFill>
+                </a:rPr>
+                <a:t>p</a:t>
+              </a:r>
+              <a:endParaRPr lang="de-DE" sz="3600" b="1" dirty="0">
+                <a:ln>
+                  <a:solidFill>
+                    <a:schemeClr val="tx1"/>
+                  </a:solidFill>
+                </a:ln>
+                <a:solidFill>
+                  <a:schemeClr val="bg1"/>
+                </a:solidFill>
+              </a:endParaRPr>
+            </a:p>
+          </p:txBody>
+        </p:sp>
+        <p:sp>
+          <p:nvSpPr>
+            <p:cNvPr id="5" name="Textfeld 4"/>
+            <p:cNvSpPr txBox="1"/>
+            <p:nvPr/>
+          </p:nvSpPr>
+          <p:spPr>
+            <a:xfrm>
+              <a:off x="3923928" y="692696"/>
+              <a:ext cx="792088" cy="523220"/>
+            </a:xfrm>
+            <a:prstGeom prst="rect">
+              <a:avLst/>
+            </a:prstGeom>
+            <a:noFill/>
+          </p:spPr>
+          <p:txBody>
+            <a:bodyPr wrap="square" rtlCol="0">
+              <a:spAutoFit/>
+            </a:bodyPr>
+            <a:lstStyle/>
+            <a:p>
+              <a:r>
+                <a:rPr lang="de-DE" sz="2800" dirty="0" smtClean="0">
+                  <a:solidFill>
+                    <a:srgbClr val="FF0000"/>
+                  </a:solidFill>
+                </a:rPr>
+                <a:t>n=2</a:t>
+              </a:r>
+              <a:endParaRPr lang="de-DE" sz="2800" dirty="0">
+                <a:solidFill>
+                  <a:srgbClr val="FF0000"/>
+                </a:solidFill>
+              </a:endParaRPr>
+            </a:p>
+          </p:txBody>
+        </p:sp>
+      </p:grpSp>
+      <p:grpSp>
+        <p:nvGrpSpPr>
+          <p:cNvPr id="15" name="Gruppieren 14"/>
+          <p:cNvGrpSpPr/>
+          <p:nvPr/>
+        </p:nvGrpSpPr>
+        <p:grpSpPr>
+          <a:xfrm>
+            <a:off x="1263994" y="4573016"/>
+            <a:ext cx="4071720" cy="1140869"/>
+            <a:chOff x="1263994" y="4573016"/>
+            <a:chExt cx="4071720" cy="1140869"/>
+          </a:xfrm>
+        </p:grpSpPr>
+        <p:sp>
+          <p:nvSpPr>
+            <p:cNvPr id="6" name="Textfeld 5"/>
+            <p:cNvSpPr txBox="1"/>
+            <p:nvPr/>
+          </p:nvSpPr>
+          <p:spPr>
+            <a:xfrm>
+              <a:off x="2233290" y="4573016"/>
+              <a:ext cx="545342" cy="646331"/>
+            </a:xfrm>
+            <a:prstGeom prst="rect">
+              <a:avLst/>
+            </a:prstGeom>
+            <a:noFill/>
+          </p:spPr>
+          <p:txBody>
+            <a:bodyPr wrap="none" rtlCol="0">
+              <a:spAutoFit/>
+            </a:bodyPr>
+            <a:lstStyle/>
+            <a:p>
+              <a:r>
+                <a:rPr lang="de-DE" sz="3600" dirty="0" smtClean="0">
+                  <a:latin typeface="Lucida Sans Unicode"/>
+                  <a:cs typeface="Lucida Sans Unicode"/>
+                </a:rPr>
+                <a:t>ℝ</a:t>
+              </a:r>
+              <a:endParaRPr lang="de-DE" sz="3600" dirty="0"/>
+            </a:p>
+          </p:txBody>
+        </p:sp>
+        <p:cxnSp>
+          <p:nvCxnSpPr>
+            <p:cNvPr id="8" name="Gerade Verbindung 7"/>
+            <p:cNvCxnSpPr/>
+            <p:nvPr/>
+          </p:nvCxnSpPr>
+          <p:spPr>
+            <a:xfrm>
+              <a:off x="1263994" y="5301208"/>
+              <a:ext cx="4066649" cy="0"/>
+            </a:xfrm>
+            <a:prstGeom prst="line">
+              <a:avLst/>
+            </a:prstGeom>
+            <a:noFill/>
+            <a:ln w="63500">
+              <a:solidFill>
+                <a:schemeClr val="tx1"/>
+              </a:solidFill>
+            </a:ln>
+          </p:spPr>
+          <p:style>
+            <a:lnRef idx="2">
+              <a:schemeClr val="accent1">
+                <a:shade val="50000"/>
+              </a:schemeClr>
+            </a:lnRef>
+            <a:fillRef idx="1">
+              <a:schemeClr val="accent1"/>
+            </a:fillRef>
+            <a:effectRef idx="0">
+              <a:schemeClr val="accent1"/>
+            </a:effectRef>
+            <a:fontRef idx="minor">
+              <a:schemeClr val="lt1"/>
+            </a:fontRef>
+          </p:style>
+        </p:cxnSp>
+        <p:sp>
+          <p:nvSpPr>
+            <p:cNvPr id="10" name="Bogen 9"/>
+            <p:cNvSpPr/>
+            <p:nvPr/>
+          </p:nvSpPr>
+          <p:spPr>
+            <a:xfrm rot="16200000">
+              <a:off x="1304883" y="4849762"/>
+              <a:ext cx="821115" cy="902894"/>
+            </a:xfrm>
+            <a:prstGeom prst="arc">
+              <a:avLst>
+                <a:gd name="adj1" fmla="val 13243218"/>
+                <a:gd name="adj2" fmla="val 19291918"/>
+              </a:avLst>
+            </a:prstGeom>
+            <a:noFill/>
+            <a:ln w="63500">
+              <a:solidFill>
+                <a:schemeClr val="tx1"/>
+              </a:solidFill>
+            </a:ln>
+          </p:spPr>
+          <p:style>
+            <a:lnRef idx="2">
+              <a:schemeClr val="accent1">
+                <a:shade val="50000"/>
+              </a:schemeClr>
+            </a:lnRef>
+            <a:fillRef idx="1">
+              <a:schemeClr val="accent1"/>
+            </a:fillRef>
+            <a:effectRef idx="0">
+              <a:schemeClr val="accent1"/>
+            </a:effectRef>
+            <a:fontRef idx="minor">
+              <a:schemeClr val="lt1"/>
+            </a:fontRef>
+          </p:style>
+          <p:txBody>
+            <a:bodyPr rtlCol="0" anchor="ctr"/>
+            <a:lstStyle/>
+            <a:p>
+              <a:pPr algn="ctr"/>
+              <a:endParaRPr lang="de-DE"/>
+            </a:p>
+          </p:txBody>
+        </p:sp>
+        <p:sp>
+          <p:nvSpPr>
+            <p:cNvPr id="11" name="Bogen 10"/>
+            <p:cNvSpPr/>
+            <p:nvPr/>
+          </p:nvSpPr>
+          <p:spPr>
+            <a:xfrm rot="5400000">
+              <a:off x="2546851" y="4849762"/>
+              <a:ext cx="821115" cy="902894"/>
+            </a:xfrm>
+            <a:prstGeom prst="arc">
+              <a:avLst>
+                <a:gd name="adj1" fmla="val 13243218"/>
+                <a:gd name="adj2" fmla="val 19291918"/>
+              </a:avLst>
+            </a:prstGeom>
+            <a:noFill/>
+            <a:ln w="63500">
+              <a:solidFill>
+                <a:schemeClr val="tx1"/>
+              </a:solidFill>
+            </a:ln>
+          </p:spPr>
+          <p:style>
+            <a:lnRef idx="2">
+              <a:schemeClr val="accent1">
+                <a:shade val="50000"/>
+              </a:schemeClr>
+            </a:lnRef>
+            <a:fillRef idx="1">
+              <a:schemeClr val="accent1"/>
+            </a:fillRef>
+            <a:effectRef idx="0">
+              <a:schemeClr val="accent1"/>
+            </a:effectRef>
+            <a:fontRef idx="minor">
+              <a:schemeClr val="lt1"/>
+            </a:fontRef>
+          </p:style>
+          <p:txBody>
+            <a:bodyPr rtlCol="0" anchor="ctr"/>
+            <a:lstStyle/>
+            <a:p>
+              <a:pPr algn="ctr"/>
+              <a:endParaRPr lang="de-DE"/>
+            </a:p>
+          </p:txBody>
+        </p:sp>
+        <p:sp>
+          <p:nvSpPr>
+            <p:cNvPr id="12" name="Bogen 11"/>
+            <p:cNvSpPr/>
+            <p:nvPr/>
+          </p:nvSpPr>
+          <p:spPr>
+            <a:xfrm rot="5400000">
+              <a:off x="4473709" y="4849761"/>
+              <a:ext cx="821115" cy="902894"/>
+            </a:xfrm>
+            <a:prstGeom prst="arc">
+              <a:avLst>
+                <a:gd name="adj1" fmla="val 13243218"/>
+                <a:gd name="adj2" fmla="val 19291918"/>
+              </a:avLst>
+            </a:prstGeom>
+            <a:noFill/>
+            <a:ln w="63500">
+              <a:solidFill>
+                <a:schemeClr val="tx1"/>
+              </a:solidFill>
+            </a:ln>
+          </p:spPr>
+          <p:style>
+            <a:lnRef idx="2">
+              <a:schemeClr val="accent1">
+                <a:shade val="50000"/>
+              </a:schemeClr>
+            </a:lnRef>
+            <a:fillRef idx="1">
+              <a:schemeClr val="accent1"/>
+            </a:fillRef>
+            <a:effectRef idx="0">
+              <a:schemeClr val="accent1"/>
+            </a:effectRef>
+            <a:fontRef idx="minor">
+              <a:schemeClr val="lt1"/>
+            </a:fontRef>
+          </p:style>
+          <p:txBody>
+            <a:bodyPr rtlCol="0" anchor="ctr"/>
+            <a:lstStyle/>
+            <a:p>
+              <a:pPr algn="ctr"/>
+              <a:endParaRPr lang="de-DE"/>
+            </a:p>
+          </p:txBody>
+        </p:sp>
+        <p:sp>
+          <p:nvSpPr>
+            <p:cNvPr id="13" name="Bogen 12"/>
+            <p:cNvSpPr/>
+            <p:nvPr/>
+          </p:nvSpPr>
+          <p:spPr>
+            <a:xfrm rot="16200000">
+              <a:off x="3513371" y="4851881"/>
+              <a:ext cx="821115" cy="902894"/>
+            </a:xfrm>
+            <a:prstGeom prst="arc">
+              <a:avLst>
+                <a:gd name="adj1" fmla="val 13243218"/>
+                <a:gd name="adj2" fmla="val 19291918"/>
+              </a:avLst>
+            </a:prstGeom>
+            <a:noFill/>
+            <a:ln w="63500">
+              <a:solidFill>
+                <a:schemeClr val="tx1"/>
+              </a:solidFill>
+            </a:ln>
+          </p:spPr>
+          <p:style>
+            <a:lnRef idx="2">
+              <a:schemeClr val="accent1">
+                <a:shade val="50000"/>
+              </a:schemeClr>
+            </a:lnRef>
+            <a:fillRef idx="1">
+              <a:schemeClr val="accent1"/>
+            </a:fillRef>
+            <a:effectRef idx="0">
+              <a:schemeClr val="accent1"/>
+            </a:effectRef>
+            <a:fontRef idx="minor">
+              <a:schemeClr val="lt1"/>
+            </a:fontRef>
+          </p:style>
+          <p:txBody>
+            <a:bodyPr rtlCol="0" anchor="ctr"/>
+            <a:lstStyle/>
+            <a:p>
+              <a:pPr algn="ctr"/>
+              <a:endParaRPr lang="de-DE"/>
+            </a:p>
+          </p:txBody>
+        </p:sp>
+      </p:grpSp>
     </p:spTree>
     <p:extLst>
       <p:ext uri="{BB962C8B-B14F-4D97-AF65-F5344CB8AC3E}">
@@ -21680,10 +22174,3824 @@
           <a:chExt cx="0" cy="0"/>
         </a:xfrm>
       </p:grpSpPr>
+      <p:sp>
+        <p:nvSpPr>
+          <p:cNvPr id="2" name="Freihandform 1"/>
+          <p:cNvSpPr/>
+          <p:nvPr/>
+        </p:nvSpPr>
+        <p:spPr>
+          <a:xfrm>
+            <a:off x="2639159" y="1636953"/>
+            <a:ext cx="3179828" cy="3568363"/>
+          </a:xfrm>
+          <a:custGeom>
+            <a:avLst/>
+            <a:gdLst>
+              <a:gd name="connsiteX0" fmla="*/ 1200839 w 3179828"/>
+              <a:gd name="connsiteY0" fmla="*/ 578418 h 3568363"/>
+              <a:gd name="connsiteX1" fmla="*/ 475125 w 3179828"/>
+              <a:gd name="connsiteY1" fmla="*/ 694533 h 3568363"/>
+              <a:gd name="connsiteX2" fmla="*/ 504153 w 3179828"/>
+              <a:gd name="connsiteY2" fmla="*/ 346190 h 3568363"/>
+              <a:gd name="connsiteX3" fmla="*/ 286439 w 3179828"/>
+              <a:gd name="connsiteY3" fmla="*/ 244590 h 3568363"/>
+              <a:gd name="connsiteX4" fmla="*/ 10668 w 3179828"/>
+              <a:gd name="connsiteY4" fmla="*/ 781618 h 3568363"/>
+              <a:gd name="connsiteX5" fmla="*/ 112268 w 3179828"/>
+              <a:gd name="connsiteY5" fmla="*/ 1725047 h 3568363"/>
+              <a:gd name="connsiteX6" fmla="*/ 620268 w 3179828"/>
+              <a:gd name="connsiteY6" fmla="*/ 1579904 h 3568363"/>
+              <a:gd name="connsiteX7" fmla="*/ 939582 w 3179828"/>
+              <a:gd name="connsiteY7" fmla="*/ 2131447 h 3568363"/>
+              <a:gd name="connsiteX8" fmla="*/ 199353 w 3179828"/>
+              <a:gd name="connsiteY8" fmla="*/ 2842647 h 3568363"/>
+              <a:gd name="connsiteX9" fmla="*/ 1055696 w 3179828"/>
+              <a:gd name="connsiteY9" fmla="*/ 3205504 h 3568363"/>
+              <a:gd name="connsiteX10" fmla="*/ 1549182 w 3179828"/>
+              <a:gd name="connsiteY10" fmla="*/ 1971790 h 3568363"/>
+              <a:gd name="connsiteX11" fmla="*/ 2100725 w 3179828"/>
+              <a:gd name="connsiteY11" fmla="*/ 3568361 h 3568363"/>
+              <a:gd name="connsiteX12" fmla="*/ 2710325 w 3179828"/>
+              <a:gd name="connsiteY12" fmla="*/ 1957275 h 3568363"/>
+              <a:gd name="connsiteX13" fmla="*/ 2652268 w 3179828"/>
+              <a:gd name="connsiteY13" fmla="*/ 796133 h 3568363"/>
+              <a:gd name="connsiteX14" fmla="*/ 3160268 w 3179828"/>
+              <a:gd name="connsiteY14" fmla="*/ 230075 h 3568363"/>
+              <a:gd name="connsiteX15" fmla="*/ 1868496 w 3179828"/>
+              <a:gd name="connsiteY15" fmla="*/ 12361 h 3568363"/>
+              <a:gd name="connsiteX16" fmla="*/ 1200839 w 3179828"/>
+              <a:gd name="connsiteY16" fmla="*/ 578418 h 3568363"/>
+            </a:gdLst>
+            <a:ahLst/>
+            <a:cxnLst>
+              <a:cxn ang="0">
+                <a:pos x="connsiteX0" y="connsiteY0"/>
+              </a:cxn>
+              <a:cxn ang="0">
+                <a:pos x="connsiteX1" y="connsiteY1"/>
+              </a:cxn>
+              <a:cxn ang="0">
+                <a:pos x="connsiteX2" y="connsiteY2"/>
+              </a:cxn>
+              <a:cxn ang="0">
+                <a:pos x="connsiteX3" y="connsiteY3"/>
+              </a:cxn>
+              <a:cxn ang="0">
+                <a:pos x="connsiteX4" y="connsiteY4"/>
+              </a:cxn>
+              <a:cxn ang="0">
+                <a:pos x="connsiteX5" y="connsiteY5"/>
+              </a:cxn>
+              <a:cxn ang="0">
+                <a:pos x="connsiteX6" y="connsiteY6"/>
+              </a:cxn>
+              <a:cxn ang="0">
+                <a:pos x="connsiteX7" y="connsiteY7"/>
+              </a:cxn>
+              <a:cxn ang="0">
+                <a:pos x="connsiteX8" y="connsiteY8"/>
+              </a:cxn>
+              <a:cxn ang="0">
+                <a:pos x="connsiteX9" y="connsiteY9"/>
+              </a:cxn>
+              <a:cxn ang="0">
+                <a:pos x="connsiteX10" y="connsiteY10"/>
+              </a:cxn>
+              <a:cxn ang="0">
+                <a:pos x="connsiteX11" y="connsiteY11"/>
+              </a:cxn>
+              <a:cxn ang="0">
+                <a:pos x="connsiteX12" y="connsiteY12"/>
+              </a:cxn>
+              <a:cxn ang="0">
+                <a:pos x="connsiteX13" y="connsiteY13"/>
+              </a:cxn>
+              <a:cxn ang="0">
+                <a:pos x="connsiteX14" y="connsiteY14"/>
+              </a:cxn>
+              <a:cxn ang="0">
+                <a:pos x="connsiteX15" y="connsiteY15"/>
+              </a:cxn>
+              <a:cxn ang="0">
+                <a:pos x="connsiteX16" y="connsiteY16"/>
+              </a:cxn>
+            </a:cxnLst>
+            <a:rect l="l" t="t" r="r" b="b"/>
+            <a:pathLst>
+              <a:path w="3179828" h="3568363">
+                <a:moveTo>
+                  <a:pt x="1200839" y="578418"/>
+                </a:moveTo>
+                <a:cubicBezTo>
+                  <a:pt x="968611" y="692113"/>
+                  <a:pt x="591239" y="733238"/>
+                  <a:pt x="475125" y="694533"/>
+                </a:cubicBezTo>
+                <a:cubicBezTo>
+                  <a:pt x="359011" y="655828"/>
+                  <a:pt x="535601" y="421180"/>
+                  <a:pt x="504153" y="346190"/>
+                </a:cubicBezTo>
+                <a:cubicBezTo>
+                  <a:pt x="472705" y="271200"/>
+                  <a:pt x="368686" y="172019"/>
+                  <a:pt x="286439" y="244590"/>
+                </a:cubicBezTo>
+                <a:cubicBezTo>
+                  <a:pt x="204191" y="317161"/>
+                  <a:pt x="39696" y="534875"/>
+                  <a:pt x="10668" y="781618"/>
+                </a:cubicBezTo>
+                <a:cubicBezTo>
+                  <a:pt x="-18360" y="1028361"/>
+                  <a:pt x="10668" y="1591999"/>
+                  <a:pt x="112268" y="1725047"/>
+                </a:cubicBezTo>
+                <a:cubicBezTo>
+                  <a:pt x="213868" y="1858095"/>
+                  <a:pt x="482382" y="1512171"/>
+                  <a:pt x="620268" y="1579904"/>
+                </a:cubicBezTo>
+                <a:cubicBezTo>
+                  <a:pt x="758154" y="1647637"/>
+                  <a:pt x="1009735" y="1920990"/>
+                  <a:pt x="939582" y="2131447"/>
+                </a:cubicBezTo>
+                <a:cubicBezTo>
+                  <a:pt x="869429" y="2341904"/>
+                  <a:pt x="180001" y="2663638"/>
+                  <a:pt x="199353" y="2842647"/>
+                </a:cubicBezTo>
+                <a:cubicBezTo>
+                  <a:pt x="218705" y="3021657"/>
+                  <a:pt x="830725" y="3350647"/>
+                  <a:pt x="1055696" y="3205504"/>
+                </a:cubicBezTo>
+                <a:cubicBezTo>
+                  <a:pt x="1280667" y="3060361"/>
+                  <a:pt x="1375011" y="1911314"/>
+                  <a:pt x="1549182" y="1971790"/>
+                </a:cubicBezTo>
+                <a:cubicBezTo>
+                  <a:pt x="1723353" y="2032266"/>
+                  <a:pt x="1907201" y="3570780"/>
+                  <a:pt x="2100725" y="3568361"/>
+                </a:cubicBezTo>
+                <a:cubicBezTo>
+                  <a:pt x="2294249" y="3565942"/>
+                  <a:pt x="2618401" y="2419313"/>
+                  <a:pt x="2710325" y="1957275"/>
+                </a:cubicBezTo>
+                <a:cubicBezTo>
+                  <a:pt x="2802249" y="1495237"/>
+                  <a:pt x="2577278" y="1084000"/>
+                  <a:pt x="2652268" y="796133"/>
+                </a:cubicBezTo>
+                <a:cubicBezTo>
+                  <a:pt x="2727258" y="508266"/>
+                  <a:pt x="3290897" y="360704"/>
+                  <a:pt x="3160268" y="230075"/>
+                </a:cubicBezTo>
+                <a:cubicBezTo>
+                  <a:pt x="3029639" y="99446"/>
+                  <a:pt x="2190229" y="-43277"/>
+                  <a:pt x="1868496" y="12361"/>
+                </a:cubicBezTo>
+                <a:cubicBezTo>
+                  <a:pt x="1546763" y="67999"/>
+                  <a:pt x="1433067" y="464723"/>
+                  <a:pt x="1200839" y="578418"/>
+                </a:cubicBezTo>
+                <a:close/>
+              </a:path>
+            </a:pathLst>
+          </a:custGeom>
+          <a:solidFill>
+            <a:schemeClr val="bg1">
+              <a:lumMod val="75000"/>
+            </a:schemeClr>
+          </a:solidFill>
+          <a:ln>
+            <a:solidFill>
+              <a:schemeClr val="tx1"/>
+            </a:solidFill>
+          </a:ln>
+        </p:spPr>
+        <p:style>
+          <a:lnRef idx="2">
+            <a:schemeClr val="accent1">
+              <a:shade val="50000"/>
+            </a:schemeClr>
+          </a:lnRef>
+          <a:fillRef idx="1">
+            <a:schemeClr val="accent1"/>
+          </a:fillRef>
+          <a:effectRef idx="0">
+            <a:schemeClr val="accent1"/>
+          </a:effectRef>
+          <a:fontRef idx="minor">
+            <a:schemeClr val="lt1"/>
+          </a:fontRef>
+        </p:style>
+        <p:txBody>
+          <a:bodyPr rtlCol="0" anchor="ctr"/>
+          <a:lstStyle/>
+          <a:p>
+            <a:pPr algn="ctr"/>
+            <a:endParaRPr lang="de-DE"/>
+          </a:p>
+        </p:txBody>
+      </p:sp>
+      <p:sp>
+        <p:nvSpPr>
+          <p:cNvPr id="3" name="Freihandform 2"/>
+          <p:cNvSpPr/>
+          <p:nvPr/>
+        </p:nvSpPr>
+        <p:spPr>
+          <a:xfrm>
+            <a:off x="3708520" y="2914858"/>
+            <a:ext cx="332237" cy="493053"/>
+          </a:xfrm>
+          <a:custGeom>
+            <a:avLst/>
+            <a:gdLst>
+              <a:gd name="connsiteX0" fmla="*/ 348343 w 664475"/>
+              <a:gd name="connsiteY0" fmla="*/ 89652 h 794216"/>
+              <a:gd name="connsiteX1" fmla="*/ 0 w 664475"/>
+              <a:gd name="connsiteY1" fmla="*/ 612166 h 794216"/>
+              <a:gd name="connsiteX2" fmla="*/ 348343 w 664475"/>
+              <a:gd name="connsiteY2" fmla="*/ 786337 h 794216"/>
+              <a:gd name="connsiteX3" fmla="*/ 580572 w 664475"/>
+              <a:gd name="connsiteY3" fmla="*/ 394452 h 794216"/>
+              <a:gd name="connsiteX4" fmla="*/ 653143 w 664475"/>
+              <a:gd name="connsiteY4" fmla="*/ 31594 h 794216"/>
+              <a:gd name="connsiteX5" fmla="*/ 348343 w 664475"/>
+              <a:gd name="connsiteY5" fmla="*/ 89652 h 794216"/>
+            </a:gdLst>
+            <a:ahLst/>
+            <a:cxnLst>
+              <a:cxn ang="0">
+                <a:pos x="connsiteX0" y="connsiteY0"/>
+              </a:cxn>
+              <a:cxn ang="0">
+                <a:pos x="connsiteX1" y="connsiteY1"/>
+              </a:cxn>
+              <a:cxn ang="0">
+                <a:pos x="connsiteX2" y="connsiteY2"/>
+              </a:cxn>
+              <a:cxn ang="0">
+                <a:pos x="connsiteX3" y="connsiteY3"/>
+              </a:cxn>
+              <a:cxn ang="0">
+                <a:pos x="connsiteX4" y="connsiteY4"/>
+              </a:cxn>
+              <a:cxn ang="0">
+                <a:pos x="connsiteX5" y="connsiteY5"/>
+              </a:cxn>
+            </a:cxnLst>
+            <a:rect l="l" t="t" r="r" b="b"/>
+            <a:pathLst>
+              <a:path w="664475" h="794216">
+                <a:moveTo>
+                  <a:pt x="348343" y="89652"/>
+                </a:moveTo>
+                <a:cubicBezTo>
+                  <a:pt x="239486" y="186414"/>
+                  <a:pt x="0" y="496052"/>
+                  <a:pt x="0" y="612166"/>
+                </a:cubicBezTo>
+                <a:cubicBezTo>
+                  <a:pt x="0" y="728280"/>
+                  <a:pt x="251581" y="822623"/>
+                  <a:pt x="348343" y="786337"/>
+                </a:cubicBezTo>
+                <a:cubicBezTo>
+                  <a:pt x="445105" y="750051"/>
+                  <a:pt x="529772" y="520243"/>
+                  <a:pt x="580572" y="394452"/>
+                </a:cubicBezTo>
+                <a:cubicBezTo>
+                  <a:pt x="631372" y="268661"/>
+                  <a:pt x="689429" y="87232"/>
+                  <a:pt x="653143" y="31594"/>
+                </a:cubicBezTo>
+                <a:cubicBezTo>
+                  <a:pt x="616857" y="-24044"/>
+                  <a:pt x="457200" y="-7110"/>
+                  <a:pt x="348343" y="89652"/>
+                </a:cubicBezTo>
+                <a:close/>
+              </a:path>
+            </a:pathLst>
+          </a:custGeom>
+          <a:solidFill>
+            <a:schemeClr val="bg1"/>
+          </a:solidFill>
+          <a:ln>
+            <a:solidFill>
+              <a:schemeClr val="tx1"/>
+            </a:solidFill>
+          </a:ln>
+        </p:spPr>
+        <p:style>
+          <a:lnRef idx="2">
+            <a:schemeClr val="accent1">
+              <a:shade val="50000"/>
+            </a:schemeClr>
+          </a:lnRef>
+          <a:fillRef idx="1">
+            <a:schemeClr val="accent1"/>
+          </a:fillRef>
+          <a:effectRef idx="0">
+            <a:schemeClr val="accent1"/>
+          </a:effectRef>
+          <a:fontRef idx="minor">
+            <a:schemeClr val="lt1"/>
+          </a:fontRef>
+        </p:style>
+        <p:txBody>
+          <a:bodyPr rtlCol="0" anchor="ctr"/>
+          <a:lstStyle/>
+          <a:p>
+            <a:pPr algn="ctr"/>
+            <a:endParaRPr lang="de-DE"/>
+          </a:p>
+        </p:txBody>
+      </p:sp>
+      <p:sp>
+        <p:nvSpPr>
+          <p:cNvPr id="4" name="Freihandform 3"/>
+          <p:cNvSpPr/>
+          <p:nvPr/>
+        </p:nvSpPr>
+        <p:spPr>
+          <a:xfrm>
+            <a:off x="4533438" y="2063985"/>
+            <a:ext cx="598216" cy="656225"/>
+          </a:xfrm>
+          <a:custGeom>
+            <a:avLst/>
+            <a:gdLst>
+              <a:gd name="connsiteX0" fmla="*/ 690635 w 1196433"/>
+              <a:gd name="connsiteY0" fmla="*/ 435710 h 871308"/>
+              <a:gd name="connsiteX1" fmla="*/ 211663 w 1196433"/>
+              <a:gd name="connsiteY1" fmla="*/ 871138 h 871308"/>
+              <a:gd name="connsiteX2" fmla="*/ 8463 w 1196433"/>
+              <a:gd name="connsiteY2" fmla="*/ 377653 h 871308"/>
+              <a:gd name="connsiteX3" fmla="*/ 472920 w 1196433"/>
+              <a:gd name="connsiteY3" fmla="*/ 281 h 871308"/>
+              <a:gd name="connsiteX4" fmla="*/ 1184120 w 1196433"/>
+              <a:gd name="connsiteY4" fmla="*/ 435710 h 871308"/>
+              <a:gd name="connsiteX5" fmla="*/ 908349 w 1196433"/>
+              <a:gd name="connsiteY5" fmla="*/ 638910 h 871308"/>
+              <a:gd name="connsiteX6" fmla="*/ 690635 w 1196433"/>
+              <a:gd name="connsiteY6" fmla="*/ 435710 h 871308"/>
+            </a:gdLst>
+            <a:ahLst/>
+            <a:cxnLst>
+              <a:cxn ang="0">
+                <a:pos x="connsiteX0" y="connsiteY0"/>
+              </a:cxn>
+              <a:cxn ang="0">
+                <a:pos x="connsiteX1" y="connsiteY1"/>
+              </a:cxn>
+              <a:cxn ang="0">
+                <a:pos x="connsiteX2" y="connsiteY2"/>
+              </a:cxn>
+              <a:cxn ang="0">
+                <a:pos x="connsiteX3" y="connsiteY3"/>
+              </a:cxn>
+              <a:cxn ang="0">
+                <a:pos x="connsiteX4" y="connsiteY4"/>
+              </a:cxn>
+              <a:cxn ang="0">
+                <a:pos x="connsiteX5" y="connsiteY5"/>
+              </a:cxn>
+              <a:cxn ang="0">
+                <a:pos x="connsiteX6" y="connsiteY6"/>
+              </a:cxn>
+            </a:cxnLst>
+            <a:rect l="l" t="t" r="r" b="b"/>
+            <a:pathLst>
+              <a:path w="1196433" h="871308">
+                <a:moveTo>
+                  <a:pt x="690635" y="435710"/>
+                </a:moveTo>
+                <a:cubicBezTo>
+                  <a:pt x="574521" y="474415"/>
+                  <a:pt x="325358" y="880814"/>
+                  <a:pt x="211663" y="871138"/>
+                </a:cubicBezTo>
+                <a:cubicBezTo>
+                  <a:pt x="97968" y="861462"/>
+                  <a:pt x="-35080" y="522796"/>
+                  <a:pt x="8463" y="377653"/>
+                </a:cubicBezTo>
+                <a:cubicBezTo>
+                  <a:pt x="52006" y="232510"/>
+                  <a:pt x="276977" y="-9395"/>
+                  <a:pt x="472920" y="281"/>
+                </a:cubicBezTo>
+                <a:cubicBezTo>
+                  <a:pt x="668863" y="9957"/>
+                  <a:pt x="1111549" y="329272"/>
+                  <a:pt x="1184120" y="435710"/>
+                </a:cubicBezTo>
+                <a:cubicBezTo>
+                  <a:pt x="1256692" y="542148"/>
+                  <a:pt x="988177" y="631653"/>
+                  <a:pt x="908349" y="638910"/>
+                </a:cubicBezTo>
+                <a:cubicBezTo>
+                  <a:pt x="828521" y="646167"/>
+                  <a:pt x="806749" y="397005"/>
+                  <a:pt x="690635" y="435710"/>
+                </a:cubicBezTo>
+                <a:close/>
+              </a:path>
+            </a:pathLst>
+          </a:custGeom>
+          <a:solidFill>
+            <a:schemeClr val="bg1"/>
+          </a:solidFill>
+          <a:ln>
+            <a:solidFill>
+              <a:schemeClr val="tx1"/>
+            </a:solidFill>
+          </a:ln>
+        </p:spPr>
+        <p:style>
+          <a:lnRef idx="2">
+            <a:schemeClr val="accent1">
+              <a:shade val="50000"/>
+            </a:schemeClr>
+          </a:lnRef>
+          <a:fillRef idx="1">
+            <a:schemeClr val="accent1"/>
+          </a:fillRef>
+          <a:effectRef idx="0">
+            <a:schemeClr val="accent1"/>
+          </a:effectRef>
+          <a:fontRef idx="minor">
+            <a:schemeClr val="lt1"/>
+          </a:fontRef>
+        </p:style>
+        <p:txBody>
+          <a:bodyPr rtlCol="0" anchor="ctr"/>
+          <a:lstStyle/>
+          <a:p>
+            <a:pPr algn="ctr"/>
+            <a:endParaRPr lang="de-DE"/>
+          </a:p>
+        </p:txBody>
+      </p:sp>
+      <p:cxnSp>
+        <p:nvCxnSpPr>
+          <p:cNvPr id="6" name="Gerade Verbindung mit Pfeil 5"/>
+          <p:cNvCxnSpPr/>
+          <p:nvPr/>
+        </p:nvCxnSpPr>
+        <p:spPr>
+          <a:xfrm flipV="1">
+            <a:off x="4533438" y="3068960"/>
+            <a:ext cx="2558842" cy="3096344"/>
+          </a:xfrm>
+          <a:prstGeom prst="straightConnector1">
+            <a:avLst/>
+          </a:prstGeom>
+          <a:ln w="63500">
+            <a:solidFill>
+              <a:schemeClr val="tx2">
+                <a:lumMod val="75000"/>
+              </a:schemeClr>
+            </a:solidFill>
+            <a:tailEnd type="arrow"/>
+          </a:ln>
+        </p:spPr>
+        <p:style>
+          <a:lnRef idx="1">
+            <a:schemeClr val="accent1"/>
+          </a:lnRef>
+          <a:fillRef idx="0">
+            <a:schemeClr val="accent1"/>
+          </a:fillRef>
+          <a:effectRef idx="0">
+            <a:schemeClr val="accent1"/>
+          </a:effectRef>
+          <a:fontRef idx="minor">
+            <a:schemeClr val="tx1"/>
+          </a:fontRef>
+        </p:style>
+      </p:cxnSp>
+      <p:cxnSp>
+        <p:nvCxnSpPr>
+          <p:cNvPr id="8" name="Gerade Verbindung 7"/>
+          <p:cNvCxnSpPr/>
+          <p:nvPr/>
+        </p:nvCxnSpPr>
+        <p:spPr>
+          <a:xfrm>
+            <a:off x="2267744" y="692696"/>
+            <a:ext cx="4464496" cy="4968552"/>
+          </a:xfrm>
+          <a:prstGeom prst="line">
+            <a:avLst/>
+          </a:prstGeom>
+          <a:ln w="38100">
+            <a:solidFill>
+              <a:schemeClr val="tx1"/>
+            </a:solidFill>
+            <a:tailEnd type="triangle"/>
+          </a:ln>
+        </p:spPr>
+        <p:style>
+          <a:lnRef idx="1">
+            <a:schemeClr val="accent1"/>
+          </a:lnRef>
+          <a:fillRef idx="0">
+            <a:schemeClr val="accent1"/>
+          </a:fillRef>
+          <a:effectRef idx="0">
+            <a:schemeClr val="accent1"/>
+          </a:effectRef>
+          <a:fontRef idx="minor">
+            <a:schemeClr val="tx1"/>
+          </a:fontRef>
+        </p:style>
+      </p:cxnSp>
+      <p:cxnSp>
+        <p:nvCxnSpPr>
+          <p:cNvPr id="10" name="Gerade Verbindung mit Pfeil 9"/>
+          <p:cNvCxnSpPr/>
+          <p:nvPr/>
+        </p:nvCxnSpPr>
+        <p:spPr>
+          <a:xfrm flipV="1">
+            <a:off x="1664033" y="277416"/>
+            <a:ext cx="2558842" cy="3096344"/>
+          </a:xfrm>
+          <a:prstGeom prst="straightConnector1">
+            <a:avLst/>
+          </a:prstGeom>
+          <a:ln w="38100">
+            <a:solidFill>
+              <a:srgbClr val="FF0000"/>
+            </a:solidFill>
+            <a:tailEnd type="none"/>
+          </a:ln>
+        </p:spPr>
+        <p:style>
+          <a:lnRef idx="1">
+            <a:schemeClr val="accent1"/>
+          </a:lnRef>
+          <a:fillRef idx="0">
+            <a:schemeClr val="accent1"/>
+          </a:fillRef>
+          <a:effectRef idx="0">
+            <a:schemeClr val="accent1"/>
+          </a:effectRef>
+          <a:fontRef idx="minor">
+            <a:schemeClr val="tx1"/>
+          </a:fontRef>
+        </p:style>
+      </p:cxnSp>
+      <p:cxnSp>
+        <p:nvCxnSpPr>
+          <p:cNvPr id="11" name="Gerade Verbindung mit Pfeil 10"/>
+          <p:cNvCxnSpPr/>
+          <p:nvPr/>
+        </p:nvCxnSpPr>
+        <p:spPr>
+          <a:xfrm flipV="1">
+            <a:off x="4140000" y="2914858"/>
+            <a:ext cx="2558842" cy="3096344"/>
+          </a:xfrm>
+          <a:prstGeom prst="straightConnector1">
+            <a:avLst/>
+          </a:prstGeom>
+          <a:ln w="38100">
+            <a:solidFill>
+              <a:srgbClr val="FF0000"/>
+            </a:solidFill>
+            <a:tailEnd type="none"/>
+          </a:ln>
+        </p:spPr>
+        <p:style>
+          <a:lnRef idx="1">
+            <a:schemeClr val="accent1"/>
+          </a:lnRef>
+          <a:fillRef idx="0">
+            <a:schemeClr val="accent1"/>
+          </a:fillRef>
+          <a:effectRef idx="0">
+            <a:schemeClr val="accent1"/>
+          </a:effectRef>
+          <a:fontRef idx="minor">
+            <a:schemeClr val="tx1"/>
+          </a:fontRef>
+        </p:style>
+      </p:cxnSp>
+      <p:cxnSp>
+        <p:nvCxnSpPr>
+          <p:cNvPr id="12" name="Gerade Verbindung mit Pfeil 11"/>
+          <p:cNvCxnSpPr/>
+          <p:nvPr/>
+        </p:nvCxnSpPr>
+        <p:spPr>
+          <a:xfrm flipV="1">
+            <a:off x="2431796" y="980728"/>
+            <a:ext cx="2558842" cy="3096344"/>
+          </a:xfrm>
+          <a:prstGeom prst="straightConnector1">
+            <a:avLst/>
+          </a:prstGeom>
+          <a:ln w="38100">
+            <a:solidFill>
+              <a:srgbClr val="FF0000"/>
+            </a:solidFill>
+            <a:prstDash val="dash"/>
+            <a:tailEnd type="none"/>
+          </a:ln>
+        </p:spPr>
+        <p:style>
+          <a:lnRef idx="1">
+            <a:schemeClr val="accent1"/>
+          </a:lnRef>
+          <a:fillRef idx="0">
+            <a:schemeClr val="accent1"/>
+          </a:fillRef>
+          <a:effectRef idx="0">
+            <a:schemeClr val="accent1"/>
+          </a:effectRef>
+          <a:fontRef idx="minor">
+            <a:schemeClr val="tx1"/>
+          </a:fontRef>
+        </p:style>
+      </p:cxnSp>
+      <p:cxnSp>
+        <p:nvCxnSpPr>
+          <p:cNvPr id="13" name="Gerade Verbindung mit Pfeil 12"/>
+          <p:cNvCxnSpPr/>
+          <p:nvPr/>
+        </p:nvCxnSpPr>
+        <p:spPr>
+          <a:xfrm flipV="1">
+            <a:off x="3553125" y="2130388"/>
+            <a:ext cx="2558842" cy="3096344"/>
+          </a:xfrm>
+          <a:prstGeom prst="straightConnector1">
+            <a:avLst/>
+          </a:prstGeom>
+          <a:ln w="38100">
+            <a:solidFill>
+              <a:srgbClr val="FF0000"/>
+            </a:solidFill>
+            <a:prstDash val="dash"/>
+            <a:tailEnd type="none"/>
+          </a:ln>
+        </p:spPr>
+        <p:style>
+          <a:lnRef idx="1">
+            <a:schemeClr val="accent1"/>
+          </a:lnRef>
+          <a:fillRef idx="0">
+            <a:schemeClr val="accent1"/>
+          </a:fillRef>
+          <a:effectRef idx="0">
+            <a:schemeClr val="accent1"/>
+          </a:effectRef>
+          <a:fontRef idx="minor">
+            <a:schemeClr val="tx1"/>
+          </a:fontRef>
+        </p:style>
+      </p:cxnSp>
+      <mc:AlternateContent xmlns:mc="http://schemas.openxmlformats.org/markup-compatibility/2006">
+        <mc:Choice xmlns:a14="http://schemas.microsoft.com/office/drawing/2010/main" Requires="a14">
+          <p:sp>
+            <p:nvSpPr>
+              <p:cNvPr id="14" name="Textfeld 13"/>
+              <p:cNvSpPr txBox="1"/>
+              <p:nvPr/>
+            </p:nvSpPr>
+            <p:spPr>
+              <a:xfrm>
+                <a:off x="6300192" y="3861048"/>
+                <a:ext cx="2232248" cy="506421"/>
+              </a:xfrm>
+              <a:prstGeom prst="rect">
+                <a:avLst/>
+              </a:prstGeom>
+              <a:noFill/>
+            </p:spPr>
+            <p:txBody>
+              <a:bodyPr wrap="square" rtlCol="0">
+                <a:spAutoFit/>
+              </a:bodyPr>
+              <a:lstStyle/>
+              <a:p>
+                <a14:m>
+                  <m:oMathPara xmlns:m="http://schemas.openxmlformats.org/officeDocument/2006/math">
+                    <m:oMathParaPr>
+                      <m:jc m:val="centerGroup"/>
+                    </m:oMathParaPr>
+                    <m:oMath xmlns:m="http://schemas.openxmlformats.org/officeDocument/2006/math">
+                      <m:acc>
+                        <m:accPr>
+                          <m:chr m:val="⃗"/>
+                          <m:ctrlPr>
+                            <a:rPr lang="de-DE" sz="2400" i="1" smtClean="0">
+                              <a:solidFill>
+                                <a:schemeClr val="tx2">
+                                  <a:lumMod val="75000"/>
+                                </a:schemeClr>
+                              </a:solidFill>
+                              <a:latin typeface="Cambria Math"/>
+                            </a:rPr>
+                          </m:ctrlPr>
+                        </m:accPr>
+                        <m:e>
+                          <m:r>
+                            <a:rPr lang="de-DE" sz="2400" b="0" i="1" smtClean="0">
+                              <a:solidFill>
+                                <a:schemeClr val="tx2">
+                                  <a:lumMod val="75000"/>
+                                </a:schemeClr>
+                              </a:solidFill>
+                              <a:latin typeface="Cambria Math"/>
+                            </a:rPr>
+                            <m:t>𝑅</m:t>
+                          </m:r>
+                        </m:e>
+                      </m:acc>
+                      <m:r>
+                        <a:rPr lang="de-DE" sz="2400" i="1" smtClean="0">
+                          <a:solidFill>
+                            <a:schemeClr val="tx2">
+                              <a:lumMod val="75000"/>
+                            </a:schemeClr>
+                          </a:solidFill>
+                          <a:latin typeface="Cambria Math"/>
+                        </a:rPr>
+                        <m:t>≙</m:t>
+                      </m:r>
+                      <m:r>
+                        <m:rPr>
+                          <m:sty m:val="p"/>
+                        </m:rPr>
+                        <a:rPr lang="de-DE" sz="2400" b="0" i="0" smtClean="0">
+                          <a:solidFill>
+                            <a:schemeClr val="tx2">
+                              <a:lumMod val="75000"/>
+                            </a:schemeClr>
+                          </a:solidFill>
+                          <a:latin typeface="Cambria Math"/>
+                        </a:rPr>
+                        <m:t>y</m:t>
+                      </m:r>
+                      <m:r>
+                        <a:rPr lang="de-DE" sz="2400" b="0" i="0" smtClean="0">
+                          <a:solidFill>
+                            <a:schemeClr val="tx2">
+                              <a:lumMod val="75000"/>
+                            </a:schemeClr>
+                          </a:solidFill>
+                          <a:latin typeface="Cambria Math"/>
+                        </a:rPr>
+                        <m:t>−</m:t>
+                      </m:r>
+                      <m:r>
+                        <m:rPr>
+                          <m:sty m:val="p"/>
+                        </m:rPr>
+                        <a:rPr lang="de-DE" sz="2400" b="0" i="0" smtClean="0">
+                          <a:solidFill>
+                            <a:schemeClr val="tx2">
+                              <a:lumMod val="75000"/>
+                            </a:schemeClr>
+                          </a:solidFill>
+                          <a:latin typeface="Cambria Math"/>
+                        </a:rPr>
+                        <m:t>Achse</m:t>
+                      </m:r>
+                    </m:oMath>
+                  </m:oMathPara>
+                </a14:m>
+                <a:endParaRPr lang="de-DE" sz="2400" dirty="0">
+                  <a:solidFill>
+                    <a:schemeClr val="tx2">
+                      <a:lumMod val="75000"/>
+                    </a:schemeClr>
+                  </a:solidFill>
+                </a:endParaRPr>
+              </a:p>
+            </p:txBody>
+          </p:sp>
+        </mc:Choice>
+        <mc:Fallback>
+          <p:sp>
+            <p:nvSpPr>
+              <p:cNvPr id="14" name="Textfeld 13"/>
+              <p:cNvSpPr txBox="1">
+                <a:spLocks noRot="1" noChangeAspect="1" noMove="1" noResize="1" noEditPoints="1" noAdjustHandles="1" noChangeArrowheads="1" noChangeShapeType="1" noTextEdit="1"/>
+              </p:cNvSpPr>
+              <p:nvPr/>
+            </p:nvSpPr>
+            <p:spPr>
+              <a:xfrm>
+                <a:off x="6300192" y="3861048"/>
+                <a:ext cx="2232248" cy="506421"/>
+              </a:xfrm>
+              <a:prstGeom prst="rect">
+                <a:avLst/>
+              </a:prstGeom>
+              <a:blipFill rotWithShape="1">
+                <a:blip r:embed="rId2"/>
+                <a:stretch>
+                  <a:fillRect/>
+                </a:stretch>
+              </a:blipFill>
+            </p:spPr>
+            <p:txBody>
+              <a:bodyPr/>
+              <a:lstStyle/>
+              <a:p>
+                <a:r>
+                  <a:rPr lang="de-DE">
+                    <a:noFill/>
+                  </a:rPr>
+                  <a:t> </a:t>
+                </a:r>
+              </a:p>
+            </p:txBody>
+          </p:sp>
+        </mc:Fallback>
+      </mc:AlternateContent>
+      <mc:AlternateContent xmlns:mc="http://schemas.openxmlformats.org/markup-compatibility/2006">
+        <mc:Choice xmlns:a14="http://schemas.microsoft.com/office/drawing/2010/main" Requires="a14">
+          <p:sp>
+            <p:nvSpPr>
+              <p:cNvPr id="15" name="Textfeld 14"/>
+              <p:cNvSpPr txBox="1"/>
+              <p:nvPr/>
+            </p:nvSpPr>
+            <p:spPr>
+              <a:xfrm>
+                <a:off x="847619" y="836712"/>
+                <a:ext cx="1584177" cy="461665"/>
+              </a:xfrm>
+              <a:prstGeom prst="rect">
+                <a:avLst/>
+              </a:prstGeom>
+              <a:noFill/>
+            </p:spPr>
+            <p:txBody>
+              <a:bodyPr wrap="square" rtlCol="0">
+                <a:spAutoFit/>
+              </a:bodyPr>
+              <a:lstStyle/>
+              <a:p>
+                <a14:m>
+                  <m:oMathPara xmlns:m="http://schemas.openxmlformats.org/officeDocument/2006/math">
+                    <m:oMathParaPr>
+                      <m:jc m:val="centerGroup"/>
+                    </m:oMathParaPr>
+                    <m:oMath xmlns:m="http://schemas.openxmlformats.org/officeDocument/2006/math">
+                      <m:r>
+                        <m:rPr>
+                          <m:sty m:val="p"/>
+                        </m:rPr>
+                        <a:rPr lang="de-DE" sz="2400" b="0" i="0" smtClean="0">
+                          <a:solidFill>
+                            <a:schemeClr val="tx1"/>
+                          </a:solidFill>
+                          <a:latin typeface="Cambria Math"/>
+                        </a:rPr>
+                        <m:t>t</m:t>
+                      </m:r>
+                      <m:r>
+                        <a:rPr lang="de-DE" sz="2400" smtClean="0">
+                          <a:solidFill>
+                            <a:schemeClr val="tx1"/>
+                          </a:solidFill>
+                          <a:latin typeface="Cambria Math"/>
+                        </a:rPr>
+                        <m:t>−</m:t>
+                      </m:r>
+                      <m:r>
+                        <m:rPr>
+                          <m:sty m:val="p"/>
+                        </m:rPr>
+                        <a:rPr lang="de-DE" sz="2400" smtClean="0">
+                          <a:solidFill>
+                            <a:schemeClr val="tx1"/>
+                          </a:solidFill>
+                          <a:latin typeface="Cambria Math"/>
+                        </a:rPr>
+                        <m:t>Achse</m:t>
+                      </m:r>
+                    </m:oMath>
+                  </m:oMathPara>
+                </a14:m>
+                <a:endParaRPr lang="de-DE" sz="2400" dirty="0">
+                  <a:solidFill>
+                    <a:schemeClr val="tx1"/>
+                  </a:solidFill>
+                </a:endParaRPr>
+              </a:p>
+            </p:txBody>
+          </p:sp>
+        </mc:Choice>
+        <mc:Fallback>
+          <p:sp>
+            <p:nvSpPr>
+              <p:cNvPr id="15" name="Textfeld 14"/>
+              <p:cNvSpPr txBox="1">
+                <a:spLocks noRot="1" noChangeAspect="1" noMove="1" noResize="1" noEditPoints="1" noAdjustHandles="1" noChangeArrowheads="1" noChangeShapeType="1" noTextEdit="1"/>
+              </p:cNvSpPr>
+              <p:nvPr/>
+            </p:nvSpPr>
+            <p:spPr>
+              <a:xfrm>
+                <a:off x="847619" y="836712"/>
+                <a:ext cx="1584177" cy="461665"/>
+              </a:xfrm>
+              <a:prstGeom prst="rect">
+                <a:avLst/>
+              </a:prstGeom>
+              <a:blipFill rotWithShape="1">
+                <a:blip r:embed="rId3"/>
+                <a:stretch>
+                  <a:fillRect/>
+                </a:stretch>
+              </a:blipFill>
+            </p:spPr>
+            <p:txBody>
+              <a:bodyPr/>
+              <a:lstStyle/>
+              <a:p>
+                <a:r>
+                  <a:rPr lang="de-DE">
+                    <a:noFill/>
+                  </a:rPr>
+                  <a:t> </a:t>
+                </a:r>
+              </a:p>
+            </p:txBody>
+          </p:sp>
+        </mc:Fallback>
+      </mc:AlternateContent>
+      <mc:AlternateContent xmlns:mc="http://schemas.openxmlformats.org/markup-compatibility/2006">
+        <mc:Choice xmlns:a14="http://schemas.microsoft.com/office/drawing/2010/main" Requires="a14">
+          <p:sp>
+            <p:nvSpPr>
+              <p:cNvPr id="16" name="Textfeld 15"/>
+              <p:cNvSpPr txBox="1"/>
+              <p:nvPr/>
+            </p:nvSpPr>
+            <p:spPr>
+              <a:xfrm>
+                <a:off x="1231500" y="3373760"/>
+                <a:ext cx="816414" cy="400110"/>
+              </a:xfrm>
+              <a:prstGeom prst="rect">
+                <a:avLst/>
+              </a:prstGeom>
+              <a:noFill/>
+            </p:spPr>
+            <p:txBody>
+              <a:bodyPr wrap="square" rtlCol="0">
+                <a:spAutoFit/>
+              </a:bodyPr>
+              <a:lstStyle/>
+              <a:p>
+                <a14:m>
+                  <m:oMathPara xmlns:m="http://schemas.openxmlformats.org/officeDocument/2006/math">
+                    <m:oMathParaPr>
+                      <m:jc m:val="centerGroup"/>
+                    </m:oMathParaPr>
+                    <m:oMath xmlns:m="http://schemas.openxmlformats.org/officeDocument/2006/math">
+                      <m:sSub>
+                        <m:sSubPr>
+                          <m:ctrlPr>
+                            <a:rPr lang="de-DE" sz="2000" i="1" smtClean="0">
+                              <a:solidFill>
+                                <a:srgbClr val="FF0000"/>
+                              </a:solidFill>
+                              <a:latin typeface="Cambria Math"/>
+                            </a:rPr>
+                          </m:ctrlPr>
+                        </m:sSubPr>
+                        <m:e>
+                          <m:r>
+                            <a:rPr lang="de-DE" sz="2000" b="0" i="1" smtClean="0">
+                              <a:solidFill>
+                                <a:srgbClr val="FF0000"/>
+                              </a:solidFill>
+                              <a:latin typeface="Cambria Math"/>
+                            </a:rPr>
+                            <m:t>𝑡</m:t>
+                          </m:r>
+                        </m:e>
+                        <m:sub>
+                          <m:r>
+                            <a:rPr lang="de-DE" sz="2000" b="0" i="1" smtClean="0">
+                              <a:solidFill>
+                                <a:srgbClr val="FF0000"/>
+                              </a:solidFill>
+                              <a:latin typeface="Cambria Math"/>
+                            </a:rPr>
+                            <m:t>0</m:t>
+                          </m:r>
+                        </m:sub>
+                      </m:sSub>
+                    </m:oMath>
+                  </m:oMathPara>
+                </a14:m>
+                <a:endParaRPr lang="de-DE" dirty="0"/>
+              </a:p>
+            </p:txBody>
+          </p:sp>
+        </mc:Choice>
+        <mc:Fallback>
+          <p:sp>
+            <p:nvSpPr>
+              <p:cNvPr id="16" name="Textfeld 15"/>
+              <p:cNvSpPr txBox="1">
+                <a:spLocks noRot="1" noChangeAspect="1" noMove="1" noResize="1" noEditPoints="1" noAdjustHandles="1" noChangeArrowheads="1" noChangeShapeType="1" noTextEdit="1"/>
+              </p:cNvSpPr>
+              <p:nvPr/>
+            </p:nvSpPr>
+            <p:spPr>
+              <a:xfrm>
+                <a:off x="1231500" y="3373760"/>
+                <a:ext cx="816414" cy="400110"/>
+              </a:xfrm>
+              <a:prstGeom prst="rect">
+                <a:avLst/>
+              </a:prstGeom>
+              <a:blipFill rotWithShape="1">
+                <a:blip r:embed="rId4"/>
+                <a:stretch>
+                  <a:fillRect/>
+                </a:stretch>
+              </a:blipFill>
+            </p:spPr>
+            <p:txBody>
+              <a:bodyPr/>
+              <a:lstStyle/>
+              <a:p>
+                <a:r>
+                  <a:rPr lang="de-DE">
+                    <a:noFill/>
+                  </a:rPr>
+                  <a:t> </a:t>
+                </a:r>
+              </a:p>
+            </p:txBody>
+          </p:sp>
+        </mc:Fallback>
+      </mc:AlternateContent>
+      <mc:AlternateContent xmlns:mc="http://schemas.openxmlformats.org/markup-compatibility/2006">
+        <mc:Choice xmlns:a14="http://schemas.microsoft.com/office/drawing/2010/main" Requires="a14">
+          <p:sp>
+            <p:nvSpPr>
+              <p:cNvPr id="17" name="Textfeld 16"/>
+              <p:cNvSpPr txBox="1"/>
+              <p:nvPr/>
+            </p:nvSpPr>
+            <p:spPr>
+              <a:xfrm>
+                <a:off x="1882202" y="3995576"/>
+                <a:ext cx="816414" cy="400110"/>
+              </a:xfrm>
+              <a:prstGeom prst="rect">
+                <a:avLst/>
+              </a:prstGeom>
+              <a:noFill/>
+            </p:spPr>
+            <p:txBody>
+              <a:bodyPr wrap="square" rtlCol="0">
+                <a:spAutoFit/>
+              </a:bodyPr>
+              <a:lstStyle/>
+              <a:p>
+                <a14:m>
+                  <m:oMathPara xmlns:m="http://schemas.openxmlformats.org/officeDocument/2006/math">
+                    <m:oMathParaPr>
+                      <m:jc m:val="centerGroup"/>
+                    </m:oMathParaPr>
+                    <m:oMath xmlns:m="http://schemas.openxmlformats.org/officeDocument/2006/math">
+                      <m:sSub>
+                        <m:sSubPr>
+                          <m:ctrlPr>
+                            <a:rPr lang="de-DE" sz="2000" i="1" smtClean="0">
+                              <a:solidFill>
+                                <a:srgbClr val="FF0000"/>
+                              </a:solidFill>
+                              <a:latin typeface="Cambria Math"/>
+                            </a:rPr>
+                          </m:ctrlPr>
+                        </m:sSubPr>
+                        <m:e>
+                          <m:r>
+                            <a:rPr lang="de-DE" sz="2000" b="0" i="1" smtClean="0">
+                              <a:solidFill>
+                                <a:srgbClr val="FF0000"/>
+                              </a:solidFill>
+                              <a:latin typeface="Cambria Math"/>
+                            </a:rPr>
+                            <m:t>𝑡</m:t>
+                          </m:r>
+                        </m:e>
+                        <m:sub>
+                          <m:r>
+                            <a:rPr lang="de-DE" sz="2000" b="0" i="1" smtClean="0">
+                              <a:solidFill>
+                                <a:srgbClr val="FF0000"/>
+                              </a:solidFill>
+                              <a:latin typeface="Cambria Math"/>
+                            </a:rPr>
+                            <m:t>1</m:t>
+                          </m:r>
+                        </m:sub>
+                      </m:sSub>
+                    </m:oMath>
+                  </m:oMathPara>
+                </a14:m>
+                <a:endParaRPr lang="de-DE" dirty="0"/>
+              </a:p>
+            </p:txBody>
+          </p:sp>
+        </mc:Choice>
+        <mc:Fallback>
+          <p:sp>
+            <p:nvSpPr>
+              <p:cNvPr id="17" name="Textfeld 16"/>
+              <p:cNvSpPr txBox="1">
+                <a:spLocks noRot="1" noChangeAspect="1" noMove="1" noResize="1" noEditPoints="1" noAdjustHandles="1" noChangeArrowheads="1" noChangeShapeType="1" noTextEdit="1"/>
+              </p:cNvSpPr>
+              <p:nvPr/>
+            </p:nvSpPr>
+            <p:spPr>
+              <a:xfrm>
+                <a:off x="1882202" y="3995576"/>
+                <a:ext cx="816414" cy="400110"/>
+              </a:xfrm>
+              <a:prstGeom prst="rect">
+                <a:avLst/>
+              </a:prstGeom>
+              <a:blipFill rotWithShape="1">
+                <a:blip r:embed="rId5"/>
+                <a:stretch>
+                  <a:fillRect/>
+                </a:stretch>
+              </a:blipFill>
+            </p:spPr>
+            <p:txBody>
+              <a:bodyPr/>
+              <a:lstStyle/>
+              <a:p>
+                <a:r>
+                  <a:rPr lang="de-DE">
+                    <a:noFill/>
+                  </a:rPr>
+                  <a:t> </a:t>
+                </a:r>
+              </a:p>
+            </p:txBody>
+          </p:sp>
+        </mc:Fallback>
+      </mc:AlternateContent>
+      <mc:AlternateContent xmlns:mc="http://schemas.openxmlformats.org/markup-compatibility/2006">
+        <mc:Choice xmlns:a14="http://schemas.microsoft.com/office/drawing/2010/main" Requires="a14">
+          <p:sp>
+            <p:nvSpPr>
+              <p:cNvPr id="18" name="Textfeld 17"/>
+              <p:cNvSpPr txBox="1"/>
+              <p:nvPr/>
+            </p:nvSpPr>
+            <p:spPr>
+              <a:xfrm>
+                <a:off x="2938518" y="5031411"/>
+                <a:ext cx="816414" cy="400110"/>
+              </a:xfrm>
+              <a:prstGeom prst="rect">
+                <a:avLst/>
+              </a:prstGeom>
+              <a:noFill/>
+            </p:spPr>
+            <p:txBody>
+              <a:bodyPr wrap="square" rtlCol="0">
+                <a:spAutoFit/>
+              </a:bodyPr>
+              <a:lstStyle/>
+              <a:p>
+                <a14:m>
+                  <m:oMathPara xmlns:m="http://schemas.openxmlformats.org/officeDocument/2006/math">
+                    <m:oMathParaPr>
+                      <m:jc m:val="centerGroup"/>
+                    </m:oMathParaPr>
+                    <m:oMath xmlns:m="http://schemas.openxmlformats.org/officeDocument/2006/math">
+                      <m:sSub>
+                        <m:sSubPr>
+                          <m:ctrlPr>
+                            <a:rPr lang="de-DE" sz="2000" i="1" smtClean="0">
+                              <a:solidFill>
+                                <a:srgbClr val="FF0000"/>
+                              </a:solidFill>
+                              <a:latin typeface="Cambria Math"/>
+                            </a:rPr>
+                          </m:ctrlPr>
+                        </m:sSubPr>
+                        <m:e>
+                          <m:r>
+                            <a:rPr lang="de-DE" sz="2000" b="0" i="1" smtClean="0">
+                              <a:solidFill>
+                                <a:srgbClr val="FF0000"/>
+                              </a:solidFill>
+                              <a:latin typeface="Cambria Math"/>
+                            </a:rPr>
+                            <m:t>𝑡</m:t>
+                          </m:r>
+                        </m:e>
+                        <m:sub>
+                          <m:r>
+                            <a:rPr lang="de-DE" sz="2000" b="0" i="1" smtClean="0">
+                              <a:solidFill>
+                                <a:srgbClr val="FF0000"/>
+                              </a:solidFill>
+                              <a:latin typeface="Cambria Math"/>
+                            </a:rPr>
+                            <m:t>2</m:t>
+                          </m:r>
+                        </m:sub>
+                      </m:sSub>
+                    </m:oMath>
+                  </m:oMathPara>
+                </a14:m>
+                <a:endParaRPr lang="de-DE" dirty="0"/>
+              </a:p>
+            </p:txBody>
+          </p:sp>
+        </mc:Choice>
+        <mc:Fallback>
+          <p:sp>
+            <p:nvSpPr>
+              <p:cNvPr id="18" name="Textfeld 17"/>
+              <p:cNvSpPr txBox="1">
+                <a:spLocks noRot="1" noChangeAspect="1" noMove="1" noResize="1" noEditPoints="1" noAdjustHandles="1" noChangeArrowheads="1" noChangeShapeType="1" noTextEdit="1"/>
+              </p:cNvSpPr>
+              <p:nvPr/>
+            </p:nvSpPr>
+            <p:spPr>
+              <a:xfrm>
+                <a:off x="2938518" y="5031411"/>
+                <a:ext cx="816414" cy="400110"/>
+              </a:xfrm>
+              <a:prstGeom prst="rect">
+                <a:avLst/>
+              </a:prstGeom>
+              <a:blipFill rotWithShape="1">
+                <a:blip r:embed="rId6"/>
+                <a:stretch>
+                  <a:fillRect/>
+                </a:stretch>
+              </a:blipFill>
+            </p:spPr>
+            <p:txBody>
+              <a:bodyPr/>
+              <a:lstStyle/>
+              <a:p>
+                <a:r>
+                  <a:rPr lang="de-DE">
+                    <a:noFill/>
+                  </a:rPr>
+                  <a:t> </a:t>
+                </a:r>
+              </a:p>
+            </p:txBody>
+          </p:sp>
+        </mc:Fallback>
+      </mc:AlternateContent>
+      <mc:AlternateContent xmlns:mc="http://schemas.openxmlformats.org/markup-compatibility/2006">
+        <mc:Choice xmlns:a14="http://schemas.microsoft.com/office/drawing/2010/main" Requires="a14">
+          <p:sp>
+            <p:nvSpPr>
+              <p:cNvPr id="19" name="Textfeld 18"/>
+              <p:cNvSpPr txBox="1"/>
+              <p:nvPr/>
+            </p:nvSpPr>
+            <p:spPr>
+              <a:xfrm>
+                <a:off x="3523420" y="5661248"/>
+                <a:ext cx="816414" cy="400110"/>
+              </a:xfrm>
+              <a:prstGeom prst="rect">
+                <a:avLst/>
+              </a:prstGeom>
+              <a:noFill/>
+            </p:spPr>
+            <p:txBody>
+              <a:bodyPr wrap="square" rtlCol="0">
+                <a:spAutoFit/>
+              </a:bodyPr>
+              <a:lstStyle/>
+              <a:p>
+                <a14:m>
+                  <m:oMathPara xmlns:m="http://schemas.openxmlformats.org/officeDocument/2006/math">
+                    <m:oMathParaPr>
+                      <m:jc m:val="centerGroup"/>
+                    </m:oMathParaPr>
+                    <m:oMath xmlns:m="http://schemas.openxmlformats.org/officeDocument/2006/math">
+                      <m:sSub>
+                        <m:sSubPr>
+                          <m:ctrlPr>
+                            <a:rPr lang="de-DE" sz="2000" i="1" smtClean="0">
+                              <a:solidFill>
+                                <a:srgbClr val="FF0000"/>
+                              </a:solidFill>
+                              <a:latin typeface="Cambria Math"/>
+                            </a:rPr>
+                          </m:ctrlPr>
+                        </m:sSubPr>
+                        <m:e>
+                          <m:r>
+                            <a:rPr lang="de-DE" sz="2000" b="0" i="1" smtClean="0">
+                              <a:solidFill>
+                                <a:srgbClr val="FF0000"/>
+                              </a:solidFill>
+                              <a:latin typeface="Cambria Math"/>
+                            </a:rPr>
+                            <m:t>𝑡</m:t>
+                          </m:r>
+                        </m:e>
+                        <m:sub>
+                          <m:r>
+                            <a:rPr lang="de-DE" sz="2000" b="0" i="1" smtClean="0">
+                              <a:solidFill>
+                                <a:srgbClr val="FF0000"/>
+                              </a:solidFill>
+                              <a:latin typeface="Cambria Math"/>
+                            </a:rPr>
+                            <m:t>3</m:t>
+                          </m:r>
+                        </m:sub>
+                      </m:sSub>
+                    </m:oMath>
+                  </m:oMathPara>
+                </a14:m>
+                <a:endParaRPr lang="de-DE" dirty="0"/>
+              </a:p>
+            </p:txBody>
+          </p:sp>
+        </mc:Choice>
+        <mc:Fallback>
+          <p:sp>
+            <p:nvSpPr>
+              <p:cNvPr id="19" name="Textfeld 18"/>
+              <p:cNvSpPr txBox="1">
+                <a:spLocks noRot="1" noChangeAspect="1" noMove="1" noResize="1" noEditPoints="1" noAdjustHandles="1" noChangeArrowheads="1" noChangeShapeType="1" noTextEdit="1"/>
+              </p:cNvSpPr>
+              <p:nvPr/>
+            </p:nvSpPr>
+            <p:spPr>
+              <a:xfrm>
+                <a:off x="3523420" y="5661248"/>
+                <a:ext cx="816414" cy="400110"/>
+              </a:xfrm>
+              <a:prstGeom prst="rect">
+                <a:avLst/>
+              </a:prstGeom>
+              <a:blipFill rotWithShape="1">
+                <a:blip r:embed="rId7"/>
+                <a:stretch>
+                  <a:fillRect b="-1538"/>
+                </a:stretch>
+              </a:blipFill>
+            </p:spPr>
+            <p:txBody>
+              <a:bodyPr/>
+              <a:lstStyle/>
+              <a:p>
+                <a:r>
+                  <a:rPr lang="de-DE">
+                    <a:noFill/>
+                  </a:rPr>
+                  <a:t> </a:t>
+                </a:r>
+              </a:p>
+            </p:txBody>
+          </p:sp>
+        </mc:Fallback>
+      </mc:AlternateContent>
     </p:spTree>
     <p:extLst>
       <p:ext uri="{BB962C8B-B14F-4D97-AF65-F5344CB8AC3E}">
         <p14:creationId xmlns:p14="http://schemas.microsoft.com/office/powerpoint/2010/main" val="3402120082"/>
+      </p:ext>
+    </p:extLst>
+  </p:cSld>
+  <p:clrMapOvr>
+    <a:masterClrMapping/>
+  </p:clrMapOvr>
+  <p:timing>
+    <p:tnLst>
+      <p:par>
+        <p:cTn id="1" dur="indefinite" restart="never" nodeType="tmRoot"/>
+      </p:par>
+    </p:tnLst>
+  </p:timing>
+</p:sld>
+</file>
+
+<file path=ppt/slides/slide22.xml><?xml version="1.0" encoding="utf-8"?>
+<p:sld xmlns:a="http://schemas.openxmlformats.org/drawingml/2006/main" xmlns:r="http://schemas.openxmlformats.org/officeDocument/2006/relationships" xmlns:p="http://schemas.openxmlformats.org/presentationml/2006/main">
+  <p:cSld>
+    <p:spTree>
+      <p:nvGrpSpPr>
+        <p:cNvPr id="1" name=""/>
+        <p:cNvGrpSpPr/>
+        <p:nvPr/>
+      </p:nvGrpSpPr>
+      <p:grpSpPr>
+        <a:xfrm>
+          <a:off x="0" y="0"/>
+          <a:ext cx="0" cy="0"/>
+          <a:chOff x="0" y="0"/>
+          <a:chExt cx="0" cy="0"/>
+        </a:xfrm>
+      </p:grpSpPr>
+      <p:cxnSp>
+        <p:nvCxnSpPr>
+          <p:cNvPr id="2" name="Gerade Verbindung mit Pfeil 1"/>
+          <p:cNvCxnSpPr/>
+          <p:nvPr/>
+        </p:nvCxnSpPr>
+        <p:spPr>
+          <a:xfrm flipV="1">
+            <a:off x="1664033" y="277416"/>
+            <a:ext cx="2558842" cy="3096344"/>
+          </a:xfrm>
+          <a:prstGeom prst="straightConnector1">
+            <a:avLst/>
+          </a:prstGeom>
+          <a:ln w="38100">
+            <a:solidFill>
+              <a:srgbClr val="FF0000"/>
+            </a:solidFill>
+            <a:tailEnd type="none"/>
+          </a:ln>
+        </p:spPr>
+        <p:style>
+          <a:lnRef idx="1">
+            <a:schemeClr val="accent1"/>
+          </a:lnRef>
+          <a:fillRef idx="0">
+            <a:schemeClr val="accent1"/>
+          </a:fillRef>
+          <a:effectRef idx="0">
+            <a:schemeClr val="accent1"/>
+          </a:effectRef>
+          <a:fontRef idx="minor">
+            <a:schemeClr val="tx1"/>
+          </a:fontRef>
+        </p:style>
+      </p:cxnSp>
+      <mc:AlternateContent xmlns:mc="http://schemas.openxmlformats.org/markup-compatibility/2006">
+        <mc:Choice xmlns:a14="http://schemas.microsoft.com/office/drawing/2010/main" Requires="a14">
+          <p:sp>
+            <p:nvSpPr>
+              <p:cNvPr id="3" name="Textfeld 2"/>
+              <p:cNvSpPr txBox="1"/>
+              <p:nvPr/>
+            </p:nvSpPr>
+            <p:spPr>
+              <a:xfrm>
+                <a:off x="1231500" y="3373760"/>
+                <a:ext cx="816414" cy="400110"/>
+              </a:xfrm>
+              <a:prstGeom prst="rect">
+                <a:avLst/>
+              </a:prstGeom>
+              <a:noFill/>
+            </p:spPr>
+            <p:txBody>
+              <a:bodyPr wrap="square" rtlCol="0">
+                <a:spAutoFit/>
+              </a:bodyPr>
+              <a:lstStyle/>
+              <a:p>
+                <a14:m>
+                  <m:oMathPara xmlns:m="http://schemas.openxmlformats.org/officeDocument/2006/math">
+                    <m:oMathParaPr>
+                      <m:jc m:val="centerGroup"/>
+                    </m:oMathParaPr>
+                    <m:oMath xmlns:m="http://schemas.openxmlformats.org/officeDocument/2006/math">
+                      <m:sSub>
+                        <m:sSubPr>
+                          <m:ctrlPr>
+                            <a:rPr lang="de-DE" sz="2000" i="1" smtClean="0">
+                              <a:solidFill>
+                                <a:srgbClr val="FF0000"/>
+                              </a:solidFill>
+                              <a:latin typeface="Cambria Math"/>
+                            </a:rPr>
+                          </m:ctrlPr>
+                        </m:sSubPr>
+                        <m:e>
+                          <m:r>
+                            <a:rPr lang="de-DE" sz="2000" b="0" i="1" smtClean="0">
+                              <a:solidFill>
+                                <a:srgbClr val="FF0000"/>
+                              </a:solidFill>
+                              <a:latin typeface="Cambria Math"/>
+                            </a:rPr>
+                            <m:t>𝑡</m:t>
+                          </m:r>
+                        </m:e>
+                        <m:sub>
+                          <m:r>
+                            <a:rPr lang="de-DE" sz="2000" b="0" i="1" smtClean="0">
+                              <a:solidFill>
+                                <a:srgbClr val="FF0000"/>
+                              </a:solidFill>
+                              <a:latin typeface="Cambria Math"/>
+                            </a:rPr>
+                            <m:t>0</m:t>
+                          </m:r>
+                        </m:sub>
+                      </m:sSub>
+                    </m:oMath>
+                  </m:oMathPara>
+                </a14:m>
+                <a:endParaRPr lang="de-DE" dirty="0"/>
+              </a:p>
+            </p:txBody>
+          </p:sp>
+        </mc:Choice>
+        <mc:Fallback>
+          <p:sp>
+            <p:nvSpPr>
+              <p:cNvPr id="3" name="Textfeld 2"/>
+              <p:cNvSpPr txBox="1">
+                <a:spLocks noRot="1" noChangeAspect="1" noMove="1" noResize="1" noEditPoints="1" noAdjustHandles="1" noChangeArrowheads="1" noChangeShapeType="1" noTextEdit="1"/>
+              </p:cNvSpPr>
+              <p:nvPr/>
+            </p:nvSpPr>
+            <p:spPr>
+              <a:xfrm>
+                <a:off x="1231500" y="3373760"/>
+                <a:ext cx="816414" cy="400110"/>
+              </a:xfrm>
+              <a:prstGeom prst="rect">
+                <a:avLst/>
+              </a:prstGeom>
+              <a:blipFill rotWithShape="1">
+                <a:blip r:embed="rId2"/>
+                <a:stretch>
+                  <a:fillRect/>
+                </a:stretch>
+              </a:blipFill>
+            </p:spPr>
+            <p:txBody>
+              <a:bodyPr/>
+              <a:lstStyle/>
+              <a:p>
+                <a:r>
+                  <a:rPr lang="de-DE">
+                    <a:noFill/>
+                  </a:rPr>
+                  <a:t> </a:t>
+                </a:r>
+              </a:p>
+            </p:txBody>
+          </p:sp>
+        </mc:Fallback>
+      </mc:AlternateContent>
+      <p:sp>
+        <p:nvSpPr>
+          <p:cNvPr id="4" name="Freihandform 3"/>
+          <p:cNvSpPr/>
+          <p:nvPr/>
+        </p:nvSpPr>
+        <p:spPr>
+          <a:xfrm>
+            <a:off x="2445629" y="1126892"/>
+            <a:ext cx="2277247" cy="3153254"/>
+          </a:xfrm>
+          <a:custGeom>
+            <a:avLst/>
+            <a:gdLst>
+              <a:gd name="connsiteX0" fmla="*/ 2013213 w 3363106"/>
+              <a:gd name="connsiteY0" fmla="*/ 172156 h 4094380"/>
+              <a:gd name="connsiteX1" fmla="*/ 271499 w 3363106"/>
+              <a:gd name="connsiteY1" fmla="*/ 2639585 h 4094380"/>
+              <a:gd name="connsiteX2" fmla="*/ 126356 w 3363106"/>
+              <a:gd name="connsiteY2" fmla="*/ 3974899 h 4094380"/>
+              <a:gd name="connsiteX3" fmla="*/ 1476185 w 3363106"/>
+              <a:gd name="connsiteY3" fmla="*/ 3931356 h 4094380"/>
+              <a:gd name="connsiteX4" fmla="*/ 2695385 w 3363106"/>
+              <a:gd name="connsiteY4" fmla="*/ 3104042 h 4094380"/>
+              <a:gd name="connsiteX5" fmla="*/ 2796985 w 3363106"/>
+              <a:gd name="connsiteY5" fmla="*/ 1768728 h 4094380"/>
+              <a:gd name="connsiteX6" fmla="*/ 2056756 w 3363106"/>
+              <a:gd name="connsiteY6" fmla="*/ 1812271 h 4094380"/>
+              <a:gd name="connsiteX7" fmla="*/ 2071270 w 3363106"/>
+              <a:gd name="connsiteY7" fmla="*/ 1028499 h 4094380"/>
+              <a:gd name="connsiteX8" fmla="*/ 3363042 w 3363106"/>
+              <a:gd name="connsiteY8" fmla="*/ 302785 h 4094380"/>
+              <a:gd name="connsiteX9" fmla="*/ 2013213 w 3363106"/>
+              <a:gd name="connsiteY9" fmla="*/ 172156 h 4094380"/>
+              <a:gd name="connsiteX0" fmla="*/ 2339029 w 3688922"/>
+              <a:gd name="connsiteY0" fmla="*/ 172156 h 4105915"/>
+              <a:gd name="connsiteX1" fmla="*/ 597315 w 3688922"/>
+              <a:gd name="connsiteY1" fmla="*/ 2639585 h 4105915"/>
+              <a:gd name="connsiteX2" fmla="*/ 2229 w 3688922"/>
+              <a:gd name="connsiteY2" fmla="*/ 2479928 h 4105915"/>
+              <a:gd name="connsiteX3" fmla="*/ 452172 w 3688922"/>
+              <a:gd name="connsiteY3" fmla="*/ 3974899 h 4105915"/>
+              <a:gd name="connsiteX4" fmla="*/ 1802001 w 3688922"/>
+              <a:gd name="connsiteY4" fmla="*/ 3931356 h 4105915"/>
+              <a:gd name="connsiteX5" fmla="*/ 3021201 w 3688922"/>
+              <a:gd name="connsiteY5" fmla="*/ 3104042 h 4105915"/>
+              <a:gd name="connsiteX6" fmla="*/ 3122801 w 3688922"/>
+              <a:gd name="connsiteY6" fmla="*/ 1768728 h 4105915"/>
+              <a:gd name="connsiteX7" fmla="*/ 2382572 w 3688922"/>
+              <a:gd name="connsiteY7" fmla="*/ 1812271 h 4105915"/>
+              <a:gd name="connsiteX8" fmla="*/ 2397086 w 3688922"/>
+              <a:gd name="connsiteY8" fmla="*/ 1028499 h 4105915"/>
+              <a:gd name="connsiteX9" fmla="*/ 3688858 w 3688922"/>
+              <a:gd name="connsiteY9" fmla="*/ 302785 h 4105915"/>
+              <a:gd name="connsiteX10" fmla="*/ 2339029 w 3688922"/>
+              <a:gd name="connsiteY10" fmla="*/ 172156 h 4105915"/>
+              <a:gd name="connsiteX0" fmla="*/ 2339029 w 3688922"/>
+              <a:gd name="connsiteY0" fmla="*/ 107717 h 4041476"/>
+              <a:gd name="connsiteX1" fmla="*/ 742458 w 3688922"/>
+              <a:gd name="connsiteY1" fmla="*/ 1704289 h 4041476"/>
+              <a:gd name="connsiteX2" fmla="*/ 2229 w 3688922"/>
+              <a:gd name="connsiteY2" fmla="*/ 2415489 h 4041476"/>
+              <a:gd name="connsiteX3" fmla="*/ 452172 w 3688922"/>
+              <a:gd name="connsiteY3" fmla="*/ 3910460 h 4041476"/>
+              <a:gd name="connsiteX4" fmla="*/ 1802001 w 3688922"/>
+              <a:gd name="connsiteY4" fmla="*/ 3866917 h 4041476"/>
+              <a:gd name="connsiteX5" fmla="*/ 3021201 w 3688922"/>
+              <a:gd name="connsiteY5" fmla="*/ 3039603 h 4041476"/>
+              <a:gd name="connsiteX6" fmla="*/ 3122801 w 3688922"/>
+              <a:gd name="connsiteY6" fmla="*/ 1704289 h 4041476"/>
+              <a:gd name="connsiteX7" fmla="*/ 2382572 w 3688922"/>
+              <a:gd name="connsiteY7" fmla="*/ 1747832 h 4041476"/>
+              <a:gd name="connsiteX8" fmla="*/ 2397086 w 3688922"/>
+              <a:gd name="connsiteY8" fmla="*/ 964060 h 4041476"/>
+              <a:gd name="connsiteX9" fmla="*/ 3688858 w 3688922"/>
+              <a:gd name="connsiteY9" fmla="*/ 238346 h 4041476"/>
+              <a:gd name="connsiteX10" fmla="*/ 2339029 w 3688922"/>
+              <a:gd name="connsiteY10" fmla="*/ 107717 h 4041476"/>
+              <a:gd name="connsiteX0" fmla="*/ 1916909 w 3266802"/>
+              <a:gd name="connsiteY0" fmla="*/ 107717 h 4019518"/>
+              <a:gd name="connsiteX1" fmla="*/ 320338 w 3266802"/>
+              <a:gd name="connsiteY1" fmla="*/ 1704289 h 4019518"/>
+              <a:gd name="connsiteX2" fmla="*/ 421937 w 3266802"/>
+              <a:gd name="connsiteY2" fmla="*/ 2720289 h 4019518"/>
+              <a:gd name="connsiteX3" fmla="*/ 30052 w 3266802"/>
+              <a:gd name="connsiteY3" fmla="*/ 3910460 h 4019518"/>
+              <a:gd name="connsiteX4" fmla="*/ 1379881 w 3266802"/>
+              <a:gd name="connsiteY4" fmla="*/ 3866917 h 4019518"/>
+              <a:gd name="connsiteX5" fmla="*/ 2599081 w 3266802"/>
+              <a:gd name="connsiteY5" fmla="*/ 3039603 h 4019518"/>
+              <a:gd name="connsiteX6" fmla="*/ 2700681 w 3266802"/>
+              <a:gd name="connsiteY6" fmla="*/ 1704289 h 4019518"/>
+              <a:gd name="connsiteX7" fmla="*/ 1960452 w 3266802"/>
+              <a:gd name="connsiteY7" fmla="*/ 1747832 h 4019518"/>
+              <a:gd name="connsiteX8" fmla="*/ 1974966 w 3266802"/>
+              <a:gd name="connsiteY8" fmla="*/ 964060 h 4019518"/>
+              <a:gd name="connsiteX9" fmla="*/ 3266738 w 3266802"/>
+              <a:gd name="connsiteY9" fmla="*/ 238346 h 4019518"/>
+              <a:gd name="connsiteX10" fmla="*/ 1916909 w 3266802"/>
+              <a:gd name="connsiteY10" fmla="*/ 107717 h 4019518"/>
+              <a:gd name="connsiteX0" fmla="*/ 1682412 w 3032305"/>
+              <a:gd name="connsiteY0" fmla="*/ 107717 h 3866924"/>
+              <a:gd name="connsiteX1" fmla="*/ 85841 w 3032305"/>
+              <a:gd name="connsiteY1" fmla="*/ 1704289 h 3866924"/>
+              <a:gd name="connsiteX2" fmla="*/ 187440 w 3032305"/>
+              <a:gd name="connsiteY2" fmla="*/ 2720289 h 3866924"/>
+              <a:gd name="connsiteX3" fmla="*/ 956698 w 3032305"/>
+              <a:gd name="connsiteY3" fmla="*/ 3054117 h 3866924"/>
+              <a:gd name="connsiteX4" fmla="*/ 1145384 w 3032305"/>
+              <a:gd name="connsiteY4" fmla="*/ 3866917 h 3866924"/>
+              <a:gd name="connsiteX5" fmla="*/ 2364584 w 3032305"/>
+              <a:gd name="connsiteY5" fmla="*/ 3039603 h 3866924"/>
+              <a:gd name="connsiteX6" fmla="*/ 2466184 w 3032305"/>
+              <a:gd name="connsiteY6" fmla="*/ 1704289 h 3866924"/>
+              <a:gd name="connsiteX7" fmla="*/ 1725955 w 3032305"/>
+              <a:gd name="connsiteY7" fmla="*/ 1747832 h 3866924"/>
+              <a:gd name="connsiteX8" fmla="*/ 1740469 w 3032305"/>
+              <a:gd name="connsiteY8" fmla="*/ 964060 h 3866924"/>
+              <a:gd name="connsiteX9" fmla="*/ 3032241 w 3032305"/>
+              <a:gd name="connsiteY9" fmla="*/ 238346 h 3866924"/>
+              <a:gd name="connsiteX10" fmla="*/ 1682412 w 3032305"/>
+              <a:gd name="connsiteY10" fmla="*/ 107717 h 3866924"/>
+              <a:gd name="connsiteX0" fmla="*/ 1736743 w 3086636"/>
+              <a:gd name="connsiteY0" fmla="*/ 107717 h 3866924"/>
+              <a:gd name="connsiteX1" fmla="*/ 140172 w 3086636"/>
+              <a:gd name="connsiteY1" fmla="*/ 1704289 h 3866924"/>
+              <a:gd name="connsiteX2" fmla="*/ 241771 w 3086636"/>
+              <a:gd name="connsiteY2" fmla="*/ 2720289 h 3866924"/>
+              <a:gd name="connsiteX3" fmla="*/ 1011029 w 3086636"/>
+              <a:gd name="connsiteY3" fmla="*/ 3054117 h 3866924"/>
+              <a:gd name="connsiteX4" fmla="*/ 1199715 w 3086636"/>
+              <a:gd name="connsiteY4" fmla="*/ 3866917 h 3866924"/>
+              <a:gd name="connsiteX5" fmla="*/ 2418915 w 3086636"/>
+              <a:gd name="connsiteY5" fmla="*/ 3039603 h 3866924"/>
+              <a:gd name="connsiteX6" fmla="*/ 2520515 w 3086636"/>
+              <a:gd name="connsiteY6" fmla="*/ 1704289 h 3866924"/>
+              <a:gd name="connsiteX7" fmla="*/ 1780286 w 3086636"/>
+              <a:gd name="connsiteY7" fmla="*/ 1747832 h 3866924"/>
+              <a:gd name="connsiteX8" fmla="*/ 1794800 w 3086636"/>
+              <a:gd name="connsiteY8" fmla="*/ 964060 h 3866924"/>
+              <a:gd name="connsiteX9" fmla="*/ 3086572 w 3086636"/>
+              <a:gd name="connsiteY9" fmla="*/ 238346 h 3866924"/>
+              <a:gd name="connsiteX10" fmla="*/ 1736743 w 3086636"/>
+              <a:gd name="connsiteY10" fmla="*/ 107717 h 3866924"/>
+              <a:gd name="connsiteX0" fmla="*/ 1736743 w 3086636"/>
+              <a:gd name="connsiteY0" fmla="*/ 107717 h 3866924"/>
+              <a:gd name="connsiteX1" fmla="*/ 140172 w 3086636"/>
+              <a:gd name="connsiteY1" fmla="*/ 1704289 h 3866924"/>
+              <a:gd name="connsiteX2" fmla="*/ 241771 w 3086636"/>
+              <a:gd name="connsiteY2" fmla="*/ 2720289 h 3866924"/>
+              <a:gd name="connsiteX3" fmla="*/ 1011029 w 3086636"/>
+              <a:gd name="connsiteY3" fmla="*/ 3054117 h 3866924"/>
+              <a:gd name="connsiteX4" fmla="*/ 1199715 w 3086636"/>
+              <a:gd name="connsiteY4" fmla="*/ 3866917 h 3866924"/>
+              <a:gd name="connsiteX5" fmla="*/ 2418915 w 3086636"/>
+              <a:gd name="connsiteY5" fmla="*/ 3039603 h 3866924"/>
+              <a:gd name="connsiteX6" fmla="*/ 2520515 w 3086636"/>
+              <a:gd name="connsiteY6" fmla="*/ 1704289 h 3866924"/>
+              <a:gd name="connsiteX7" fmla="*/ 1780286 w 3086636"/>
+              <a:gd name="connsiteY7" fmla="*/ 1747832 h 3866924"/>
+              <a:gd name="connsiteX8" fmla="*/ 1794800 w 3086636"/>
+              <a:gd name="connsiteY8" fmla="*/ 964060 h 3866924"/>
+              <a:gd name="connsiteX9" fmla="*/ 3086572 w 3086636"/>
+              <a:gd name="connsiteY9" fmla="*/ 238346 h 3866924"/>
+              <a:gd name="connsiteX10" fmla="*/ 1736743 w 3086636"/>
+              <a:gd name="connsiteY10" fmla="*/ 107717 h 3866924"/>
+              <a:gd name="connsiteX0" fmla="*/ 1893626 w 3243519"/>
+              <a:gd name="connsiteY0" fmla="*/ 105086 h 3864293"/>
+              <a:gd name="connsiteX1" fmla="*/ 90326 w 3243519"/>
+              <a:gd name="connsiteY1" fmla="*/ 1666083 h 3864293"/>
+              <a:gd name="connsiteX2" fmla="*/ 398654 w 3243519"/>
+              <a:gd name="connsiteY2" fmla="*/ 2717658 h 3864293"/>
+              <a:gd name="connsiteX3" fmla="*/ 1167912 w 3243519"/>
+              <a:gd name="connsiteY3" fmla="*/ 3051486 h 3864293"/>
+              <a:gd name="connsiteX4" fmla="*/ 1356598 w 3243519"/>
+              <a:gd name="connsiteY4" fmla="*/ 3864286 h 3864293"/>
+              <a:gd name="connsiteX5" fmla="*/ 2575798 w 3243519"/>
+              <a:gd name="connsiteY5" fmla="*/ 3036972 h 3864293"/>
+              <a:gd name="connsiteX6" fmla="*/ 2677398 w 3243519"/>
+              <a:gd name="connsiteY6" fmla="*/ 1701658 h 3864293"/>
+              <a:gd name="connsiteX7" fmla="*/ 1937169 w 3243519"/>
+              <a:gd name="connsiteY7" fmla="*/ 1745201 h 3864293"/>
+              <a:gd name="connsiteX8" fmla="*/ 1951683 w 3243519"/>
+              <a:gd name="connsiteY8" fmla="*/ 961429 h 3864293"/>
+              <a:gd name="connsiteX9" fmla="*/ 3243455 w 3243519"/>
+              <a:gd name="connsiteY9" fmla="*/ 235715 h 3864293"/>
+              <a:gd name="connsiteX10" fmla="*/ 1893626 w 3243519"/>
+              <a:gd name="connsiteY10" fmla="*/ 105086 h 3864293"/>
+            </a:gdLst>
+            <a:ahLst/>
+            <a:cxnLst>
+              <a:cxn ang="0">
+                <a:pos x="connsiteX0" y="connsiteY0"/>
+              </a:cxn>
+              <a:cxn ang="0">
+                <a:pos x="connsiteX1" y="connsiteY1"/>
+              </a:cxn>
+              <a:cxn ang="0">
+                <a:pos x="connsiteX2" y="connsiteY2"/>
+              </a:cxn>
+              <a:cxn ang="0">
+                <a:pos x="connsiteX3" y="connsiteY3"/>
+              </a:cxn>
+              <a:cxn ang="0">
+                <a:pos x="connsiteX4" y="connsiteY4"/>
+              </a:cxn>
+              <a:cxn ang="0">
+                <a:pos x="connsiteX5" y="connsiteY5"/>
+              </a:cxn>
+              <a:cxn ang="0">
+                <a:pos x="connsiteX6" y="connsiteY6"/>
+              </a:cxn>
+              <a:cxn ang="0">
+                <a:pos x="connsiteX7" y="connsiteY7"/>
+              </a:cxn>
+              <a:cxn ang="0">
+                <a:pos x="connsiteX8" y="connsiteY8"/>
+              </a:cxn>
+              <a:cxn ang="0">
+                <a:pos x="connsiteX9" y="connsiteY9"/>
+              </a:cxn>
+              <a:cxn ang="0">
+                <a:pos x="connsiteX10" y="connsiteY10"/>
+              </a:cxn>
+            </a:cxnLst>
+            <a:rect l="l" t="t" r="r" b="b"/>
+            <a:pathLst>
+              <a:path w="3243519" h="3864293">
+                <a:moveTo>
+                  <a:pt x="1893626" y="105086"/>
+                </a:moveTo>
+                <a:cubicBezTo>
+                  <a:pt x="1368105" y="343481"/>
+                  <a:pt x="339488" y="1230654"/>
+                  <a:pt x="90326" y="1666083"/>
+                </a:cubicBezTo>
+                <a:cubicBezTo>
+                  <a:pt x="-158836" y="2101512"/>
+                  <a:pt x="161588" y="2451564"/>
+                  <a:pt x="398654" y="2717658"/>
+                </a:cubicBezTo>
+                <a:cubicBezTo>
+                  <a:pt x="737321" y="3012781"/>
+                  <a:pt x="1008255" y="2860381"/>
+                  <a:pt x="1167912" y="3051486"/>
+                </a:cubicBezTo>
+                <a:cubicBezTo>
+                  <a:pt x="1327569" y="3242591"/>
+                  <a:pt x="1121950" y="3866705"/>
+                  <a:pt x="1356598" y="3864286"/>
+                </a:cubicBezTo>
+                <a:cubicBezTo>
+                  <a:pt x="1591246" y="3861867"/>
+                  <a:pt x="2355665" y="3397410"/>
+                  <a:pt x="2575798" y="3036972"/>
+                </a:cubicBezTo>
+                <a:cubicBezTo>
+                  <a:pt x="2795931" y="2676534"/>
+                  <a:pt x="2783836" y="1916953"/>
+                  <a:pt x="2677398" y="1701658"/>
+                </a:cubicBezTo>
+                <a:cubicBezTo>
+                  <a:pt x="2570960" y="1486363"/>
+                  <a:pt x="2058122" y="1868573"/>
+                  <a:pt x="1937169" y="1745201"/>
+                </a:cubicBezTo>
+                <a:cubicBezTo>
+                  <a:pt x="1816216" y="1621830"/>
+                  <a:pt x="1733969" y="1213010"/>
+                  <a:pt x="1951683" y="961429"/>
+                </a:cubicBezTo>
+                <a:cubicBezTo>
+                  <a:pt x="2169397" y="709848"/>
+                  <a:pt x="3253131" y="383277"/>
+                  <a:pt x="3243455" y="235715"/>
+                </a:cubicBezTo>
+                <a:cubicBezTo>
+                  <a:pt x="3233779" y="88153"/>
+                  <a:pt x="2419147" y="-133309"/>
+                  <a:pt x="1893626" y="105086"/>
+                </a:cubicBezTo>
+                <a:close/>
+              </a:path>
+            </a:pathLst>
+          </a:custGeom>
+          <a:solidFill>
+            <a:schemeClr val="bg1">
+              <a:lumMod val="75000"/>
+            </a:schemeClr>
+          </a:solidFill>
+          <a:ln>
+            <a:solidFill>
+              <a:schemeClr val="tx1"/>
+            </a:solidFill>
+          </a:ln>
+        </p:spPr>
+        <p:style>
+          <a:lnRef idx="2">
+            <a:schemeClr val="accent1">
+              <a:shade val="50000"/>
+            </a:schemeClr>
+          </a:lnRef>
+          <a:fillRef idx="1">
+            <a:schemeClr val="accent1"/>
+          </a:fillRef>
+          <a:effectRef idx="0">
+            <a:schemeClr val="accent1"/>
+          </a:effectRef>
+          <a:fontRef idx="minor">
+            <a:schemeClr val="lt1"/>
+          </a:fontRef>
+        </p:style>
+        <p:txBody>
+          <a:bodyPr rtlCol="0" anchor="ctr"/>
+          <a:lstStyle/>
+          <a:p>
+            <a:pPr algn="ctr"/>
+            <a:endParaRPr lang="de-DE"/>
+          </a:p>
+        </p:txBody>
+      </p:sp>
+      <p:cxnSp>
+        <p:nvCxnSpPr>
+          <p:cNvPr id="5" name="Gerade Verbindung mit Pfeil 4"/>
+          <p:cNvCxnSpPr/>
+          <p:nvPr/>
+        </p:nvCxnSpPr>
+        <p:spPr>
+          <a:xfrm flipV="1">
+            <a:off x="3546000" y="1440000"/>
+            <a:ext cx="2558842" cy="3096344"/>
+          </a:xfrm>
+          <a:prstGeom prst="straightConnector1">
+            <a:avLst/>
+          </a:prstGeom>
+          <a:ln w="38100">
+            <a:solidFill>
+              <a:srgbClr val="FF0000"/>
+            </a:solidFill>
+            <a:prstDash val="dash"/>
+            <a:tailEnd type="none"/>
+          </a:ln>
+        </p:spPr>
+        <p:style>
+          <a:lnRef idx="1">
+            <a:schemeClr val="accent1"/>
+          </a:lnRef>
+          <a:fillRef idx="0">
+            <a:schemeClr val="accent1"/>
+          </a:fillRef>
+          <a:effectRef idx="0">
+            <a:schemeClr val="accent1"/>
+          </a:effectRef>
+          <a:fontRef idx="minor">
+            <a:schemeClr val="tx1"/>
+          </a:fontRef>
+        </p:style>
+      </p:cxnSp>
+      <mc:AlternateContent xmlns:mc="http://schemas.openxmlformats.org/markup-compatibility/2006">
+        <mc:Choice xmlns:a14="http://schemas.microsoft.com/office/drawing/2010/main" Requires="a14">
+          <p:sp>
+            <p:nvSpPr>
+              <p:cNvPr id="6" name="Textfeld 5"/>
+              <p:cNvSpPr txBox="1"/>
+              <p:nvPr/>
+            </p:nvSpPr>
+            <p:spPr>
+              <a:xfrm>
+                <a:off x="2910053" y="4347181"/>
+                <a:ext cx="816414" cy="400110"/>
+              </a:xfrm>
+              <a:prstGeom prst="rect">
+                <a:avLst/>
+              </a:prstGeom>
+              <a:noFill/>
+            </p:spPr>
+            <p:txBody>
+              <a:bodyPr wrap="square" rtlCol="0">
+                <a:spAutoFit/>
+              </a:bodyPr>
+              <a:lstStyle/>
+              <a:p>
+                <a14:m>
+                  <m:oMathPara xmlns:m="http://schemas.openxmlformats.org/officeDocument/2006/math">
+                    <m:oMathParaPr>
+                      <m:jc m:val="centerGroup"/>
+                    </m:oMathParaPr>
+                    <m:oMath xmlns:m="http://schemas.openxmlformats.org/officeDocument/2006/math">
+                      <m:sSub>
+                        <m:sSubPr>
+                          <m:ctrlPr>
+                            <a:rPr lang="de-DE" sz="2000" i="1" smtClean="0">
+                              <a:solidFill>
+                                <a:srgbClr val="FF0000"/>
+                              </a:solidFill>
+                              <a:latin typeface="Cambria Math"/>
+                            </a:rPr>
+                          </m:ctrlPr>
+                        </m:sSubPr>
+                        <m:e>
+                          <m:r>
+                            <a:rPr lang="de-DE" sz="2000" b="0" i="1" smtClean="0">
+                              <a:solidFill>
+                                <a:srgbClr val="FF0000"/>
+                              </a:solidFill>
+                              <a:latin typeface="Cambria Math"/>
+                            </a:rPr>
+                            <m:t>𝑡</m:t>
+                          </m:r>
+                        </m:e>
+                        <m:sub>
+                          <m:r>
+                            <a:rPr lang="de-DE" sz="2000" b="0" i="1" smtClean="0">
+                              <a:solidFill>
+                                <a:srgbClr val="FF0000"/>
+                              </a:solidFill>
+                              <a:latin typeface="Cambria Math"/>
+                            </a:rPr>
+                            <m:t>1</m:t>
+                          </m:r>
+                        </m:sub>
+                      </m:sSub>
+                    </m:oMath>
+                  </m:oMathPara>
+                </a14:m>
+                <a:endParaRPr lang="de-DE" dirty="0"/>
+              </a:p>
+            </p:txBody>
+          </p:sp>
+        </mc:Choice>
+        <mc:Fallback>
+          <p:sp>
+            <p:nvSpPr>
+              <p:cNvPr id="6" name="Textfeld 5"/>
+              <p:cNvSpPr txBox="1">
+                <a:spLocks noRot="1" noChangeAspect="1" noMove="1" noResize="1" noEditPoints="1" noAdjustHandles="1" noChangeArrowheads="1" noChangeShapeType="1" noTextEdit="1"/>
+              </p:cNvSpPr>
+              <p:nvPr/>
+            </p:nvSpPr>
+            <p:spPr>
+              <a:xfrm>
+                <a:off x="2910053" y="4347181"/>
+                <a:ext cx="816414" cy="400110"/>
+              </a:xfrm>
+              <a:prstGeom prst="rect">
+                <a:avLst/>
+              </a:prstGeom>
+              <a:blipFill rotWithShape="1">
+                <a:blip r:embed="rId3"/>
+                <a:stretch>
+                  <a:fillRect/>
+                </a:stretch>
+              </a:blipFill>
+            </p:spPr>
+            <p:txBody>
+              <a:bodyPr/>
+              <a:lstStyle/>
+              <a:p>
+                <a:r>
+                  <a:rPr lang="de-DE">
+                    <a:noFill/>
+                  </a:rPr>
+                  <a:t> </a:t>
+                </a:r>
+              </a:p>
+            </p:txBody>
+          </p:sp>
+        </mc:Fallback>
+      </mc:AlternateContent>
+      <p:cxnSp>
+        <p:nvCxnSpPr>
+          <p:cNvPr id="7" name="Gerade Verbindung mit Pfeil 6"/>
+          <p:cNvCxnSpPr/>
+          <p:nvPr/>
+        </p:nvCxnSpPr>
+        <p:spPr>
+          <a:xfrm flipV="1">
+            <a:off x="3953425" y="1645501"/>
+            <a:ext cx="2558842" cy="3096344"/>
+          </a:xfrm>
+          <a:prstGeom prst="straightConnector1">
+            <a:avLst/>
+          </a:prstGeom>
+          <a:ln w="38100">
+            <a:solidFill>
+              <a:srgbClr val="FF0000"/>
+            </a:solidFill>
+            <a:prstDash val="dash"/>
+            <a:tailEnd type="none"/>
+          </a:ln>
+        </p:spPr>
+        <p:style>
+          <a:lnRef idx="1">
+            <a:schemeClr val="accent1"/>
+          </a:lnRef>
+          <a:fillRef idx="0">
+            <a:schemeClr val="accent1"/>
+          </a:fillRef>
+          <a:effectRef idx="0">
+            <a:schemeClr val="accent1"/>
+          </a:effectRef>
+          <a:fontRef idx="minor">
+            <a:schemeClr val="tx1"/>
+          </a:fontRef>
+        </p:style>
+      </p:cxnSp>
+      <mc:AlternateContent xmlns:mc="http://schemas.openxmlformats.org/markup-compatibility/2006">
+        <mc:Choice xmlns:a14="http://schemas.microsoft.com/office/drawing/2010/main" Requires="a14">
+          <p:sp>
+            <p:nvSpPr>
+              <p:cNvPr id="8" name="Textfeld 7"/>
+              <p:cNvSpPr txBox="1"/>
+              <p:nvPr/>
+            </p:nvSpPr>
+            <p:spPr>
+              <a:xfrm>
+                <a:off x="3559144" y="4747291"/>
+                <a:ext cx="816414" cy="400110"/>
+              </a:xfrm>
+              <a:prstGeom prst="rect">
+                <a:avLst/>
+              </a:prstGeom>
+              <a:noFill/>
+            </p:spPr>
+            <p:txBody>
+              <a:bodyPr wrap="square" rtlCol="0">
+                <a:spAutoFit/>
+              </a:bodyPr>
+              <a:lstStyle/>
+              <a:p>
+                <a14:m>
+                  <m:oMathPara xmlns:m="http://schemas.openxmlformats.org/officeDocument/2006/math">
+                    <m:oMathParaPr>
+                      <m:jc m:val="centerGroup"/>
+                    </m:oMathParaPr>
+                    <m:oMath xmlns:m="http://schemas.openxmlformats.org/officeDocument/2006/math">
+                      <m:sSub>
+                        <m:sSubPr>
+                          <m:ctrlPr>
+                            <a:rPr lang="de-DE" sz="2000" i="1" smtClean="0">
+                              <a:solidFill>
+                                <a:srgbClr val="FF0000"/>
+                              </a:solidFill>
+                              <a:latin typeface="Cambria Math"/>
+                            </a:rPr>
+                          </m:ctrlPr>
+                        </m:sSubPr>
+                        <m:e>
+                          <m:r>
+                            <a:rPr lang="de-DE" sz="2000" b="0" i="1" smtClean="0">
+                              <a:solidFill>
+                                <a:srgbClr val="FF0000"/>
+                              </a:solidFill>
+                              <a:latin typeface="Cambria Math"/>
+                            </a:rPr>
+                            <m:t>𝑡</m:t>
+                          </m:r>
+                        </m:e>
+                        <m:sub>
+                          <m:r>
+                            <a:rPr lang="de-DE" sz="2000" b="0" i="1" smtClean="0">
+                              <a:solidFill>
+                                <a:srgbClr val="FF0000"/>
+                              </a:solidFill>
+                              <a:latin typeface="Cambria Math"/>
+                            </a:rPr>
+                            <m:t>2</m:t>
+                          </m:r>
+                        </m:sub>
+                      </m:sSub>
+                    </m:oMath>
+                  </m:oMathPara>
+                </a14:m>
+                <a:endParaRPr lang="de-DE" dirty="0"/>
+              </a:p>
+            </p:txBody>
+          </p:sp>
+        </mc:Choice>
+        <mc:Fallback>
+          <p:sp>
+            <p:nvSpPr>
+              <p:cNvPr id="8" name="Textfeld 7"/>
+              <p:cNvSpPr txBox="1">
+                <a:spLocks noRot="1" noChangeAspect="1" noMove="1" noResize="1" noEditPoints="1" noAdjustHandles="1" noChangeArrowheads="1" noChangeShapeType="1" noTextEdit="1"/>
+              </p:cNvSpPr>
+              <p:nvPr/>
+            </p:nvSpPr>
+            <p:spPr>
+              <a:xfrm>
+                <a:off x="3559144" y="4747291"/>
+                <a:ext cx="816414" cy="400110"/>
+              </a:xfrm>
+              <a:prstGeom prst="rect">
+                <a:avLst/>
+              </a:prstGeom>
+              <a:blipFill rotWithShape="1">
+                <a:blip r:embed="rId4"/>
+                <a:stretch>
+                  <a:fillRect b="-1538"/>
+                </a:stretch>
+              </a:blipFill>
+            </p:spPr>
+            <p:txBody>
+              <a:bodyPr/>
+              <a:lstStyle/>
+              <a:p>
+                <a:r>
+                  <a:rPr lang="de-DE">
+                    <a:noFill/>
+                  </a:rPr>
+                  <a:t> </a:t>
+                </a:r>
+              </a:p>
+            </p:txBody>
+          </p:sp>
+        </mc:Fallback>
+      </mc:AlternateContent>
+      <p:sp>
+        <p:nvSpPr>
+          <p:cNvPr id="9" name="Freihandform 8"/>
+          <p:cNvSpPr/>
+          <p:nvPr/>
+        </p:nvSpPr>
+        <p:spPr>
+          <a:xfrm>
+            <a:off x="6003819" y="1846494"/>
+            <a:ext cx="1268747" cy="1444077"/>
+          </a:xfrm>
+          <a:custGeom>
+            <a:avLst/>
+            <a:gdLst>
+              <a:gd name="connsiteX0" fmla="*/ 498581 w 1268747"/>
+              <a:gd name="connsiteY0" fmla="*/ 185506 h 1444077"/>
+              <a:gd name="connsiteX1" fmla="*/ 5095 w 1268747"/>
+              <a:gd name="connsiteY1" fmla="*/ 1346649 h 1444077"/>
+              <a:gd name="connsiteX2" fmla="*/ 817895 w 1268747"/>
+              <a:gd name="connsiteY2" fmla="*/ 1303106 h 1444077"/>
+              <a:gd name="connsiteX3" fmla="*/ 1093667 w 1268747"/>
+              <a:gd name="connsiteY3" fmla="*/ 678992 h 1444077"/>
+              <a:gd name="connsiteX4" fmla="*/ 1267838 w 1268747"/>
+              <a:gd name="connsiteY4" fmla="*/ 403220 h 1444077"/>
+              <a:gd name="connsiteX5" fmla="*/ 1021095 w 1268747"/>
+              <a:gd name="connsiteY5" fmla="*/ 25849 h 1444077"/>
+              <a:gd name="connsiteX6" fmla="*/ 498581 w 1268747"/>
+              <a:gd name="connsiteY6" fmla="*/ 185506 h 1444077"/>
+            </a:gdLst>
+            <a:ahLst/>
+            <a:cxnLst>
+              <a:cxn ang="0">
+                <a:pos x="connsiteX0" y="connsiteY0"/>
+              </a:cxn>
+              <a:cxn ang="0">
+                <a:pos x="connsiteX1" y="connsiteY1"/>
+              </a:cxn>
+              <a:cxn ang="0">
+                <a:pos x="connsiteX2" y="connsiteY2"/>
+              </a:cxn>
+              <a:cxn ang="0">
+                <a:pos x="connsiteX3" y="connsiteY3"/>
+              </a:cxn>
+              <a:cxn ang="0">
+                <a:pos x="connsiteX4" y="connsiteY4"/>
+              </a:cxn>
+              <a:cxn ang="0">
+                <a:pos x="connsiteX5" y="connsiteY5"/>
+              </a:cxn>
+              <a:cxn ang="0">
+                <a:pos x="connsiteX6" y="connsiteY6"/>
+              </a:cxn>
+            </a:cxnLst>
+            <a:rect l="l" t="t" r="r" b="b"/>
+            <a:pathLst>
+              <a:path w="1268747" h="1444077">
+                <a:moveTo>
+                  <a:pt x="498581" y="185506"/>
+                </a:moveTo>
+                <a:cubicBezTo>
+                  <a:pt x="329248" y="405639"/>
+                  <a:pt x="-48124" y="1160382"/>
+                  <a:pt x="5095" y="1346649"/>
+                </a:cubicBezTo>
+                <a:cubicBezTo>
+                  <a:pt x="58314" y="1532916"/>
+                  <a:pt x="636466" y="1414382"/>
+                  <a:pt x="817895" y="1303106"/>
+                </a:cubicBezTo>
+                <a:cubicBezTo>
+                  <a:pt x="999324" y="1191830"/>
+                  <a:pt x="1018677" y="828973"/>
+                  <a:pt x="1093667" y="678992"/>
+                </a:cubicBezTo>
+                <a:cubicBezTo>
+                  <a:pt x="1168658" y="529011"/>
+                  <a:pt x="1279933" y="512077"/>
+                  <a:pt x="1267838" y="403220"/>
+                </a:cubicBezTo>
+                <a:cubicBezTo>
+                  <a:pt x="1255743" y="294363"/>
+                  <a:pt x="1146885" y="66973"/>
+                  <a:pt x="1021095" y="25849"/>
+                </a:cubicBezTo>
+                <a:cubicBezTo>
+                  <a:pt x="895305" y="-15275"/>
+                  <a:pt x="667914" y="-34627"/>
+                  <a:pt x="498581" y="185506"/>
+                </a:cubicBezTo>
+                <a:close/>
+              </a:path>
+            </a:pathLst>
+          </a:custGeom>
+          <a:solidFill>
+            <a:schemeClr val="bg1">
+              <a:lumMod val="75000"/>
+            </a:schemeClr>
+          </a:solidFill>
+          <a:ln>
+            <a:solidFill>
+              <a:schemeClr val="tx1"/>
+            </a:solidFill>
+          </a:ln>
+        </p:spPr>
+        <p:style>
+          <a:lnRef idx="2">
+            <a:schemeClr val="accent1">
+              <a:shade val="50000"/>
+            </a:schemeClr>
+          </a:lnRef>
+          <a:fillRef idx="1">
+            <a:schemeClr val="accent1"/>
+          </a:fillRef>
+          <a:effectRef idx="0">
+            <a:schemeClr val="accent1"/>
+          </a:effectRef>
+          <a:fontRef idx="minor">
+            <a:schemeClr val="lt1"/>
+          </a:fontRef>
+        </p:style>
+        <p:txBody>
+          <a:bodyPr rtlCol="0" anchor="ctr"/>
+          <a:lstStyle/>
+          <a:p>
+            <a:pPr algn="ctr"/>
+            <a:endParaRPr lang="de-DE"/>
+          </a:p>
+        </p:txBody>
+      </p:sp>
+      <p:sp>
+        <p:nvSpPr>
+          <p:cNvPr id="10" name="Freihandform 9"/>
+          <p:cNvSpPr/>
+          <p:nvPr/>
+        </p:nvSpPr>
+        <p:spPr>
+          <a:xfrm>
+            <a:off x="4755987" y="3529896"/>
+            <a:ext cx="915521" cy="869147"/>
+          </a:xfrm>
+          <a:custGeom>
+            <a:avLst/>
+            <a:gdLst>
+              <a:gd name="connsiteX0" fmla="*/ 4699 w 915521"/>
+              <a:gd name="connsiteY0" fmla="*/ 272847 h 869147"/>
+              <a:gd name="connsiteX1" fmla="*/ 353042 w 915521"/>
+              <a:gd name="connsiteY1" fmla="*/ 69647 h 869147"/>
+              <a:gd name="connsiteX2" fmla="*/ 832013 w 915521"/>
+              <a:gd name="connsiteY2" fmla="*/ 26104 h 869147"/>
+              <a:gd name="connsiteX3" fmla="*/ 890070 w 915521"/>
+              <a:gd name="connsiteY3" fmla="*/ 447018 h 869147"/>
+              <a:gd name="connsiteX4" fmla="*/ 556242 w 915521"/>
+              <a:gd name="connsiteY4" fmla="*/ 853418 h 869147"/>
+              <a:gd name="connsiteX5" fmla="*/ 178870 w 915521"/>
+              <a:gd name="connsiteY5" fmla="*/ 737304 h 869147"/>
+              <a:gd name="connsiteX6" fmla="*/ 4699 w 915521"/>
+              <a:gd name="connsiteY6" fmla="*/ 272847 h 869147"/>
+            </a:gdLst>
+            <a:ahLst/>
+            <a:cxnLst>
+              <a:cxn ang="0">
+                <a:pos x="connsiteX0" y="connsiteY0"/>
+              </a:cxn>
+              <a:cxn ang="0">
+                <a:pos x="connsiteX1" y="connsiteY1"/>
+              </a:cxn>
+              <a:cxn ang="0">
+                <a:pos x="connsiteX2" y="connsiteY2"/>
+              </a:cxn>
+              <a:cxn ang="0">
+                <a:pos x="connsiteX3" y="connsiteY3"/>
+              </a:cxn>
+              <a:cxn ang="0">
+                <a:pos x="connsiteX4" y="connsiteY4"/>
+              </a:cxn>
+              <a:cxn ang="0">
+                <a:pos x="connsiteX5" y="connsiteY5"/>
+              </a:cxn>
+              <a:cxn ang="0">
+                <a:pos x="connsiteX6" y="connsiteY6"/>
+              </a:cxn>
+            </a:cxnLst>
+            <a:rect l="l" t="t" r="r" b="b"/>
+            <a:pathLst>
+              <a:path w="915521" h="869147">
+                <a:moveTo>
+                  <a:pt x="4699" y="272847"/>
+                </a:moveTo>
+                <a:cubicBezTo>
+                  <a:pt x="33728" y="161571"/>
+                  <a:pt x="215156" y="110771"/>
+                  <a:pt x="353042" y="69647"/>
+                </a:cubicBezTo>
+                <a:cubicBezTo>
+                  <a:pt x="490928" y="28523"/>
+                  <a:pt x="742508" y="-36791"/>
+                  <a:pt x="832013" y="26104"/>
+                </a:cubicBezTo>
+                <a:cubicBezTo>
+                  <a:pt x="921518" y="88999"/>
+                  <a:pt x="936032" y="309132"/>
+                  <a:pt x="890070" y="447018"/>
+                </a:cubicBezTo>
+                <a:cubicBezTo>
+                  <a:pt x="844108" y="584904"/>
+                  <a:pt x="674775" y="805037"/>
+                  <a:pt x="556242" y="853418"/>
+                </a:cubicBezTo>
+                <a:cubicBezTo>
+                  <a:pt x="437709" y="901799"/>
+                  <a:pt x="270794" y="831647"/>
+                  <a:pt x="178870" y="737304"/>
+                </a:cubicBezTo>
+                <a:cubicBezTo>
+                  <a:pt x="86946" y="642961"/>
+                  <a:pt x="-24330" y="384123"/>
+                  <a:pt x="4699" y="272847"/>
+                </a:cubicBezTo>
+                <a:close/>
+              </a:path>
+            </a:pathLst>
+          </a:custGeom>
+          <a:solidFill>
+            <a:schemeClr val="bg1">
+              <a:lumMod val="75000"/>
+            </a:schemeClr>
+          </a:solidFill>
+          <a:ln>
+            <a:solidFill>
+              <a:schemeClr val="tx1"/>
+            </a:solidFill>
+          </a:ln>
+        </p:spPr>
+        <p:style>
+          <a:lnRef idx="2">
+            <a:schemeClr val="accent1">
+              <a:shade val="50000"/>
+            </a:schemeClr>
+          </a:lnRef>
+          <a:fillRef idx="1">
+            <a:schemeClr val="accent1"/>
+          </a:fillRef>
+          <a:effectRef idx="0">
+            <a:schemeClr val="accent1"/>
+          </a:effectRef>
+          <a:fontRef idx="minor">
+            <a:schemeClr val="lt1"/>
+          </a:fontRef>
+        </p:style>
+        <p:txBody>
+          <a:bodyPr rtlCol="0" anchor="ctr"/>
+          <a:lstStyle/>
+          <a:p>
+            <a:pPr algn="ctr"/>
+            <a:endParaRPr lang="de-DE"/>
+          </a:p>
+        </p:txBody>
+      </p:sp>
+      <p:cxnSp>
+        <p:nvCxnSpPr>
+          <p:cNvPr id="11" name="Gerade Verbindung mit Pfeil 10"/>
+          <p:cNvCxnSpPr/>
+          <p:nvPr/>
+        </p:nvCxnSpPr>
+        <p:spPr>
+          <a:xfrm flipV="1">
+            <a:off x="5358771" y="1881968"/>
+            <a:ext cx="2558842" cy="3096344"/>
+          </a:xfrm>
+          <a:prstGeom prst="straightConnector1">
+            <a:avLst/>
+          </a:prstGeom>
+          <a:ln w="38100">
+            <a:solidFill>
+              <a:srgbClr val="FF0000"/>
+            </a:solidFill>
+            <a:tailEnd type="none"/>
+          </a:ln>
+        </p:spPr>
+        <p:style>
+          <a:lnRef idx="1">
+            <a:schemeClr val="accent1"/>
+          </a:lnRef>
+          <a:fillRef idx="0">
+            <a:schemeClr val="accent1"/>
+          </a:fillRef>
+          <a:effectRef idx="0">
+            <a:schemeClr val="accent1"/>
+          </a:effectRef>
+          <a:fontRef idx="minor">
+            <a:schemeClr val="tx1"/>
+          </a:fontRef>
+        </p:style>
+      </p:cxnSp>
+      <mc:AlternateContent xmlns:mc="http://schemas.openxmlformats.org/markup-compatibility/2006">
+        <mc:Choice xmlns:a14="http://schemas.microsoft.com/office/drawing/2010/main" Requires="a14">
+          <p:sp>
+            <p:nvSpPr>
+              <p:cNvPr id="12" name="Textfeld 11"/>
+              <p:cNvSpPr txBox="1"/>
+              <p:nvPr/>
+            </p:nvSpPr>
+            <p:spPr>
+              <a:xfrm>
+                <a:off x="4926238" y="4978312"/>
+                <a:ext cx="816414" cy="400110"/>
+              </a:xfrm>
+              <a:prstGeom prst="rect">
+                <a:avLst/>
+              </a:prstGeom>
+              <a:noFill/>
+            </p:spPr>
+            <p:txBody>
+              <a:bodyPr wrap="square" rtlCol="0">
+                <a:spAutoFit/>
+              </a:bodyPr>
+              <a:lstStyle/>
+              <a:p>
+                <a14:m>
+                  <m:oMathPara xmlns:m="http://schemas.openxmlformats.org/officeDocument/2006/math">
+                    <m:oMathParaPr>
+                      <m:jc m:val="centerGroup"/>
+                    </m:oMathParaPr>
+                    <m:oMath xmlns:m="http://schemas.openxmlformats.org/officeDocument/2006/math">
+                      <m:sSub>
+                        <m:sSubPr>
+                          <m:ctrlPr>
+                            <a:rPr lang="de-DE" sz="2000" i="1" smtClean="0">
+                              <a:solidFill>
+                                <a:srgbClr val="FF0000"/>
+                              </a:solidFill>
+                              <a:latin typeface="Cambria Math"/>
+                            </a:rPr>
+                          </m:ctrlPr>
+                        </m:sSubPr>
+                        <m:e>
+                          <m:r>
+                            <a:rPr lang="de-DE" sz="2000" b="0" i="1" smtClean="0">
+                              <a:solidFill>
+                                <a:srgbClr val="FF0000"/>
+                              </a:solidFill>
+                              <a:latin typeface="Cambria Math"/>
+                            </a:rPr>
+                            <m:t>𝑡</m:t>
+                          </m:r>
+                        </m:e>
+                        <m:sub>
+                          <m:r>
+                            <a:rPr lang="de-DE" sz="2000" b="0" i="1" smtClean="0">
+                              <a:solidFill>
+                                <a:srgbClr val="FF0000"/>
+                              </a:solidFill>
+                              <a:latin typeface="Cambria Math"/>
+                            </a:rPr>
+                            <m:t>3</m:t>
+                          </m:r>
+                        </m:sub>
+                      </m:sSub>
+                    </m:oMath>
+                  </m:oMathPara>
+                </a14:m>
+                <a:endParaRPr lang="de-DE" dirty="0"/>
+              </a:p>
+            </p:txBody>
+          </p:sp>
+        </mc:Choice>
+        <mc:Fallback>
+          <p:sp>
+            <p:nvSpPr>
+              <p:cNvPr id="12" name="Textfeld 11"/>
+              <p:cNvSpPr txBox="1">
+                <a:spLocks noRot="1" noChangeAspect="1" noMove="1" noResize="1" noEditPoints="1" noAdjustHandles="1" noChangeArrowheads="1" noChangeShapeType="1" noTextEdit="1"/>
+              </p:cNvSpPr>
+              <p:nvPr/>
+            </p:nvSpPr>
+            <p:spPr>
+              <a:xfrm>
+                <a:off x="4926238" y="4978312"/>
+                <a:ext cx="816414" cy="400110"/>
+              </a:xfrm>
+              <a:prstGeom prst="rect">
+                <a:avLst/>
+              </a:prstGeom>
+              <a:blipFill rotWithShape="1">
+                <a:blip r:embed="rId5"/>
+                <a:stretch>
+                  <a:fillRect b="-1538"/>
+                </a:stretch>
+              </a:blipFill>
+            </p:spPr>
+            <p:txBody>
+              <a:bodyPr/>
+              <a:lstStyle/>
+              <a:p>
+                <a:r>
+                  <a:rPr lang="de-DE">
+                    <a:noFill/>
+                  </a:rPr>
+                  <a:t> </a:t>
+                </a:r>
+              </a:p>
+            </p:txBody>
+          </p:sp>
+        </mc:Fallback>
+      </mc:AlternateContent>
+    </p:spTree>
+    <p:extLst>
+      <p:ext uri="{BB962C8B-B14F-4D97-AF65-F5344CB8AC3E}">
+        <p14:creationId xmlns:p14="http://schemas.microsoft.com/office/powerpoint/2010/main" val="3030197453"/>
+      </p:ext>
+    </p:extLst>
+  </p:cSld>
+  <p:clrMapOvr>
+    <a:masterClrMapping/>
+  </p:clrMapOvr>
+  <p:timing>
+    <p:tnLst>
+      <p:par>
+        <p:cTn id="1" dur="indefinite" restart="never" nodeType="tmRoot"/>
+      </p:par>
+    </p:tnLst>
+  </p:timing>
+</p:sld>
+</file>
+
+<file path=ppt/slides/slide23.xml><?xml version="1.0" encoding="utf-8"?>
+<p:sld xmlns:a="http://schemas.openxmlformats.org/drawingml/2006/main" xmlns:r="http://schemas.openxmlformats.org/officeDocument/2006/relationships" xmlns:p="http://schemas.openxmlformats.org/presentationml/2006/main">
+  <p:cSld>
+    <p:spTree>
+      <p:nvGrpSpPr>
+        <p:cNvPr id="1" name=""/>
+        <p:cNvGrpSpPr/>
+        <p:nvPr/>
+      </p:nvGrpSpPr>
+      <p:grpSpPr>
+        <a:xfrm>
+          <a:off x="0" y="0"/>
+          <a:ext cx="0" cy="0"/>
+          <a:chOff x="0" y="0"/>
+          <a:chExt cx="0" cy="0"/>
+        </a:xfrm>
+      </p:grpSpPr>
+      <p:cxnSp>
+        <p:nvCxnSpPr>
+          <p:cNvPr id="4" name="Gerade Verbindung 3"/>
+          <p:cNvCxnSpPr/>
+          <p:nvPr/>
+        </p:nvCxnSpPr>
+        <p:spPr>
+          <a:xfrm>
+            <a:off x="3160948" y="1183000"/>
+            <a:ext cx="0" cy="4260847"/>
+          </a:xfrm>
+          <a:prstGeom prst="line">
+            <a:avLst/>
+          </a:prstGeom>
+          <a:noFill/>
+          <a:ln w="63500">
+            <a:solidFill>
+              <a:schemeClr val="accent1">
+                <a:lumMod val="75000"/>
+              </a:schemeClr>
+            </a:solidFill>
+            <a:headEnd type="triangle" w="lg" len="lg"/>
+            <a:tailEnd type="none" w="lg" len="lg"/>
+          </a:ln>
+        </p:spPr>
+        <p:style>
+          <a:lnRef idx="2">
+            <a:schemeClr val="accent1">
+              <a:shade val="50000"/>
+            </a:schemeClr>
+          </a:lnRef>
+          <a:fillRef idx="1">
+            <a:schemeClr val="accent1"/>
+          </a:fillRef>
+          <a:effectRef idx="0">
+            <a:schemeClr val="accent1"/>
+          </a:effectRef>
+          <a:fontRef idx="minor">
+            <a:schemeClr val="lt1"/>
+          </a:fontRef>
+        </p:style>
+      </p:cxnSp>
+      <p:cxnSp>
+        <p:nvCxnSpPr>
+          <p:cNvPr id="5" name="Gerade Verbindung 4"/>
+          <p:cNvCxnSpPr/>
+          <p:nvPr/>
+        </p:nvCxnSpPr>
+        <p:spPr>
+          <a:xfrm>
+            <a:off x="1043608" y="5013176"/>
+            <a:ext cx="7128792" cy="0"/>
+          </a:xfrm>
+          <a:prstGeom prst="line">
+            <a:avLst/>
+          </a:prstGeom>
+          <a:noFill/>
+          <a:ln w="63500">
+            <a:solidFill>
+              <a:schemeClr val="accent1">
+                <a:lumMod val="75000"/>
+              </a:schemeClr>
+            </a:solidFill>
+            <a:headEnd type="none"/>
+            <a:tailEnd type="triangle" w="lg" len="lg"/>
+          </a:ln>
+        </p:spPr>
+        <p:style>
+          <a:lnRef idx="2">
+            <a:schemeClr val="accent1">
+              <a:shade val="50000"/>
+            </a:schemeClr>
+          </a:lnRef>
+          <a:fillRef idx="1">
+            <a:schemeClr val="accent1"/>
+          </a:fillRef>
+          <a:effectRef idx="0">
+            <a:schemeClr val="accent1"/>
+          </a:effectRef>
+          <a:fontRef idx="minor">
+            <a:schemeClr val="lt1"/>
+          </a:fontRef>
+        </p:style>
+      </p:cxnSp>
+      <p:cxnSp>
+        <p:nvCxnSpPr>
+          <p:cNvPr id="9" name="Gerade Verbindung 8"/>
+          <p:cNvCxnSpPr/>
+          <p:nvPr/>
+        </p:nvCxnSpPr>
+        <p:spPr>
+          <a:xfrm>
+            <a:off x="1907704" y="4833156"/>
+            <a:ext cx="0" cy="360040"/>
+          </a:xfrm>
+          <a:prstGeom prst="line">
+            <a:avLst/>
+          </a:prstGeom>
+          <a:ln w="50800">
+            <a:solidFill>
+              <a:srgbClr val="FF0000"/>
+            </a:solidFill>
+          </a:ln>
+        </p:spPr>
+        <p:style>
+          <a:lnRef idx="1">
+            <a:schemeClr val="accent1"/>
+          </a:lnRef>
+          <a:fillRef idx="0">
+            <a:schemeClr val="accent1"/>
+          </a:fillRef>
+          <a:effectRef idx="0">
+            <a:schemeClr val="accent1"/>
+          </a:effectRef>
+          <a:fontRef idx="minor">
+            <a:schemeClr val="tx1"/>
+          </a:fontRef>
+        </p:style>
+      </p:cxnSp>
+      <p:cxnSp>
+        <p:nvCxnSpPr>
+          <p:cNvPr id="10" name="Gerade Verbindung 9"/>
+          <p:cNvCxnSpPr/>
+          <p:nvPr/>
+        </p:nvCxnSpPr>
+        <p:spPr>
+          <a:xfrm>
+            <a:off x="4139952" y="4833156"/>
+            <a:ext cx="0" cy="360040"/>
+          </a:xfrm>
+          <a:prstGeom prst="line">
+            <a:avLst/>
+          </a:prstGeom>
+          <a:ln w="50800">
+            <a:solidFill>
+              <a:srgbClr val="FF0000"/>
+            </a:solidFill>
+          </a:ln>
+        </p:spPr>
+        <p:style>
+          <a:lnRef idx="1">
+            <a:schemeClr val="accent1"/>
+          </a:lnRef>
+          <a:fillRef idx="0">
+            <a:schemeClr val="accent1"/>
+          </a:fillRef>
+          <a:effectRef idx="0">
+            <a:schemeClr val="accent1"/>
+          </a:effectRef>
+          <a:fontRef idx="minor">
+            <a:schemeClr val="tx1"/>
+          </a:fontRef>
+        </p:style>
+      </p:cxnSp>
+      <p:cxnSp>
+        <p:nvCxnSpPr>
+          <p:cNvPr id="11" name="Gerade Verbindung 10"/>
+          <p:cNvCxnSpPr/>
+          <p:nvPr/>
+        </p:nvCxnSpPr>
+        <p:spPr>
+          <a:xfrm>
+            <a:off x="5004048" y="4833156"/>
+            <a:ext cx="0" cy="360040"/>
+          </a:xfrm>
+          <a:prstGeom prst="line">
+            <a:avLst/>
+          </a:prstGeom>
+          <a:ln w="50800">
+            <a:solidFill>
+              <a:srgbClr val="FF0000"/>
+            </a:solidFill>
+          </a:ln>
+        </p:spPr>
+        <p:style>
+          <a:lnRef idx="1">
+            <a:schemeClr val="accent1"/>
+          </a:lnRef>
+          <a:fillRef idx="0">
+            <a:schemeClr val="accent1"/>
+          </a:fillRef>
+          <a:effectRef idx="0">
+            <a:schemeClr val="accent1"/>
+          </a:effectRef>
+          <a:fontRef idx="minor">
+            <a:schemeClr val="tx1"/>
+          </a:fontRef>
+        </p:style>
+      </p:cxnSp>
+      <p:cxnSp>
+        <p:nvCxnSpPr>
+          <p:cNvPr id="12" name="Gerade Verbindung 11"/>
+          <p:cNvCxnSpPr/>
+          <p:nvPr/>
+        </p:nvCxnSpPr>
+        <p:spPr>
+          <a:xfrm>
+            <a:off x="6660232" y="4833156"/>
+            <a:ext cx="0" cy="360040"/>
+          </a:xfrm>
+          <a:prstGeom prst="line">
+            <a:avLst/>
+          </a:prstGeom>
+          <a:ln w="50800">
+            <a:solidFill>
+              <a:srgbClr val="FF0000"/>
+            </a:solidFill>
+          </a:ln>
+        </p:spPr>
+        <p:style>
+          <a:lnRef idx="1">
+            <a:schemeClr val="accent1"/>
+          </a:lnRef>
+          <a:fillRef idx="0">
+            <a:schemeClr val="accent1"/>
+          </a:fillRef>
+          <a:effectRef idx="0">
+            <a:schemeClr val="accent1"/>
+          </a:effectRef>
+          <a:fontRef idx="minor">
+            <a:schemeClr val="tx1"/>
+          </a:fontRef>
+        </p:style>
+      </p:cxnSp>
+      <mc:AlternateContent xmlns:mc="http://schemas.openxmlformats.org/markup-compatibility/2006">
+        <mc:Choice xmlns:a14="http://schemas.microsoft.com/office/drawing/2010/main" Requires="a14">
+          <p:sp>
+            <p:nvSpPr>
+              <p:cNvPr id="13" name="Textfeld 12"/>
+              <p:cNvSpPr txBox="1"/>
+              <p:nvPr/>
+            </p:nvSpPr>
+            <p:spPr>
+              <a:xfrm>
+                <a:off x="1499497" y="5243792"/>
+                <a:ext cx="816414" cy="400110"/>
+              </a:xfrm>
+              <a:prstGeom prst="rect">
+                <a:avLst/>
+              </a:prstGeom>
+              <a:noFill/>
+            </p:spPr>
+            <p:txBody>
+              <a:bodyPr wrap="square" rtlCol="0">
+                <a:spAutoFit/>
+              </a:bodyPr>
+              <a:lstStyle/>
+              <a:p>
+                <a14:m>
+                  <m:oMathPara xmlns:m="http://schemas.openxmlformats.org/officeDocument/2006/math">
+                    <m:oMathParaPr>
+                      <m:jc m:val="centerGroup"/>
+                    </m:oMathParaPr>
+                    <m:oMath xmlns:m="http://schemas.openxmlformats.org/officeDocument/2006/math">
+                      <m:sSub>
+                        <m:sSubPr>
+                          <m:ctrlPr>
+                            <a:rPr lang="de-DE" sz="2000" i="1" smtClean="0">
+                              <a:solidFill>
+                                <a:srgbClr val="FF0000"/>
+                              </a:solidFill>
+                              <a:latin typeface="Cambria Math"/>
+                            </a:rPr>
+                          </m:ctrlPr>
+                        </m:sSubPr>
+                        <m:e>
+                          <m:r>
+                            <a:rPr lang="de-DE" sz="2000" b="0" i="1" smtClean="0">
+                              <a:solidFill>
+                                <a:srgbClr val="FF0000"/>
+                              </a:solidFill>
+                              <a:latin typeface="Cambria Math"/>
+                            </a:rPr>
+                            <m:t>𝑡</m:t>
+                          </m:r>
+                        </m:e>
+                        <m:sub>
+                          <m:r>
+                            <a:rPr lang="de-DE" sz="2000" b="0" i="1" smtClean="0">
+                              <a:solidFill>
+                                <a:srgbClr val="FF0000"/>
+                              </a:solidFill>
+                              <a:latin typeface="Cambria Math"/>
+                            </a:rPr>
+                            <m:t>0</m:t>
+                          </m:r>
+                        </m:sub>
+                      </m:sSub>
+                    </m:oMath>
+                  </m:oMathPara>
+                </a14:m>
+                <a:endParaRPr lang="de-DE" dirty="0"/>
+              </a:p>
+            </p:txBody>
+          </p:sp>
+        </mc:Choice>
+        <mc:Fallback>
+          <p:sp>
+            <p:nvSpPr>
+              <p:cNvPr id="13" name="Textfeld 12"/>
+              <p:cNvSpPr txBox="1">
+                <a:spLocks noRot="1" noChangeAspect="1" noMove="1" noResize="1" noEditPoints="1" noAdjustHandles="1" noChangeArrowheads="1" noChangeShapeType="1" noTextEdit="1"/>
+              </p:cNvSpPr>
+              <p:nvPr/>
+            </p:nvSpPr>
+            <p:spPr>
+              <a:xfrm>
+                <a:off x="1499497" y="5243792"/>
+                <a:ext cx="816414" cy="400110"/>
+              </a:xfrm>
+              <a:prstGeom prst="rect">
+                <a:avLst/>
+              </a:prstGeom>
+              <a:blipFill rotWithShape="1">
+                <a:blip r:embed="rId2"/>
+                <a:stretch>
+                  <a:fillRect/>
+                </a:stretch>
+              </a:blipFill>
+            </p:spPr>
+            <p:txBody>
+              <a:bodyPr/>
+              <a:lstStyle/>
+              <a:p>
+                <a:r>
+                  <a:rPr lang="de-DE">
+                    <a:noFill/>
+                  </a:rPr>
+                  <a:t> </a:t>
+                </a:r>
+              </a:p>
+            </p:txBody>
+          </p:sp>
+        </mc:Fallback>
+      </mc:AlternateContent>
+      <mc:AlternateContent xmlns:mc="http://schemas.openxmlformats.org/markup-compatibility/2006">
+        <mc:Choice xmlns:a14="http://schemas.microsoft.com/office/drawing/2010/main" Requires="a14">
+          <p:sp>
+            <p:nvSpPr>
+              <p:cNvPr id="14" name="Textfeld 13"/>
+              <p:cNvSpPr txBox="1"/>
+              <p:nvPr/>
+            </p:nvSpPr>
+            <p:spPr>
+              <a:xfrm>
+                <a:off x="3731745" y="5229319"/>
+                <a:ext cx="816414" cy="400110"/>
+              </a:xfrm>
+              <a:prstGeom prst="rect">
+                <a:avLst/>
+              </a:prstGeom>
+              <a:noFill/>
+            </p:spPr>
+            <p:txBody>
+              <a:bodyPr wrap="square" rtlCol="0">
+                <a:spAutoFit/>
+              </a:bodyPr>
+              <a:lstStyle/>
+              <a:p>
+                <a14:m>
+                  <m:oMathPara xmlns:m="http://schemas.openxmlformats.org/officeDocument/2006/math">
+                    <m:oMathParaPr>
+                      <m:jc m:val="centerGroup"/>
+                    </m:oMathParaPr>
+                    <m:oMath xmlns:m="http://schemas.openxmlformats.org/officeDocument/2006/math">
+                      <m:sSub>
+                        <m:sSubPr>
+                          <m:ctrlPr>
+                            <a:rPr lang="de-DE" sz="2000" i="1" smtClean="0">
+                              <a:solidFill>
+                                <a:srgbClr val="FF0000"/>
+                              </a:solidFill>
+                              <a:latin typeface="Cambria Math"/>
+                            </a:rPr>
+                          </m:ctrlPr>
+                        </m:sSubPr>
+                        <m:e>
+                          <m:r>
+                            <a:rPr lang="de-DE" sz="2000" b="0" i="1" smtClean="0">
+                              <a:solidFill>
+                                <a:srgbClr val="FF0000"/>
+                              </a:solidFill>
+                              <a:latin typeface="Cambria Math"/>
+                            </a:rPr>
+                            <m:t>𝑡</m:t>
+                          </m:r>
+                        </m:e>
+                        <m:sub>
+                          <m:r>
+                            <a:rPr lang="de-DE" sz="2000" b="0" i="1" smtClean="0">
+                              <a:solidFill>
+                                <a:srgbClr val="FF0000"/>
+                              </a:solidFill>
+                              <a:latin typeface="Cambria Math"/>
+                            </a:rPr>
+                            <m:t>1</m:t>
+                          </m:r>
+                        </m:sub>
+                      </m:sSub>
+                    </m:oMath>
+                  </m:oMathPara>
+                </a14:m>
+                <a:endParaRPr lang="de-DE" dirty="0"/>
+              </a:p>
+            </p:txBody>
+          </p:sp>
+        </mc:Choice>
+        <mc:Fallback>
+          <p:sp>
+            <p:nvSpPr>
+              <p:cNvPr id="14" name="Textfeld 13"/>
+              <p:cNvSpPr txBox="1">
+                <a:spLocks noRot="1" noChangeAspect="1" noMove="1" noResize="1" noEditPoints="1" noAdjustHandles="1" noChangeArrowheads="1" noChangeShapeType="1" noTextEdit="1"/>
+              </p:cNvSpPr>
+              <p:nvPr/>
+            </p:nvSpPr>
+            <p:spPr>
+              <a:xfrm>
+                <a:off x="3731745" y="5229319"/>
+                <a:ext cx="816414" cy="400110"/>
+              </a:xfrm>
+              <a:prstGeom prst="rect">
+                <a:avLst/>
+              </a:prstGeom>
+              <a:blipFill rotWithShape="1">
+                <a:blip r:embed="rId3"/>
+                <a:stretch>
+                  <a:fillRect/>
+                </a:stretch>
+              </a:blipFill>
+            </p:spPr>
+            <p:txBody>
+              <a:bodyPr/>
+              <a:lstStyle/>
+              <a:p>
+                <a:r>
+                  <a:rPr lang="de-DE">
+                    <a:noFill/>
+                  </a:rPr>
+                  <a:t> </a:t>
+                </a:r>
+              </a:p>
+            </p:txBody>
+          </p:sp>
+        </mc:Fallback>
+      </mc:AlternateContent>
+      <mc:AlternateContent xmlns:mc="http://schemas.openxmlformats.org/markup-compatibility/2006">
+        <mc:Choice xmlns:a14="http://schemas.microsoft.com/office/drawing/2010/main" Requires="a14">
+          <p:sp>
+            <p:nvSpPr>
+              <p:cNvPr id="15" name="Textfeld 14"/>
+              <p:cNvSpPr txBox="1"/>
+              <p:nvPr/>
+            </p:nvSpPr>
+            <p:spPr>
+              <a:xfrm>
+                <a:off x="4608004" y="5229319"/>
+                <a:ext cx="816414" cy="400110"/>
+              </a:xfrm>
+              <a:prstGeom prst="rect">
+                <a:avLst/>
+              </a:prstGeom>
+              <a:noFill/>
+            </p:spPr>
+            <p:txBody>
+              <a:bodyPr wrap="square" rtlCol="0">
+                <a:spAutoFit/>
+              </a:bodyPr>
+              <a:lstStyle/>
+              <a:p>
+                <a14:m>
+                  <m:oMathPara xmlns:m="http://schemas.openxmlformats.org/officeDocument/2006/math">
+                    <m:oMathParaPr>
+                      <m:jc m:val="centerGroup"/>
+                    </m:oMathParaPr>
+                    <m:oMath xmlns:m="http://schemas.openxmlformats.org/officeDocument/2006/math">
+                      <m:sSub>
+                        <m:sSubPr>
+                          <m:ctrlPr>
+                            <a:rPr lang="de-DE" sz="2000" i="1" smtClean="0">
+                              <a:solidFill>
+                                <a:srgbClr val="FF0000"/>
+                              </a:solidFill>
+                              <a:latin typeface="Cambria Math"/>
+                            </a:rPr>
+                          </m:ctrlPr>
+                        </m:sSubPr>
+                        <m:e>
+                          <m:r>
+                            <a:rPr lang="de-DE" sz="2000" b="0" i="1" smtClean="0">
+                              <a:solidFill>
+                                <a:srgbClr val="FF0000"/>
+                              </a:solidFill>
+                              <a:latin typeface="Cambria Math"/>
+                            </a:rPr>
+                            <m:t>𝑡</m:t>
+                          </m:r>
+                        </m:e>
+                        <m:sub>
+                          <m:r>
+                            <a:rPr lang="de-DE" sz="2000" b="0" i="1" smtClean="0">
+                              <a:solidFill>
+                                <a:srgbClr val="FF0000"/>
+                              </a:solidFill>
+                              <a:latin typeface="Cambria Math"/>
+                            </a:rPr>
+                            <m:t>2</m:t>
+                          </m:r>
+                        </m:sub>
+                      </m:sSub>
+                    </m:oMath>
+                  </m:oMathPara>
+                </a14:m>
+                <a:endParaRPr lang="de-DE" dirty="0"/>
+              </a:p>
+            </p:txBody>
+          </p:sp>
+        </mc:Choice>
+        <mc:Fallback>
+          <p:sp>
+            <p:nvSpPr>
+              <p:cNvPr id="15" name="Textfeld 14"/>
+              <p:cNvSpPr txBox="1">
+                <a:spLocks noRot="1" noChangeAspect="1" noMove="1" noResize="1" noEditPoints="1" noAdjustHandles="1" noChangeArrowheads="1" noChangeShapeType="1" noTextEdit="1"/>
+              </p:cNvSpPr>
+              <p:nvPr/>
+            </p:nvSpPr>
+            <p:spPr>
+              <a:xfrm>
+                <a:off x="4608004" y="5229319"/>
+                <a:ext cx="816414" cy="400110"/>
+              </a:xfrm>
+              <a:prstGeom prst="rect">
+                <a:avLst/>
+              </a:prstGeom>
+              <a:blipFill rotWithShape="1">
+                <a:blip r:embed="rId4"/>
+                <a:stretch>
+                  <a:fillRect b="-1538"/>
+                </a:stretch>
+              </a:blipFill>
+            </p:spPr>
+            <p:txBody>
+              <a:bodyPr/>
+              <a:lstStyle/>
+              <a:p>
+                <a:r>
+                  <a:rPr lang="de-DE">
+                    <a:noFill/>
+                  </a:rPr>
+                  <a:t> </a:t>
+                </a:r>
+              </a:p>
+            </p:txBody>
+          </p:sp>
+        </mc:Fallback>
+      </mc:AlternateContent>
+      <mc:AlternateContent xmlns:mc="http://schemas.openxmlformats.org/markup-compatibility/2006">
+        <mc:Choice xmlns:a14="http://schemas.microsoft.com/office/drawing/2010/main" Requires="a14">
+          <p:sp>
+            <p:nvSpPr>
+              <p:cNvPr id="16" name="Textfeld 15"/>
+              <p:cNvSpPr txBox="1"/>
+              <p:nvPr/>
+            </p:nvSpPr>
+            <p:spPr>
+              <a:xfrm>
+                <a:off x="6252025" y="5178367"/>
+                <a:ext cx="816414" cy="400110"/>
+              </a:xfrm>
+              <a:prstGeom prst="rect">
+                <a:avLst/>
+              </a:prstGeom>
+              <a:noFill/>
+            </p:spPr>
+            <p:txBody>
+              <a:bodyPr wrap="square" rtlCol="0">
+                <a:spAutoFit/>
+              </a:bodyPr>
+              <a:lstStyle/>
+              <a:p>
+                <a14:m>
+                  <m:oMathPara xmlns:m="http://schemas.openxmlformats.org/officeDocument/2006/math">
+                    <m:oMathParaPr>
+                      <m:jc m:val="centerGroup"/>
+                    </m:oMathParaPr>
+                    <m:oMath xmlns:m="http://schemas.openxmlformats.org/officeDocument/2006/math">
+                      <m:sSub>
+                        <m:sSubPr>
+                          <m:ctrlPr>
+                            <a:rPr lang="de-DE" sz="2000" i="1" smtClean="0">
+                              <a:solidFill>
+                                <a:srgbClr val="FF0000"/>
+                              </a:solidFill>
+                              <a:latin typeface="Cambria Math"/>
+                            </a:rPr>
+                          </m:ctrlPr>
+                        </m:sSubPr>
+                        <m:e>
+                          <m:r>
+                            <a:rPr lang="de-DE" sz="2000" b="0" i="1" smtClean="0">
+                              <a:solidFill>
+                                <a:srgbClr val="FF0000"/>
+                              </a:solidFill>
+                              <a:latin typeface="Cambria Math"/>
+                            </a:rPr>
+                            <m:t>𝑡</m:t>
+                          </m:r>
+                        </m:e>
+                        <m:sub>
+                          <m:r>
+                            <a:rPr lang="de-DE" sz="2000" b="0" i="1" smtClean="0">
+                              <a:solidFill>
+                                <a:srgbClr val="FF0000"/>
+                              </a:solidFill>
+                              <a:latin typeface="Cambria Math"/>
+                            </a:rPr>
+                            <m:t>3</m:t>
+                          </m:r>
+                        </m:sub>
+                      </m:sSub>
+                    </m:oMath>
+                  </m:oMathPara>
+                </a14:m>
+                <a:endParaRPr lang="de-DE" dirty="0"/>
+              </a:p>
+            </p:txBody>
+          </p:sp>
+        </mc:Choice>
+        <mc:Fallback>
+          <p:sp>
+            <p:nvSpPr>
+              <p:cNvPr id="16" name="Textfeld 15"/>
+              <p:cNvSpPr txBox="1">
+                <a:spLocks noRot="1" noChangeAspect="1" noMove="1" noResize="1" noEditPoints="1" noAdjustHandles="1" noChangeArrowheads="1" noChangeShapeType="1" noTextEdit="1"/>
+              </p:cNvSpPr>
+              <p:nvPr/>
+            </p:nvSpPr>
+            <p:spPr>
+              <a:xfrm>
+                <a:off x="6252025" y="5178367"/>
+                <a:ext cx="816414" cy="400110"/>
+              </a:xfrm>
+              <a:prstGeom prst="rect">
+                <a:avLst/>
+              </a:prstGeom>
+              <a:blipFill rotWithShape="1">
+                <a:blip r:embed="rId5"/>
+                <a:stretch>
+                  <a:fillRect/>
+                </a:stretch>
+              </a:blipFill>
+            </p:spPr>
+            <p:txBody>
+              <a:bodyPr/>
+              <a:lstStyle/>
+              <a:p>
+                <a:r>
+                  <a:rPr lang="de-DE">
+                    <a:noFill/>
+                  </a:rPr>
+                  <a:t> </a:t>
+                </a:r>
+              </a:p>
+            </p:txBody>
+          </p:sp>
+        </mc:Fallback>
+      </mc:AlternateContent>
+      <p:sp>
+        <p:nvSpPr>
+          <p:cNvPr id="17" name="Freihandform 16"/>
+          <p:cNvSpPr/>
+          <p:nvPr/>
+        </p:nvSpPr>
+        <p:spPr>
+          <a:xfrm>
+            <a:off x="1901370" y="1915886"/>
+            <a:ext cx="4804230" cy="3106057"/>
+          </a:xfrm>
+          <a:custGeom>
+            <a:avLst/>
+            <a:gdLst>
+              <a:gd name="connsiteX0" fmla="*/ 0 w 4818743"/>
+              <a:gd name="connsiteY0" fmla="*/ 3062514 h 3062514"/>
+              <a:gd name="connsiteX1" fmla="*/ 275772 w 4818743"/>
+              <a:gd name="connsiteY1" fmla="*/ 2569028 h 3062514"/>
+              <a:gd name="connsiteX2" fmla="*/ 566057 w 4818743"/>
+              <a:gd name="connsiteY2" fmla="*/ 2351314 h 3062514"/>
+              <a:gd name="connsiteX3" fmla="*/ 1001486 w 4818743"/>
+              <a:gd name="connsiteY3" fmla="*/ 2162628 h 3062514"/>
+              <a:gd name="connsiteX4" fmla="*/ 1524000 w 4818743"/>
+              <a:gd name="connsiteY4" fmla="*/ 1959428 h 3062514"/>
+              <a:gd name="connsiteX5" fmla="*/ 2032000 w 4818743"/>
+              <a:gd name="connsiteY5" fmla="*/ 1770743 h 3062514"/>
+              <a:gd name="connsiteX6" fmla="*/ 2235200 w 4818743"/>
+              <a:gd name="connsiteY6" fmla="*/ 1509485 h 3062514"/>
+              <a:gd name="connsiteX7" fmla="*/ 3135086 w 4818743"/>
+              <a:gd name="connsiteY7" fmla="*/ 1465943 h 3062514"/>
+              <a:gd name="connsiteX8" fmla="*/ 3889829 w 4818743"/>
+              <a:gd name="connsiteY8" fmla="*/ 1030514 h 3062514"/>
+              <a:gd name="connsiteX9" fmla="*/ 4339772 w 4818743"/>
+              <a:gd name="connsiteY9" fmla="*/ 798285 h 3062514"/>
+              <a:gd name="connsiteX10" fmla="*/ 4818743 w 4818743"/>
+              <a:gd name="connsiteY10" fmla="*/ 0 h 3062514"/>
+              <a:gd name="connsiteX0" fmla="*/ 0 w 4818743"/>
+              <a:gd name="connsiteY0" fmla="*/ 3062514 h 3062514"/>
+              <a:gd name="connsiteX1" fmla="*/ 275772 w 4818743"/>
+              <a:gd name="connsiteY1" fmla="*/ 2569028 h 3062514"/>
+              <a:gd name="connsiteX2" fmla="*/ 566057 w 4818743"/>
+              <a:gd name="connsiteY2" fmla="*/ 2351314 h 3062514"/>
+              <a:gd name="connsiteX3" fmla="*/ 1001486 w 4818743"/>
+              <a:gd name="connsiteY3" fmla="*/ 2162628 h 3062514"/>
+              <a:gd name="connsiteX4" fmla="*/ 1524000 w 4818743"/>
+              <a:gd name="connsiteY4" fmla="*/ 1959428 h 3062514"/>
+              <a:gd name="connsiteX5" fmla="*/ 2032000 w 4818743"/>
+              <a:gd name="connsiteY5" fmla="*/ 1770743 h 3062514"/>
+              <a:gd name="connsiteX6" fmla="*/ 2235200 w 4818743"/>
+              <a:gd name="connsiteY6" fmla="*/ 1509485 h 3062514"/>
+              <a:gd name="connsiteX7" fmla="*/ 3135086 w 4818743"/>
+              <a:gd name="connsiteY7" fmla="*/ 1465943 h 3062514"/>
+              <a:gd name="connsiteX8" fmla="*/ 3889829 w 4818743"/>
+              <a:gd name="connsiteY8" fmla="*/ 1030514 h 3062514"/>
+              <a:gd name="connsiteX9" fmla="*/ 4339772 w 4818743"/>
+              <a:gd name="connsiteY9" fmla="*/ 798285 h 3062514"/>
+              <a:gd name="connsiteX10" fmla="*/ 4818743 w 4818743"/>
+              <a:gd name="connsiteY10" fmla="*/ 0 h 3062514"/>
+              <a:gd name="connsiteX0" fmla="*/ 0 w 4818743"/>
+              <a:gd name="connsiteY0" fmla="*/ 3062514 h 3062514"/>
+              <a:gd name="connsiteX1" fmla="*/ 275772 w 4818743"/>
+              <a:gd name="connsiteY1" fmla="*/ 2569028 h 3062514"/>
+              <a:gd name="connsiteX2" fmla="*/ 566057 w 4818743"/>
+              <a:gd name="connsiteY2" fmla="*/ 2351314 h 3062514"/>
+              <a:gd name="connsiteX3" fmla="*/ 1001486 w 4818743"/>
+              <a:gd name="connsiteY3" fmla="*/ 2162628 h 3062514"/>
+              <a:gd name="connsiteX4" fmla="*/ 1524000 w 4818743"/>
+              <a:gd name="connsiteY4" fmla="*/ 1959428 h 3062514"/>
+              <a:gd name="connsiteX5" fmla="*/ 2032000 w 4818743"/>
+              <a:gd name="connsiteY5" fmla="*/ 1770743 h 3062514"/>
+              <a:gd name="connsiteX6" fmla="*/ 2235200 w 4818743"/>
+              <a:gd name="connsiteY6" fmla="*/ 1509485 h 3062514"/>
+              <a:gd name="connsiteX7" fmla="*/ 3135086 w 4818743"/>
+              <a:gd name="connsiteY7" fmla="*/ 1465943 h 3062514"/>
+              <a:gd name="connsiteX8" fmla="*/ 3889829 w 4818743"/>
+              <a:gd name="connsiteY8" fmla="*/ 1030514 h 3062514"/>
+              <a:gd name="connsiteX9" fmla="*/ 4339772 w 4818743"/>
+              <a:gd name="connsiteY9" fmla="*/ 798285 h 3062514"/>
+              <a:gd name="connsiteX10" fmla="*/ 4818743 w 4818743"/>
+              <a:gd name="connsiteY10" fmla="*/ 0 h 3062514"/>
+              <a:gd name="connsiteX0" fmla="*/ 0 w 4818743"/>
+              <a:gd name="connsiteY0" fmla="*/ 3062514 h 3062514"/>
+              <a:gd name="connsiteX1" fmla="*/ 275772 w 4818743"/>
+              <a:gd name="connsiteY1" fmla="*/ 2569028 h 3062514"/>
+              <a:gd name="connsiteX2" fmla="*/ 566057 w 4818743"/>
+              <a:gd name="connsiteY2" fmla="*/ 2351314 h 3062514"/>
+              <a:gd name="connsiteX3" fmla="*/ 1001486 w 4818743"/>
+              <a:gd name="connsiteY3" fmla="*/ 2162628 h 3062514"/>
+              <a:gd name="connsiteX4" fmla="*/ 1524000 w 4818743"/>
+              <a:gd name="connsiteY4" fmla="*/ 1959428 h 3062514"/>
+              <a:gd name="connsiteX5" fmla="*/ 2032000 w 4818743"/>
+              <a:gd name="connsiteY5" fmla="*/ 1770743 h 3062514"/>
+              <a:gd name="connsiteX6" fmla="*/ 2235200 w 4818743"/>
+              <a:gd name="connsiteY6" fmla="*/ 1509485 h 3062514"/>
+              <a:gd name="connsiteX7" fmla="*/ 3135086 w 4818743"/>
+              <a:gd name="connsiteY7" fmla="*/ 1465943 h 3062514"/>
+              <a:gd name="connsiteX8" fmla="*/ 3889829 w 4818743"/>
+              <a:gd name="connsiteY8" fmla="*/ 1030514 h 3062514"/>
+              <a:gd name="connsiteX9" fmla="*/ 4339772 w 4818743"/>
+              <a:gd name="connsiteY9" fmla="*/ 798285 h 3062514"/>
+              <a:gd name="connsiteX10" fmla="*/ 4818743 w 4818743"/>
+              <a:gd name="connsiteY10" fmla="*/ 0 h 3062514"/>
+              <a:gd name="connsiteX0" fmla="*/ 0 w 4818743"/>
+              <a:gd name="connsiteY0" fmla="*/ 3062514 h 3062514"/>
+              <a:gd name="connsiteX1" fmla="*/ 275772 w 4818743"/>
+              <a:gd name="connsiteY1" fmla="*/ 2569028 h 3062514"/>
+              <a:gd name="connsiteX2" fmla="*/ 566057 w 4818743"/>
+              <a:gd name="connsiteY2" fmla="*/ 2351314 h 3062514"/>
+              <a:gd name="connsiteX3" fmla="*/ 1001486 w 4818743"/>
+              <a:gd name="connsiteY3" fmla="*/ 2162628 h 3062514"/>
+              <a:gd name="connsiteX4" fmla="*/ 1524000 w 4818743"/>
+              <a:gd name="connsiteY4" fmla="*/ 1959428 h 3062514"/>
+              <a:gd name="connsiteX5" fmla="*/ 2032000 w 4818743"/>
+              <a:gd name="connsiteY5" fmla="*/ 1770743 h 3062514"/>
+              <a:gd name="connsiteX6" fmla="*/ 2235200 w 4818743"/>
+              <a:gd name="connsiteY6" fmla="*/ 1509485 h 3062514"/>
+              <a:gd name="connsiteX7" fmla="*/ 3135086 w 4818743"/>
+              <a:gd name="connsiteY7" fmla="*/ 1524000 h 3062514"/>
+              <a:gd name="connsiteX8" fmla="*/ 3889829 w 4818743"/>
+              <a:gd name="connsiteY8" fmla="*/ 1030514 h 3062514"/>
+              <a:gd name="connsiteX9" fmla="*/ 4339772 w 4818743"/>
+              <a:gd name="connsiteY9" fmla="*/ 798285 h 3062514"/>
+              <a:gd name="connsiteX10" fmla="*/ 4818743 w 4818743"/>
+              <a:gd name="connsiteY10" fmla="*/ 0 h 3062514"/>
+              <a:gd name="connsiteX0" fmla="*/ 0 w 4818743"/>
+              <a:gd name="connsiteY0" fmla="*/ 3062514 h 3062514"/>
+              <a:gd name="connsiteX1" fmla="*/ 275772 w 4818743"/>
+              <a:gd name="connsiteY1" fmla="*/ 2569028 h 3062514"/>
+              <a:gd name="connsiteX2" fmla="*/ 566057 w 4818743"/>
+              <a:gd name="connsiteY2" fmla="*/ 2351314 h 3062514"/>
+              <a:gd name="connsiteX3" fmla="*/ 1001486 w 4818743"/>
+              <a:gd name="connsiteY3" fmla="*/ 2162628 h 3062514"/>
+              <a:gd name="connsiteX4" fmla="*/ 1524000 w 4818743"/>
+              <a:gd name="connsiteY4" fmla="*/ 1959428 h 3062514"/>
+              <a:gd name="connsiteX5" fmla="*/ 2032000 w 4818743"/>
+              <a:gd name="connsiteY5" fmla="*/ 1770743 h 3062514"/>
+              <a:gd name="connsiteX6" fmla="*/ 2235200 w 4818743"/>
+              <a:gd name="connsiteY6" fmla="*/ 1509485 h 3062514"/>
+              <a:gd name="connsiteX7" fmla="*/ 3135086 w 4818743"/>
+              <a:gd name="connsiteY7" fmla="*/ 1480457 h 3062514"/>
+              <a:gd name="connsiteX8" fmla="*/ 3889829 w 4818743"/>
+              <a:gd name="connsiteY8" fmla="*/ 1030514 h 3062514"/>
+              <a:gd name="connsiteX9" fmla="*/ 4339772 w 4818743"/>
+              <a:gd name="connsiteY9" fmla="*/ 798285 h 3062514"/>
+              <a:gd name="connsiteX10" fmla="*/ 4818743 w 4818743"/>
+              <a:gd name="connsiteY10" fmla="*/ 0 h 3062514"/>
+              <a:gd name="connsiteX0" fmla="*/ 0 w 4818743"/>
+              <a:gd name="connsiteY0" fmla="*/ 3062514 h 3062514"/>
+              <a:gd name="connsiteX1" fmla="*/ 275772 w 4818743"/>
+              <a:gd name="connsiteY1" fmla="*/ 2569028 h 3062514"/>
+              <a:gd name="connsiteX2" fmla="*/ 566057 w 4818743"/>
+              <a:gd name="connsiteY2" fmla="*/ 2351314 h 3062514"/>
+              <a:gd name="connsiteX3" fmla="*/ 1001486 w 4818743"/>
+              <a:gd name="connsiteY3" fmla="*/ 2162628 h 3062514"/>
+              <a:gd name="connsiteX4" fmla="*/ 1524000 w 4818743"/>
+              <a:gd name="connsiteY4" fmla="*/ 1959428 h 3062514"/>
+              <a:gd name="connsiteX5" fmla="*/ 2032000 w 4818743"/>
+              <a:gd name="connsiteY5" fmla="*/ 1770743 h 3062514"/>
+              <a:gd name="connsiteX6" fmla="*/ 2235200 w 4818743"/>
+              <a:gd name="connsiteY6" fmla="*/ 1480456 h 3062514"/>
+              <a:gd name="connsiteX7" fmla="*/ 3135086 w 4818743"/>
+              <a:gd name="connsiteY7" fmla="*/ 1480457 h 3062514"/>
+              <a:gd name="connsiteX8" fmla="*/ 3889829 w 4818743"/>
+              <a:gd name="connsiteY8" fmla="*/ 1030514 h 3062514"/>
+              <a:gd name="connsiteX9" fmla="*/ 4339772 w 4818743"/>
+              <a:gd name="connsiteY9" fmla="*/ 798285 h 3062514"/>
+              <a:gd name="connsiteX10" fmla="*/ 4818743 w 4818743"/>
+              <a:gd name="connsiteY10" fmla="*/ 0 h 3062514"/>
+              <a:gd name="connsiteX0" fmla="*/ 0 w 4818743"/>
+              <a:gd name="connsiteY0" fmla="*/ 3062514 h 3062514"/>
+              <a:gd name="connsiteX1" fmla="*/ 275772 w 4818743"/>
+              <a:gd name="connsiteY1" fmla="*/ 2569028 h 3062514"/>
+              <a:gd name="connsiteX2" fmla="*/ 566057 w 4818743"/>
+              <a:gd name="connsiteY2" fmla="*/ 2351314 h 3062514"/>
+              <a:gd name="connsiteX3" fmla="*/ 1001486 w 4818743"/>
+              <a:gd name="connsiteY3" fmla="*/ 2162628 h 3062514"/>
+              <a:gd name="connsiteX4" fmla="*/ 1524000 w 4818743"/>
+              <a:gd name="connsiteY4" fmla="*/ 1959428 h 3062514"/>
+              <a:gd name="connsiteX5" fmla="*/ 2032000 w 4818743"/>
+              <a:gd name="connsiteY5" fmla="*/ 1770743 h 3062514"/>
+              <a:gd name="connsiteX6" fmla="*/ 2235200 w 4818743"/>
+              <a:gd name="connsiteY6" fmla="*/ 1480456 h 3062514"/>
+              <a:gd name="connsiteX7" fmla="*/ 3135086 w 4818743"/>
+              <a:gd name="connsiteY7" fmla="*/ 1480457 h 3062514"/>
+              <a:gd name="connsiteX8" fmla="*/ 3889829 w 4818743"/>
+              <a:gd name="connsiteY8" fmla="*/ 1030514 h 3062514"/>
+              <a:gd name="connsiteX9" fmla="*/ 4339772 w 4818743"/>
+              <a:gd name="connsiteY9" fmla="*/ 798285 h 3062514"/>
+              <a:gd name="connsiteX10" fmla="*/ 4818743 w 4818743"/>
+              <a:gd name="connsiteY10" fmla="*/ 0 h 3062514"/>
+              <a:gd name="connsiteX0" fmla="*/ 0 w 4818743"/>
+              <a:gd name="connsiteY0" fmla="*/ 3062514 h 3062514"/>
+              <a:gd name="connsiteX1" fmla="*/ 348343 w 4818743"/>
+              <a:gd name="connsiteY1" fmla="*/ 2598057 h 3062514"/>
+              <a:gd name="connsiteX2" fmla="*/ 566057 w 4818743"/>
+              <a:gd name="connsiteY2" fmla="*/ 2351314 h 3062514"/>
+              <a:gd name="connsiteX3" fmla="*/ 1001486 w 4818743"/>
+              <a:gd name="connsiteY3" fmla="*/ 2162628 h 3062514"/>
+              <a:gd name="connsiteX4" fmla="*/ 1524000 w 4818743"/>
+              <a:gd name="connsiteY4" fmla="*/ 1959428 h 3062514"/>
+              <a:gd name="connsiteX5" fmla="*/ 2032000 w 4818743"/>
+              <a:gd name="connsiteY5" fmla="*/ 1770743 h 3062514"/>
+              <a:gd name="connsiteX6" fmla="*/ 2235200 w 4818743"/>
+              <a:gd name="connsiteY6" fmla="*/ 1480456 h 3062514"/>
+              <a:gd name="connsiteX7" fmla="*/ 3135086 w 4818743"/>
+              <a:gd name="connsiteY7" fmla="*/ 1480457 h 3062514"/>
+              <a:gd name="connsiteX8" fmla="*/ 3889829 w 4818743"/>
+              <a:gd name="connsiteY8" fmla="*/ 1030514 h 3062514"/>
+              <a:gd name="connsiteX9" fmla="*/ 4339772 w 4818743"/>
+              <a:gd name="connsiteY9" fmla="*/ 798285 h 3062514"/>
+              <a:gd name="connsiteX10" fmla="*/ 4818743 w 4818743"/>
+              <a:gd name="connsiteY10" fmla="*/ 0 h 3062514"/>
+              <a:gd name="connsiteX0" fmla="*/ 0 w 4775201"/>
+              <a:gd name="connsiteY0" fmla="*/ 3062514 h 3062514"/>
+              <a:gd name="connsiteX1" fmla="*/ 304801 w 4775201"/>
+              <a:gd name="connsiteY1" fmla="*/ 2598057 h 3062514"/>
+              <a:gd name="connsiteX2" fmla="*/ 522515 w 4775201"/>
+              <a:gd name="connsiteY2" fmla="*/ 2351314 h 3062514"/>
+              <a:gd name="connsiteX3" fmla="*/ 957944 w 4775201"/>
+              <a:gd name="connsiteY3" fmla="*/ 2162628 h 3062514"/>
+              <a:gd name="connsiteX4" fmla="*/ 1480458 w 4775201"/>
+              <a:gd name="connsiteY4" fmla="*/ 1959428 h 3062514"/>
+              <a:gd name="connsiteX5" fmla="*/ 1988458 w 4775201"/>
+              <a:gd name="connsiteY5" fmla="*/ 1770743 h 3062514"/>
+              <a:gd name="connsiteX6" fmla="*/ 2191658 w 4775201"/>
+              <a:gd name="connsiteY6" fmla="*/ 1480456 h 3062514"/>
+              <a:gd name="connsiteX7" fmla="*/ 3091544 w 4775201"/>
+              <a:gd name="connsiteY7" fmla="*/ 1480457 h 3062514"/>
+              <a:gd name="connsiteX8" fmla="*/ 3846287 w 4775201"/>
+              <a:gd name="connsiteY8" fmla="*/ 1030514 h 3062514"/>
+              <a:gd name="connsiteX9" fmla="*/ 4296230 w 4775201"/>
+              <a:gd name="connsiteY9" fmla="*/ 798285 h 3062514"/>
+              <a:gd name="connsiteX10" fmla="*/ 4775201 w 4775201"/>
+              <a:gd name="connsiteY10" fmla="*/ 0 h 3062514"/>
+              <a:gd name="connsiteX0" fmla="*/ 0 w 4804230"/>
+              <a:gd name="connsiteY0" fmla="*/ 3106057 h 3106057"/>
+              <a:gd name="connsiteX1" fmla="*/ 333830 w 4804230"/>
+              <a:gd name="connsiteY1" fmla="*/ 2598057 h 3106057"/>
+              <a:gd name="connsiteX2" fmla="*/ 551544 w 4804230"/>
+              <a:gd name="connsiteY2" fmla="*/ 2351314 h 3106057"/>
+              <a:gd name="connsiteX3" fmla="*/ 986973 w 4804230"/>
+              <a:gd name="connsiteY3" fmla="*/ 2162628 h 3106057"/>
+              <a:gd name="connsiteX4" fmla="*/ 1509487 w 4804230"/>
+              <a:gd name="connsiteY4" fmla="*/ 1959428 h 3106057"/>
+              <a:gd name="connsiteX5" fmla="*/ 2017487 w 4804230"/>
+              <a:gd name="connsiteY5" fmla="*/ 1770743 h 3106057"/>
+              <a:gd name="connsiteX6" fmla="*/ 2220687 w 4804230"/>
+              <a:gd name="connsiteY6" fmla="*/ 1480456 h 3106057"/>
+              <a:gd name="connsiteX7" fmla="*/ 3120573 w 4804230"/>
+              <a:gd name="connsiteY7" fmla="*/ 1480457 h 3106057"/>
+              <a:gd name="connsiteX8" fmla="*/ 3875316 w 4804230"/>
+              <a:gd name="connsiteY8" fmla="*/ 1030514 h 3106057"/>
+              <a:gd name="connsiteX9" fmla="*/ 4325259 w 4804230"/>
+              <a:gd name="connsiteY9" fmla="*/ 798285 h 3106057"/>
+              <a:gd name="connsiteX10" fmla="*/ 4804230 w 4804230"/>
+              <a:gd name="connsiteY10" fmla="*/ 0 h 3106057"/>
+            </a:gdLst>
+            <a:ahLst/>
+            <a:cxnLst>
+              <a:cxn ang="0">
+                <a:pos x="connsiteX0" y="connsiteY0"/>
+              </a:cxn>
+              <a:cxn ang="0">
+                <a:pos x="connsiteX1" y="connsiteY1"/>
+              </a:cxn>
+              <a:cxn ang="0">
+                <a:pos x="connsiteX2" y="connsiteY2"/>
+              </a:cxn>
+              <a:cxn ang="0">
+                <a:pos x="connsiteX3" y="connsiteY3"/>
+              </a:cxn>
+              <a:cxn ang="0">
+                <a:pos x="connsiteX4" y="connsiteY4"/>
+              </a:cxn>
+              <a:cxn ang="0">
+                <a:pos x="connsiteX5" y="connsiteY5"/>
+              </a:cxn>
+              <a:cxn ang="0">
+                <a:pos x="connsiteX6" y="connsiteY6"/>
+              </a:cxn>
+              <a:cxn ang="0">
+                <a:pos x="connsiteX7" y="connsiteY7"/>
+              </a:cxn>
+              <a:cxn ang="0">
+                <a:pos x="connsiteX8" y="connsiteY8"/>
+              </a:cxn>
+              <a:cxn ang="0">
+                <a:pos x="connsiteX9" y="connsiteY9"/>
+              </a:cxn>
+              <a:cxn ang="0">
+                <a:pos x="connsiteX10" y="connsiteY10"/>
+              </a:cxn>
+            </a:cxnLst>
+            <a:rect l="l" t="t" r="r" b="b"/>
+            <a:pathLst>
+              <a:path w="4804230" h="3106057">
+                <a:moveTo>
+                  <a:pt x="0" y="3106057"/>
+                </a:moveTo>
+                <a:cubicBezTo>
+                  <a:pt x="90714" y="2918580"/>
+                  <a:pt x="241906" y="2723848"/>
+                  <a:pt x="333830" y="2598057"/>
+                </a:cubicBezTo>
+                <a:cubicBezTo>
+                  <a:pt x="425754" y="2472267"/>
+                  <a:pt x="442687" y="2423885"/>
+                  <a:pt x="551544" y="2351314"/>
+                </a:cubicBezTo>
+                <a:cubicBezTo>
+                  <a:pt x="660401" y="2278743"/>
+                  <a:pt x="827316" y="2227942"/>
+                  <a:pt x="986973" y="2162628"/>
+                </a:cubicBezTo>
+                <a:cubicBezTo>
+                  <a:pt x="1146630" y="2097314"/>
+                  <a:pt x="1509487" y="1959428"/>
+                  <a:pt x="1509487" y="1959428"/>
+                </a:cubicBezTo>
+                <a:cubicBezTo>
+                  <a:pt x="1681239" y="1894114"/>
+                  <a:pt x="1898954" y="1850572"/>
+                  <a:pt x="2017487" y="1770743"/>
+                </a:cubicBezTo>
+                <a:cubicBezTo>
+                  <a:pt x="2136020" y="1690914"/>
+                  <a:pt x="2036839" y="1531256"/>
+                  <a:pt x="2220687" y="1480456"/>
+                </a:cubicBezTo>
+                <a:cubicBezTo>
+                  <a:pt x="2985106" y="1487713"/>
+                  <a:pt x="2830287" y="1473201"/>
+                  <a:pt x="3120573" y="1480457"/>
+                </a:cubicBezTo>
+                <a:cubicBezTo>
+                  <a:pt x="3396345" y="1400628"/>
+                  <a:pt x="3674535" y="1144209"/>
+                  <a:pt x="3875316" y="1030514"/>
+                </a:cubicBezTo>
+                <a:cubicBezTo>
+                  <a:pt x="4076097" y="916819"/>
+                  <a:pt x="4170440" y="970037"/>
+                  <a:pt x="4325259" y="798285"/>
+                </a:cubicBezTo>
+                <a:cubicBezTo>
+                  <a:pt x="4480078" y="626533"/>
+                  <a:pt x="4642154" y="313266"/>
+                  <a:pt x="4804230" y="0"/>
+                </a:cubicBezTo>
+              </a:path>
+            </a:pathLst>
+          </a:custGeom>
+          <a:noFill/>
+          <a:ln w="63500">
+            <a:solidFill>
+              <a:schemeClr val="tx1"/>
+            </a:solidFill>
+          </a:ln>
+        </p:spPr>
+        <p:style>
+          <a:lnRef idx="2">
+            <a:schemeClr val="accent1">
+              <a:shade val="50000"/>
+            </a:schemeClr>
+          </a:lnRef>
+          <a:fillRef idx="1">
+            <a:schemeClr val="accent1"/>
+          </a:fillRef>
+          <a:effectRef idx="0">
+            <a:schemeClr val="accent1"/>
+          </a:effectRef>
+          <a:fontRef idx="minor">
+            <a:schemeClr val="lt1"/>
+          </a:fontRef>
+        </p:style>
+        <p:txBody>
+          <a:bodyPr rtlCol="0" anchor="ctr"/>
+          <a:lstStyle/>
+          <a:p>
+            <a:pPr algn="ctr"/>
+            <a:endParaRPr lang="de-DE"/>
+          </a:p>
+        </p:txBody>
+      </p:sp>
+      <p:sp>
+        <p:nvSpPr>
+          <p:cNvPr id="20" name="Textfeld 19"/>
+          <p:cNvSpPr txBox="1"/>
+          <p:nvPr/>
+        </p:nvSpPr>
+        <p:spPr>
+          <a:xfrm>
+            <a:off x="6662057" y="1316945"/>
+            <a:ext cx="671913" cy="830997"/>
+          </a:xfrm>
+          <a:prstGeom prst="rect">
+            <a:avLst/>
+          </a:prstGeom>
+          <a:noFill/>
+        </p:spPr>
+        <p:txBody>
+          <a:bodyPr wrap="square" rtlCol="0">
+            <a:spAutoFit/>
+          </a:bodyPr>
+          <a:lstStyle/>
+          <a:p>
+            <a:r>
+              <a:rPr lang="de-DE" sz="4800" b="1" dirty="0" smtClean="0">
+                <a:latin typeface="Lucida Sans Unicode"/>
+                <a:cs typeface="Lucida Sans Unicode"/>
+              </a:rPr>
+              <a:t>☺</a:t>
+            </a:r>
+            <a:endParaRPr lang="de-DE" sz="4800" b="1" dirty="0"/>
+          </a:p>
+        </p:txBody>
+      </p:sp>
+    </p:spTree>
+    <p:extLst>
+      <p:ext uri="{BB962C8B-B14F-4D97-AF65-F5344CB8AC3E}">
+        <p14:creationId xmlns:p14="http://schemas.microsoft.com/office/powerpoint/2010/main" val="3030197453"/>
+      </p:ext>
+    </p:extLst>
+  </p:cSld>
+  <p:clrMapOvr>
+    <a:masterClrMapping/>
+  </p:clrMapOvr>
+  <p:timing>
+    <p:tnLst>
+      <p:par>
+        <p:cTn id="1" dur="indefinite" restart="never" nodeType="tmRoot"/>
+      </p:par>
+    </p:tnLst>
+  </p:timing>
+</p:sld>
+</file>
+
+<file path=ppt/slides/slide24.xml><?xml version="1.0" encoding="utf-8"?>
+<p:sld xmlns:a="http://schemas.openxmlformats.org/drawingml/2006/main" xmlns:r="http://schemas.openxmlformats.org/officeDocument/2006/relationships" xmlns:p="http://schemas.openxmlformats.org/presentationml/2006/main">
+  <p:cSld>
+    <p:spTree>
+      <p:nvGrpSpPr>
+        <p:cNvPr id="1" name=""/>
+        <p:cNvGrpSpPr/>
+        <p:nvPr/>
+      </p:nvGrpSpPr>
+      <p:grpSpPr>
+        <a:xfrm>
+          <a:off x="0" y="0"/>
+          <a:ext cx="0" cy="0"/>
+          <a:chOff x="0" y="0"/>
+          <a:chExt cx="0" cy="0"/>
+        </a:xfrm>
+      </p:grpSpPr>
+    </p:spTree>
+    <p:extLst>
+      <p:ext uri="{BB962C8B-B14F-4D97-AF65-F5344CB8AC3E}">
+        <p14:creationId xmlns:p14="http://schemas.microsoft.com/office/powerpoint/2010/main" val="3030197453"/>
+      </p:ext>
+    </p:extLst>
+  </p:cSld>
+  <p:clrMapOvr>
+    <a:masterClrMapping/>
+  </p:clrMapOvr>
+  <p:timing>
+    <p:tnLst>
+      <p:par>
+        <p:cTn id="1" dur="indefinite" restart="never" nodeType="tmRoot"/>
+      </p:par>
+    </p:tnLst>
+  </p:timing>
+</p:sld>
+</file>
+
+<file path=ppt/slides/slide25.xml><?xml version="1.0" encoding="utf-8"?>
+<p:sld xmlns:a="http://schemas.openxmlformats.org/drawingml/2006/main" xmlns:r="http://schemas.openxmlformats.org/officeDocument/2006/relationships" xmlns:p="http://schemas.openxmlformats.org/presentationml/2006/main">
+  <p:cSld>
+    <p:spTree>
+      <p:nvGrpSpPr>
+        <p:cNvPr id="1" name=""/>
+        <p:cNvGrpSpPr/>
+        <p:nvPr/>
+      </p:nvGrpSpPr>
+      <p:grpSpPr>
+        <a:xfrm>
+          <a:off x="0" y="0"/>
+          <a:ext cx="0" cy="0"/>
+          <a:chOff x="0" y="0"/>
+          <a:chExt cx="0" cy="0"/>
+        </a:xfrm>
+      </p:grpSpPr>
+    </p:spTree>
+    <p:extLst>
+      <p:ext uri="{BB962C8B-B14F-4D97-AF65-F5344CB8AC3E}">
+        <p14:creationId xmlns:p14="http://schemas.microsoft.com/office/powerpoint/2010/main" val="3030197453"/>
       </p:ext>
     </p:extLst>
   </p:cSld>

</xml_diff>